<commit_message>
Update Figure 2 and caption to drop B1B PUL with cleaved first gene.
</commit_message>
<xml_diff>
--- a/doc/static/starch_related_PULs.pptx
+++ b/doc/static/starch_related_PULs.pptx
@@ -2,7 +2,7 @@
 <file path=ppt/presentation.xml><?xml version="1.0" encoding="utf-8"?>
 <p:presentation xmlns:a="http://schemas.openxmlformats.org/drawingml/2006/main" xmlns:r="http://schemas.openxmlformats.org/officeDocument/2006/relationships" xmlns:p="http://schemas.openxmlformats.org/presentationml/2006/main" saveSubsetFonts="1" autoCompressPictures="0">
   <p:sldMasterIdLst>
-    <p:sldMasterId id="2147483804" r:id="rId1"/>
+    <p:sldMasterId id="2147483840" r:id="rId1"/>
   </p:sldMasterIdLst>
   <p:notesMasterIdLst>
     <p:notesMasterId r:id="rId3"/>
@@ -10,7 +10,7 @@
   <p:sldIdLst>
     <p:sldId id="257" r:id="rId2"/>
   </p:sldIdLst>
-  <p:sldSz cx="6291263" cy="6977063"/>
+  <p:sldSz cx="6291263" cy="6308725"/>
   <p:notesSz cx="6858000" cy="9144000"/>
   <p:defaultTextStyle>
     <a:defPPr>
@@ -209,7 +209,7 @@
           <a:p>
             <a:fld id="{56FAAB6E-97AE-0847-93C3-7045BD03F9C5}" type="datetimeFigureOut">
               <a:rPr lang="en-US" smtClean="0"/>
-              <a:t>12/14/20</a:t>
+              <a:t>8/17/21</a:t>
             </a:fld>
             <a:endParaRPr lang="en-US"/>
           </a:p>
@@ -227,8 +227,8 @@
         </p:nvSpPr>
         <p:spPr>
           <a:xfrm>
-            <a:off x="2038350" y="1143000"/>
-            <a:ext cx="2781300" cy="3086100"/>
+            <a:off x="1890713" y="1143000"/>
+            <a:ext cx="3076575" cy="3086100"/>
           </a:xfrm>
           <a:prstGeom prst="rect">
             <a:avLst/>
@@ -505,8 +505,8 @@
         </p:nvSpPr>
         <p:spPr>
           <a:xfrm>
-            <a:off x="2038350" y="1143000"/>
-            <a:ext cx="2781300" cy="3086100"/>
+            <a:off x="1890713" y="1143000"/>
+            <a:ext cx="3076575" cy="3086100"/>
           </a:xfrm>
         </p:spPr>
       </p:sp>
@@ -594,8 +594,8 @@
         </p:nvSpPr>
         <p:spPr>
           <a:xfrm>
-            <a:off x="471845" y="1141848"/>
-            <a:ext cx="5347574" cy="2429052"/>
+            <a:off x="471845" y="1032470"/>
+            <a:ext cx="5347574" cy="2196371"/>
           </a:xfrm>
         </p:spPr>
         <p:txBody>
@@ -626,8 +626,8 @@
         </p:nvSpPr>
         <p:spPr>
           <a:xfrm>
-            <a:off x="786408" y="3664574"/>
-            <a:ext cx="4718447" cy="1684508"/>
+            <a:off x="786408" y="3313541"/>
+            <a:ext cx="4718447" cy="1523148"/>
           </a:xfrm>
         </p:spPr>
         <p:txBody>
@@ -696,7 +696,7 @@
           <a:p>
             <a:fld id="{3F6A62D9-65B6-4743-B091-3F210FFD6B26}" type="datetimeFigureOut">
               <a:rPr lang="en-US" smtClean="0"/>
-              <a:t>12/14/20</a:t>
+              <a:t>8/17/21</a:t>
             </a:fld>
             <a:endParaRPr lang="en-US"/>
           </a:p>
@@ -747,7 +747,7 @@
     </p:spTree>
     <p:extLst>
       <p:ext uri="{BB962C8B-B14F-4D97-AF65-F5344CB8AC3E}">
-        <p14:creationId xmlns:p14="http://schemas.microsoft.com/office/powerpoint/2010/main" val="2359609778"/>
+        <p14:creationId xmlns:p14="http://schemas.microsoft.com/office/powerpoint/2010/main" val="1630030108"/>
       </p:ext>
     </p:extLst>
   </p:cSld>
@@ -866,7 +866,7 @@
           <a:p>
             <a:fld id="{3F6A62D9-65B6-4743-B091-3F210FFD6B26}" type="datetimeFigureOut">
               <a:rPr lang="en-US" smtClean="0"/>
-              <a:t>12/14/20</a:t>
+              <a:t>8/17/21</a:t>
             </a:fld>
             <a:endParaRPr lang="en-US"/>
           </a:p>
@@ -917,7 +917,7 @@
     </p:spTree>
     <p:extLst>
       <p:ext uri="{BB962C8B-B14F-4D97-AF65-F5344CB8AC3E}">
-        <p14:creationId xmlns:p14="http://schemas.microsoft.com/office/powerpoint/2010/main" val="1227272525"/>
+        <p14:creationId xmlns:p14="http://schemas.microsoft.com/office/powerpoint/2010/main" val="4220422598"/>
       </p:ext>
     </p:extLst>
   </p:cSld>
@@ -956,8 +956,8 @@
         </p:nvSpPr>
         <p:spPr>
           <a:xfrm>
-            <a:off x="4502185" y="371464"/>
-            <a:ext cx="1356554" cy="5912738"/>
+            <a:off x="4502185" y="335881"/>
+            <a:ext cx="1356554" cy="5346353"/>
           </a:xfrm>
         </p:spPr>
         <p:txBody>
@@ -984,8 +984,8 @@
         </p:nvSpPr>
         <p:spPr>
           <a:xfrm>
-            <a:off x="432525" y="371464"/>
-            <a:ext cx="3991020" cy="5912738"/>
+            <a:off x="432525" y="335881"/>
+            <a:ext cx="3991020" cy="5346353"/>
           </a:xfrm>
         </p:spPr>
         <p:txBody>
@@ -1046,7 +1046,7 @@
           <a:p>
             <a:fld id="{3F6A62D9-65B6-4743-B091-3F210FFD6B26}" type="datetimeFigureOut">
               <a:rPr lang="en-US" smtClean="0"/>
-              <a:t>12/14/20</a:t>
+              <a:t>8/17/21</a:t>
             </a:fld>
             <a:endParaRPr lang="en-US"/>
           </a:p>
@@ -1097,7 +1097,7 @@
     </p:spTree>
     <p:extLst>
       <p:ext uri="{BB962C8B-B14F-4D97-AF65-F5344CB8AC3E}">
-        <p14:creationId xmlns:p14="http://schemas.microsoft.com/office/powerpoint/2010/main" val="1504949297"/>
+        <p14:creationId xmlns:p14="http://schemas.microsoft.com/office/powerpoint/2010/main" val="1316528350"/>
       </p:ext>
     </p:extLst>
   </p:cSld>
@@ -1216,7 +1216,7 @@
           <a:p>
             <a:fld id="{3F6A62D9-65B6-4743-B091-3F210FFD6B26}" type="datetimeFigureOut">
               <a:rPr lang="en-US" smtClean="0"/>
-              <a:t>12/14/20</a:t>
+              <a:t>8/17/21</a:t>
             </a:fld>
             <a:endParaRPr lang="en-US"/>
           </a:p>
@@ -1267,7 +1267,7 @@
     </p:spTree>
     <p:extLst>
       <p:ext uri="{BB962C8B-B14F-4D97-AF65-F5344CB8AC3E}">
-        <p14:creationId xmlns:p14="http://schemas.microsoft.com/office/powerpoint/2010/main" val="3733503949"/>
+        <p14:creationId xmlns:p14="http://schemas.microsoft.com/office/powerpoint/2010/main" val="3860679469"/>
       </p:ext>
     </p:extLst>
   </p:cSld>
@@ -1306,8 +1306,8 @@
         </p:nvSpPr>
         <p:spPr>
           <a:xfrm>
-            <a:off x="429248" y="1739423"/>
-            <a:ext cx="5426214" cy="2902264"/>
+            <a:off x="429248" y="1572802"/>
+            <a:ext cx="5426214" cy="2624254"/>
           </a:xfrm>
         </p:spPr>
         <p:txBody>
@@ -1338,8 +1338,8 @@
         </p:nvSpPr>
         <p:spPr>
           <a:xfrm>
-            <a:off x="429248" y="4669143"/>
-            <a:ext cx="5426214" cy="1526232"/>
+            <a:off x="429248" y="4221882"/>
+            <a:ext cx="5426214" cy="1380033"/>
           </a:xfrm>
         </p:spPr>
         <p:txBody>
@@ -1460,7 +1460,7 @@
           <a:p>
             <a:fld id="{3F6A62D9-65B6-4743-B091-3F210FFD6B26}" type="datetimeFigureOut">
               <a:rPr lang="en-US" smtClean="0"/>
-              <a:t>12/14/20</a:t>
+              <a:t>8/17/21</a:t>
             </a:fld>
             <a:endParaRPr lang="en-US"/>
           </a:p>
@@ -1511,7 +1511,7 @@
     </p:spTree>
     <p:extLst>
       <p:ext uri="{BB962C8B-B14F-4D97-AF65-F5344CB8AC3E}">
-        <p14:creationId xmlns:p14="http://schemas.microsoft.com/office/powerpoint/2010/main" val="1417875551"/>
+        <p14:creationId xmlns:p14="http://schemas.microsoft.com/office/powerpoint/2010/main" val="2241373492"/>
       </p:ext>
     </p:extLst>
   </p:cSld>
@@ -1573,8 +1573,8 @@
         </p:nvSpPr>
         <p:spPr>
           <a:xfrm>
-            <a:off x="432524" y="1857320"/>
-            <a:ext cx="2673787" cy="4426882"/>
+            <a:off x="432524" y="1679406"/>
+            <a:ext cx="2673787" cy="4002828"/>
           </a:xfrm>
         </p:spPr>
         <p:txBody>
@@ -1630,8 +1630,8 @@
         </p:nvSpPr>
         <p:spPr>
           <a:xfrm>
-            <a:off x="3184952" y="1857320"/>
-            <a:ext cx="2673787" cy="4426882"/>
+            <a:off x="3184952" y="1679406"/>
+            <a:ext cx="2673787" cy="4002828"/>
           </a:xfrm>
         </p:spPr>
         <p:txBody>
@@ -1692,7 +1692,7 @@
           <a:p>
             <a:fld id="{3F6A62D9-65B6-4743-B091-3F210FFD6B26}" type="datetimeFigureOut">
               <a:rPr lang="en-US" smtClean="0"/>
-              <a:t>12/14/20</a:t>
+              <a:t>8/17/21</a:t>
             </a:fld>
             <a:endParaRPr lang="en-US"/>
           </a:p>
@@ -1743,7 +1743,7 @@
     </p:spTree>
     <p:extLst>
       <p:ext uri="{BB962C8B-B14F-4D97-AF65-F5344CB8AC3E}">
-        <p14:creationId xmlns:p14="http://schemas.microsoft.com/office/powerpoint/2010/main" val="1088377541"/>
+        <p14:creationId xmlns:p14="http://schemas.microsoft.com/office/powerpoint/2010/main" val="3510193938"/>
       </p:ext>
     </p:extLst>
   </p:cSld>
@@ -1782,8 +1782,8 @@
         </p:nvSpPr>
         <p:spPr>
           <a:xfrm>
-            <a:off x="433344" y="371466"/>
-            <a:ext cx="5426214" cy="1348576"/>
+            <a:off x="433344" y="335883"/>
+            <a:ext cx="5426214" cy="1219395"/>
           </a:xfrm>
         </p:spPr>
         <p:txBody>
@@ -1810,8 +1810,8 @@
         </p:nvSpPr>
         <p:spPr>
           <a:xfrm>
-            <a:off x="433344" y="1710350"/>
-            <a:ext cx="2661499" cy="838216"/>
+            <a:off x="433344" y="1546514"/>
+            <a:ext cx="2661499" cy="757923"/>
           </a:xfrm>
         </p:spPr>
         <p:txBody>
@@ -1875,8 +1875,8 @@
         </p:nvSpPr>
         <p:spPr>
           <a:xfrm>
-            <a:off x="433344" y="2548566"/>
-            <a:ext cx="2661499" cy="3748557"/>
+            <a:off x="433344" y="2304437"/>
+            <a:ext cx="2661499" cy="3389480"/>
           </a:xfrm>
         </p:spPr>
         <p:txBody>
@@ -1932,8 +1932,8 @@
         </p:nvSpPr>
         <p:spPr>
           <a:xfrm>
-            <a:off x="3184952" y="1710350"/>
-            <a:ext cx="2674606" cy="838216"/>
+            <a:off x="3184952" y="1546514"/>
+            <a:ext cx="2674606" cy="757923"/>
           </a:xfrm>
         </p:spPr>
         <p:txBody>
@@ -1997,8 +1997,8 @@
         </p:nvSpPr>
         <p:spPr>
           <a:xfrm>
-            <a:off x="3184952" y="2548566"/>
-            <a:ext cx="2674606" cy="3748557"/>
+            <a:off x="3184952" y="2304437"/>
+            <a:ext cx="2674606" cy="3389480"/>
           </a:xfrm>
         </p:spPr>
         <p:txBody>
@@ -2059,7 +2059,7 @@
           <a:p>
             <a:fld id="{3F6A62D9-65B6-4743-B091-3F210FFD6B26}" type="datetimeFigureOut">
               <a:rPr lang="en-US" smtClean="0"/>
-              <a:t>12/14/20</a:t>
+              <a:t>8/17/21</a:t>
             </a:fld>
             <a:endParaRPr lang="en-US"/>
           </a:p>
@@ -2110,7 +2110,7 @@
     </p:spTree>
     <p:extLst>
       <p:ext uri="{BB962C8B-B14F-4D97-AF65-F5344CB8AC3E}">
-        <p14:creationId xmlns:p14="http://schemas.microsoft.com/office/powerpoint/2010/main" val="709258004"/>
+        <p14:creationId xmlns:p14="http://schemas.microsoft.com/office/powerpoint/2010/main" val="3461308158"/>
       </p:ext>
     </p:extLst>
   </p:cSld>
@@ -2177,7 +2177,7 @@
           <a:p>
             <a:fld id="{3F6A62D9-65B6-4743-B091-3F210FFD6B26}" type="datetimeFigureOut">
               <a:rPr lang="en-US" smtClean="0"/>
-              <a:t>12/14/20</a:t>
+              <a:t>8/17/21</a:t>
             </a:fld>
             <a:endParaRPr lang="en-US"/>
           </a:p>
@@ -2228,7 +2228,7 @@
     </p:spTree>
     <p:extLst>
       <p:ext uri="{BB962C8B-B14F-4D97-AF65-F5344CB8AC3E}">
-        <p14:creationId xmlns:p14="http://schemas.microsoft.com/office/powerpoint/2010/main" val="1253832841"/>
+        <p14:creationId xmlns:p14="http://schemas.microsoft.com/office/powerpoint/2010/main" val="515300044"/>
       </p:ext>
     </p:extLst>
   </p:cSld>
@@ -2272,7 +2272,7 @@
           <a:p>
             <a:fld id="{3F6A62D9-65B6-4743-B091-3F210FFD6B26}" type="datetimeFigureOut">
               <a:rPr lang="en-US" smtClean="0"/>
-              <a:t>12/14/20</a:t>
+              <a:t>8/17/21</a:t>
             </a:fld>
             <a:endParaRPr lang="en-US"/>
           </a:p>
@@ -2323,7 +2323,7 @@
     </p:spTree>
     <p:extLst>
       <p:ext uri="{BB962C8B-B14F-4D97-AF65-F5344CB8AC3E}">
-        <p14:creationId xmlns:p14="http://schemas.microsoft.com/office/powerpoint/2010/main" val="3706121736"/>
+        <p14:creationId xmlns:p14="http://schemas.microsoft.com/office/powerpoint/2010/main" val="503087150"/>
       </p:ext>
     </p:extLst>
   </p:cSld>
@@ -2362,8 +2362,8 @@
         </p:nvSpPr>
         <p:spPr>
           <a:xfrm>
-            <a:off x="433344" y="465138"/>
-            <a:ext cx="2029096" cy="1627981"/>
+            <a:off x="433344" y="420582"/>
+            <a:ext cx="2029096" cy="1472036"/>
           </a:xfrm>
         </p:spPr>
         <p:txBody>
@@ -2394,8 +2394,8 @@
         </p:nvSpPr>
         <p:spPr>
           <a:xfrm>
-            <a:off x="2674606" y="1004569"/>
-            <a:ext cx="3184952" cy="4958237"/>
+            <a:off x="2674606" y="908341"/>
+            <a:ext cx="3184952" cy="4483284"/>
           </a:xfrm>
         </p:spPr>
         <p:txBody>
@@ -2479,8 +2479,8 @@
         </p:nvSpPr>
         <p:spPr>
           <a:xfrm>
-            <a:off x="433344" y="2093119"/>
-            <a:ext cx="2029096" cy="3877762"/>
+            <a:off x="433344" y="1892618"/>
+            <a:ext cx="2029096" cy="3506308"/>
           </a:xfrm>
         </p:spPr>
         <p:txBody>
@@ -2549,7 +2549,7 @@
           <a:p>
             <a:fld id="{3F6A62D9-65B6-4743-B091-3F210FFD6B26}" type="datetimeFigureOut">
               <a:rPr lang="en-US" smtClean="0"/>
-              <a:t>12/14/20</a:t>
+              <a:t>8/17/21</a:t>
             </a:fld>
             <a:endParaRPr lang="en-US"/>
           </a:p>
@@ -2600,7 +2600,7 @@
     </p:spTree>
     <p:extLst>
       <p:ext uri="{BB962C8B-B14F-4D97-AF65-F5344CB8AC3E}">
-        <p14:creationId xmlns:p14="http://schemas.microsoft.com/office/powerpoint/2010/main" val="3035277638"/>
+        <p14:creationId xmlns:p14="http://schemas.microsoft.com/office/powerpoint/2010/main" val="1458838898"/>
       </p:ext>
     </p:extLst>
   </p:cSld>
@@ -2639,8 +2639,8 @@
         </p:nvSpPr>
         <p:spPr>
           <a:xfrm>
-            <a:off x="433344" y="465138"/>
-            <a:ext cx="2029096" cy="1627981"/>
+            <a:off x="433344" y="420582"/>
+            <a:ext cx="2029096" cy="1472036"/>
           </a:xfrm>
         </p:spPr>
         <p:txBody>
@@ -2671,8 +2671,8 @@
         </p:nvSpPr>
         <p:spPr>
           <a:xfrm>
-            <a:off x="2674606" y="1004569"/>
-            <a:ext cx="3184952" cy="4958237"/>
+            <a:off x="2674606" y="908341"/>
+            <a:ext cx="3184952" cy="4483284"/>
           </a:xfrm>
         </p:spPr>
         <p:txBody>
@@ -2736,8 +2736,8 @@
         </p:nvSpPr>
         <p:spPr>
           <a:xfrm>
-            <a:off x="433344" y="2093119"/>
-            <a:ext cx="2029096" cy="3877762"/>
+            <a:off x="433344" y="1892618"/>
+            <a:ext cx="2029096" cy="3506308"/>
           </a:xfrm>
         </p:spPr>
         <p:txBody>
@@ -2806,7 +2806,7 @@
           <a:p>
             <a:fld id="{3F6A62D9-65B6-4743-B091-3F210FFD6B26}" type="datetimeFigureOut">
               <a:rPr lang="en-US" smtClean="0"/>
-              <a:t>12/14/20</a:t>
+              <a:t>8/17/21</a:t>
             </a:fld>
             <a:endParaRPr lang="en-US"/>
           </a:p>
@@ -2857,7 +2857,7 @@
     </p:spTree>
     <p:extLst>
       <p:ext uri="{BB962C8B-B14F-4D97-AF65-F5344CB8AC3E}">
-        <p14:creationId xmlns:p14="http://schemas.microsoft.com/office/powerpoint/2010/main" val="718646660"/>
+        <p14:creationId xmlns:p14="http://schemas.microsoft.com/office/powerpoint/2010/main" val="2687918306"/>
       </p:ext>
     </p:extLst>
   </p:cSld>
@@ -2901,8 +2901,8 @@
         </p:nvSpPr>
         <p:spPr>
           <a:xfrm>
-            <a:off x="432525" y="371466"/>
-            <a:ext cx="5426214" cy="1348576"/>
+            <a:off x="432525" y="335883"/>
+            <a:ext cx="5426214" cy="1219395"/>
           </a:xfrm>
           <a:prstGeom prst="rect">
             <a:avLst/>
@@ -2934,8 +2934,8 @@
         </p:nvSpPr>
         <p:spPr>
           <a:xfrm>
-            <a:off x="432525" y="1857320"/>
-            <a:ext cx="5426214" cy="4426882"/>
+            <a:off x="432525" y="1679406"/>
+            <a:ext cx="5426214" cy="4002828"/>
           </a:xfrm>
           <a:prstGeom prst="rect">
             <a:avLst/>
@@ -2996,8 +2996,8 @@
         </p:nvSpPr>
         <p:spPr>
           <a:xfrm>
-            <a:off x="432524" y="6466705"/>
-            <a:ext cx="1415534" cy="371464"/>
+            <a:off x="432524" y="5847255"/>
+            <a:ext cx="1415534" cy="335881"/>
           </a:xfrm>
           <a:prstGeom prst="rect">
             <a:avLst/>
@@ -3019,7 +3019,7 @@
           <a:p>
             <a:fld id="{3F6A62D9-65B6-4743-B091-3F210FFD6B26}" type="datetimeFigureOut">
               <a:rPr lang="en-US" smtClean="0"/>
-              <a:t>12/14/20</a:t>
+              <a:t>8/17/21</a:t>
             </a:fld>
             <a:endParaRPr lang="en-US"/>
           </a:p>
@@ -3037,8 +3037,8 @@
         </p:nvSpPr>
         <p:spPr>
           <a:xfrm>
-            <a:off x="2083981" y="6466705"/>
-            <a:ext cx="2123301" cy="371464"/>
+            <a:off x="2083981" y="5847255"/>
+            <a:ext cx="2123301" cy="335881"/>
           </a:xfrm>
           <a:prstGeom prst="rect">
             <a:avLst/>
@@ -3074,8 +3074,8 @@
         </p:nvSpPr>
         <p:spPr>
           <a:xfrm>
-            <a:off x="4443205" y="6466705"/>
-            <a:ext cx="1415534" cy="371464"/>
+            <a:off x="4443205" y="5847255"/>
+            <a:ext cx="1415534" cy="335881"/>
           </a:xfrm>
           <a:prstGeom prst="rect">
             <a:avLst/>
@@ -3106,23 +3106,23 @@
     </p:spTree>
     <p:extLst>
       <p:ext uri="{BB962C8B-B14F-4D97-AF65-F5344CB8AC3E}">
-        <p14:creationId xmlns:p14="http://schemas.microsoft.com/office/powerpoint/2010/main" val="803208346"/>
+        <p14:creationId xmlns:p14="http://schemas.microsoft.com/office/powerpoint/2010/main" val="4069398579"/>
       </p:ext>
     </p:extLst>
   </p:cSld>
   <p:clrMap bg1="lt1" tx1="dk1" bg2="lt2" tx2="dk2" accent1="accent1" accent2="accent2" accent3="accent3" accent4="accent4" accent5="accent5" accent6="accent6" hlink="hlink" folHlink="folHlink"/>
   <p:sldLayoutIdLst>
-    <p:sldLayoutId id="2147483805" r:id="rId1"/>
-    <p:sldLayoutId id="2147483806" r:id="rId2"/>
-    <p:sldLayoutId id="2147483807" r:id="rId3"/>
-    <p:sldLayoutId id="2147483808" r:id="rId4"/>
-    <p:sldLayoutId id="2147483809" r:id="rId5"/>
-    <p:sldLayoutId id="2147483810" r:id="rId6"/>
-    <p:sldLayoutId id="2147483811" r:id="rId7"/>
-    <p:sldLayoutId id="2147483812" r:id="rId8"/>
-    <p:sldLayoutId id="2147483813" r:id="rId9"/>
-    <p:sldLayoutId id="2147483814" r:id="rId10"/>
-    <p:sldLayoutId id="2147483815" r:id="rId11"/>
+    <p:sldLayoutId id="2147483841" r:id="rId1"/>
+    <p:sldLayoutId id="2147483842" r:id="rId2"/>
+    <p:sldLayoutId id="2147483843" r:id="rId3"/>
+    <p:sldLayoutId id="2147483844" r:id="rId4"/>
+    <p:sldLayoutId id="2147483845" r:id="rId5"/>
+    <p:sldLayoutId id="2147483846" r:id="rId6"/>
+    <p:sldLayoutId id="2147483847" r:id="rId7"/>
+    <p:sldLayoutId id="2147483848" r:id="rId8"/>
+    <p:sldLayoutId id="2147483849" r:id="rId9"/>
+    <p:sldLayoutId id="2147483850" r:id="rId10"/>
+    <p:sldLayoutId id="2147483851" r:id="rId11"/>
   </p:sldLayoutIdLst>
   <p:txStyles>
     <p:titleStyle>
@@ -3434,520 +3434,6 @@
       </p:grpSpPr>
       <p:grpSp>
         <p:nvGrpSpPr>
-          <p:cNvPr id="854" name="Group 853">
-            <a:extLst>
-              <a:ext uri="{FF2B5EF4-FFF2-40B4-BE49-F238E27FC236}">
-                <a16:creationId xmlns:a16="http://schemas.microsoft.com/office/drawing/2014/main" id="{2033AEBA-31FF-7948-BDDF-438D9280B07B}"/>
-              </a:ext>
-            </a:extLst>
-          </p:cNvPr>
-          <p:cNvGrpSpPr/>
-          <p:nvPr/>
-        </p:nvGrpSpPr>
-        <p:grpSpPr>
-          <a:xfrm>
-            <a:off x="1774278" y="356924"/>
-            <a:ext cx="4271548" cy="123318"/>
-            <a:chOff x="2796526" y="680187"/>
-            <a:chExt cx="6830098" cy="197183"/>
-          </a:xfrm>
-        </p:grpSpPr>
-        <p:sp>
-          <p:nvSpPr>
-            <p:cNvPr id="4" name="Right Arrow 3">
-              <a:extLst>
-                <a:ext uri="{FF2B5EF4-FFF2-40B4-BE49-F238E27FC236}">
-                  <a16:creationId xmlns:a16="http://schemas.microsoft.com/office/drawing/2014/main" id="{106B2A51-3082-5144-BD0B-989DA03EFEE3}"/>
-                </a:ext>
-              </a:extLst>
-            </p:cNvPr>
-            <p:cNvSpPr/>
-            <p:nvPr/>
-          </p:nvSpPr>
-          <p:spPr>
-            <a:xfrm>
-              <a:off x="3668190" y="680187"/>
-              <a:ext cx="1397722" cy="197183"/>
-            </a:xfrm>
-            <a:prstGeom prst="rightArrow">
-              <a:avLst>
-                <a:gd name="adj1" fmla="val 100000"/>
-                <a:gd name="adj2" fmla="val 50000"/>
-              </a:avLst>
-            </a:prstGeom>
-            <a:solidFill>
-              <a:schemeClr val="bg2">
-                <a:lumMod val="50000"/>
-              </a:schemeClr>
-            </a:solidFill>
-            <a:ln>
-              <a:solidFill>
-                <a:schemeClr val="tx1"/>
-              </a:solidFill>
-            </a:ln>
-          </p:spPr>
-          <p:style>
-            <a:lnRef idx="2">
-              <a:schemeClr val="accent1">
-                <a:shade val="50000"/>
-              </a:schemeClr>
-            </a:lnRef>
-            <a:fillRef idx="1">
-              <a:schemeClr val="accent1"/>
-            </a:fillRef>
-            <a:effectRef idx="0">
-              <a:schemeClr val="accent1"/>
-            </a:effectRef>
-            <a:fontRef idx="minor">
-              <a:schemeClr val="lt1"/>
-            </a:fontRef>
-          </p:style>
-          <p:txBody>
-            <a:bodyPr rtlCol="0" anchor="ctr"/>
-            <a:lstStyle/>
-            <a:p>
-              <a:pPr algn="ctr"/>
-              <a:r>
-                <a:rPr lang="en-US" sz="751" i="1" dirty="0"/>
-                <a:t>2</a:t>
-              </a:r>
-            </a:p>
-          </p:txBody>
-        </p:sp>
-        <p:sp>
-          <p:nvSpPr>
-            <p:cNvPr id="8" name="Right Arrow 7">
-              <a:extLst>
-                <a:ext uri="{FF2B5EF4-FFF2-40B4-BE49-F238E27FC236}">
-                  <a16:creationId xmlns:a16="http://schemas.microsoft.com/office/drawing/2014/main" id="{7CE7EC2F-FA7C-6341-A24B-8CABD655F522}"/>
-                </a:ext>
-              </a:extLst>
-            </p:cNvPr>
-            <p:cNvSpPr/>
-            <p:nvPr/>
-          </p:nvSpPr>
-          <p:spPr>
-            <a:xfrm>
-              <a:off x="5932725" y="680187"/>
-              <a:ext cx="237454" cy="197183"/>
-            </a:xfrm>
-            <a:prstGeom prst="rightArrow">
-              <a:avLst>
-                <a:gd name="adj1" fmla="val 100000"/>
-                <a:gd name="adj2" fmla="val 50000"/>
-              </a:avLst>
-            </a:prstGeom>
-            <a:solidFill>
-              <a:schemeClr val="accent1">
-                <a:lumMod val="40000"/>
-                <a:lumOff val="60000"/>
-              </a:schemeClr>
-            </a:solidFill>
-            <a:ln>
-              <a:solidFill>
-                <a:schemeClr val="tx1"/>
-              </a:solidFill>
-            </a:ln>
-          </p:spPr>
-          <p:style>
-            <a:lnRef idx="2">
-              <a:schemeClr val="accent1">
-                <a:shade val="50000"/>
-              </a:schemeClr>
-            </a:lnRef>
-            <a:fillRef idx="1">
-              <a:schemeClr val="accent1"/>
-            </a:fillRef>
-            <a:effectRef idx="0">
-              <a:schemeClr val="accent1"/>
-            </a:effectRef>
-            <a:fontRef idx="minor">
-              <a:schemeClr val="lt1"/>
-            </a:fontRef>
-          </p:style>
-          <p:txBody>
-            <a:bodyPr rtlCol="0" anchor="ctr"/>
-            <a:lstStyle/>
-            <a:p>
-              <a:pPr algn="ctr"/>
-              <a:endParaRPr lang="en-US" sz="704" dirty="0"/>
-            </a:p>
-          </p:txBody>
-        </p:sp>
-        <p:sp>
-          <p:nvSpPr>
-            <p:cNvPr id="9" name="Right Arrow 8">
-              <a:extLst>
-                <a:ext uri="{FF2B5EF4-FFF2-40B4-BE49-F238E27FC236}">
-                  <a16:creationId xmlns:a16="http://schemas.microsoft.com/office/drawing/2014/main" id="{AAA6F6AA-4505-0640-AEE8-6CDF75342E3C}"/>
-                </a:ext>
-              </a:extLst>
-            </p:cNvPr>
-            <p:cNvSpPr/>
-            <p:nvPr/>
-          </p:nvSpPr>
-          <p:spPr>
-            <a:xfrm>
-              <a:off x="5089062" y="680187"/>
-              <a:ext cx="843662" cy="197183"/>
-            </a:xfrm>
-            <a:prstGeom prst="rightArrow">
-              <a:avLst>
-                <a:gd name="adj1" fmla="val 100000"/>
-                <a:gd name="adj2" fmla="val 50000"/>
-              </a:avLst>
-            </a:prstGeom>
-            <a:solidFill>
-              <a:schemeClr val="bg2">
-                <a:lumMod val="50000"/>
-              </a:schemeClr>
-            </a:solidFill>
-            <a:ln w="28575">
-              <a:solidFill>
-                <a:schemeClr val="tx1"/>
-              </a:solidFill>
-            </a:ln>
-          </p:spPr>
-          <p:style>
-            <a:lnRef idx="2">
-              <a:schemeClr val="accent1">
-                <a:shade val="50000"/>
-              </a:schemeClr>
-            </a:lnRef>
-            <a:fillRef idx="1">
-              <a:schemeClr val="accent1"/>
-            </a:fillRef>
-            <a:effectRef idx="0">
-              <a:schemeClr val="accent1"/>
-            </a:effectRef>
-            <a:fontRef idx="minor">
-              <a:schemeClr val="lt1"/>
-            </a:fontRef>
-          </p:style>
-          <p:txBody>
-            <a:bodyPr rtlCol="0" anchor="ctr"/>
-            <a:lstStyle/>
-            <a:p>
-              <a:pPr algn="ctr"/>
-              <a:r>
-                <a:rPr lang="en-US" sz="751" i="1" dirty="0"/>
-                <a:t>3</a:t>
-              </a:r>
-            </a:p>
-          </p:txBody>
-        </p:sp>
-        <p:sp>
-          <p:nvSpPr>
-            <p:cNvPr id="10" name="Right Arrow 9">
-              <a:extLst>
-                <a:ext uri="{FF2B5EF4-FFF2-40B4-BE49-F238E27FC236}">
-                  <a16:creationId xmlns:a16="http://schemas.microsoft.com/office/drawing/2014/main" id="{4F640832-2B63-9245-8258-F41CABA02316}"/>
-                </a:ext>
-              </a:extLst>
-            </p:cNvPr>
-            <p:cNvSpPr/>
-            <p:nvPr/>
-          </p:nvSpPr>
-          <p:spPr>
-            <a:xfrm>
-              <a:off x="6170179" y="680187"/>
-              <a:ext cx="1071586" cy="197183"/>
-            </a:xfrm>
-            <a:prstGeom prst="rightArrow">
-              <a:avLst>
-                <a:gd name="adj1" fmla="val 100000"/>
-                <a:gd name="adj2" fmla="val 50000"/>
-              </a:avLst>
-            </a:prstGeom>
-            <a:solidFill>
-              <a:srgbClr val="FECDAD"/>
-            </a:solidFill>
-            <a:ln>
-              <a:solidFill>
-                <a:schemeClr val="tx1"/>
-              </a:solidFill>
-            </a:ln>
-          </p:spPr>
-          <p:style>
-            <a:lnRef idx="2">
-              <a:schemeClr val="accent1">
-                <a:shade val="50000"/>
-              </a:schemeClr>
-            </a:lnRef>
-            <a:fillRef idx="1">
-              <a:schemeClr val="accent1"/>
-            </a:fillRef>
-            <a:effectRef idx="0">
-              <a:schemeClr val="accent1"/>
-            </a:effectRef>
-            <a:fontRef idx="minor">
-              <a:schemeClr val="lt1"/>
-            </a:fontRef>
-          </p:style>
-          <p:txBody>
-            <a:bodyPr rtlCol="0" anchor="ctr"/>
-            <a:lstStyle/>
-            <a:p>
-              <a:pPr lvl="0" algn="ctr"/>
-              <a:r>
-                <a:rPr lang="en-US" sz="751" i="1" dirty="0">
-                  <a:solidFill>
-                    <a:prstClr val="black"/>
-                  </a:solidFill>
-                </a:rPr>
-                <a:t>4</a:t>
-              </a:r>
-            </a:p>
-          </p:txBody>
-        </p:sp>
-        <p:sp>
-          <p:nvSpPr>
-            <p:cNvPr id="11" name="Right Arrow 10">
-              <a:extLst>
-                <a:ext uri="{FF2B5EF4-FFF2-40B4-BE49-F238E27FC236}">
-                  <a16:creationId xmlns:a16="http://schemas.microsoft.com/office/drawing/2014/main" id="{ADA63BF1-DFE6-7940-B9FC-AE2E034E1BB2}"/>
-                </a:ext>
-              </a:extLst>
-            </p:cNvPr>
-            <p:cNvSpPr/>
-            <p:nvPr/>
-          </p:nvSpPr>
-          <p:spPr>
-            <a:xfrm>
-              <a:off x="7251294" y="680187"/>
-              <a:ext cx="684566" cy="197183"/>
-            </a:xfrm>
-            <a:prstGeom prst="rightArrow">
-              <a:avLst>
-                <a:gd name="adj1" fmla="val 100000"/>
-                <a:gd name="adj2" fmla="val 50000"/>
-              </a:avLst>
-            </a:prstGeom>
-            <a:solidFill>
-              <a:srgbClr val="FFB9B7"/>
-            </a:solidFill>
-            <a:ln w="28575">
-              <a:solidFill>
-                <a:schemeClr val="tx1"/>
-              </a:solidFill>
-            </a:ln>
-          </p:spPr>
-          <p:style>
-            <a:lnRef idx="2">
-              <a:schemeClr val="accent1">
-                <a:shade val="50000"/>
-              </a:schemeClr>
-            </a:lnRef>
-            <a:fillRef idx="1">
-              <a:schemeClr val="accent1"/>
-            </a:fillRef>
-            <a:effectRef idx="0">
-              <a:schemeClr val="accent1"/>
-            </a:effectRef>
-            <a:fontRef idx="minor">
-              <a:schemeClr val="lt1"/>
-            </a:fontRef>
-          </p:style>
-          <p:txBody>
-            <a:bodyPr rtlCol="0" anchor="ctr"/>
-            <a:lstStyle/>
-            <a:p>
-              <a:pPr algn="ctr"/>
-              <a:r>
-                <a:rPr lang="en-US" sz="751" i="1" dirty="0">
-                  <a:solidFill>
-                    <a:schemeClr val="tx1"/>
-                  </a:solidFill>
-                </a:rPr>
-                <a:t>4</a:t>
-              </a:r>
-            </a:p>
-          </p:txBody>
-        </p:sp>
-        <p:sp>
-          <p:nvSpPr>
-            <p:cNvPr id="12" name="Right Arrow 11">
-              <a:extLst>
-                <a:ext uri="{FF2B5EF4-FFF2-40B4-BE49-F238E27FC236}">
-                  <a16:creationId xmlns:a16="http://schemas.microsoft.com/office/drawing/2014/main" id="{D89DFE37-B310-5D4D-AA43-F6B135620427}"/>
-                </a:ext>
-              </a:extLst>
-            </p:cNvPr>
-            <p:cNvSpPr/>
-            <p:nvPr/>
-          </p:nvSpPr>
-          <p:spPr>
-            <a:xfrm>
-              <a:off x="7945391" y="680187"/>
-              <a:ext cx="467697" cy="197183"/>
-            </a:xfrm>
-            <a:prstGeom prst="rightArrow">
-              <a:avLst>
-                <a:gd name="adj1" fmla="val 100000"/>
-                <a:gd name="adj2" fmla="val 50000"/>
-              </a:avLst>
-            </a:prstGeom>
-            <a:solidFill>
-              <a:schemeClr val="accent1">
-                <a:lumMod val="40000"/>
-                <a:lumOff val="60000"/>
-              </a:schemeClr>
-            </a:solidFill>
-            <a:ln>
-              <a:solidFill>
-                <a:schemeClr val="tx1"/>
-              </a:solidFill>
-            </a:ln>
-          </p:spPr>
-          <p:style>
-            <a:lnRef idx="2">
-              <a:schemeClr val="accent1">
-                <a:shade val="50000"/>
-              </a:schemeClr>
-            </a:lnRef>
-            <a:fillRef idx="1">
-              <a:schemeClr val="accent1"/>
-            </a:fillRef>
-            <a:effectRef idx="0">
-              <a:schemeClr val="accent1"/>
-            </a:effectRef>
-            <a:fontRef idx="minor">
-              <a:schemeClr val="lt1"/>
-            </a:fontRef>
-          </p:style>
-          <p:txBody>
-            <a:bodyPr rtlCol="0" anchor="ctr"/>
-            <a:lstStyle/>
-            <a:p>
-              <a:pPr algn="ctr"/>
-              <a:endParaRPr lang="en-US" sz="704"/>
-            </a:p>
-          </p:txBody>
-        </p:sp>
-        <p:sp>
-          <p:nvSpPr>
-            <p:cNvPr id="13" name="Right Arrow 12">
-              <a:extLst>
-                <a:ext uri="{FF2B5EF4-FFF2-40B4-BE49-F238E27FC236}">
-                  <a16:creationId xmlns:a16="http://schemas.microsoft.com/office/drawing/2014/main" id="{B609A91A-3D86-D247-B424-17C99A042DE5}"/>
-                </a:ext>
-              </a:extLst>
-            </p:cNvPr>
-            <p:cNvSpPr/>
-            <p:nvPr/>
-          </p:nvSpPr>
-          <p:spPr>
-            <a:xfrm>
-              <a:off x="8830675" y="680187"/>
-              <a:ext cx="795949" cy="197183"/>
-            </a:xfrm>
-            <a:prstGeom prst="rightArrow">
-              <a:avLst>
-                <a:gd name="adj1" fmla="val 100000"/>
-                <a:gd name="adj2" fmla="val 50000"/>
-              </a:avLst>
-            </a:prstGeom>
-            <a:solidFill>
-              <a:schemeClr val="bg2"/>
-            </a:solidFill>
-            <a:ln w="28575">
-              <a:solidFill>
-                <a:schemeClr val="tx1"/>
-              </a:solidFill>
-            </a:ln>
-          </p:spPr>
-          <p:style>
-            <a:lnRef idx="2">
-              <a:schemeClr val="accent1">
-                <a:shade val="50000"/>
-              </a:schemeClr>
-            </a:lnRef>
-            <a:fillRef idx="1">
-              <a:schemeClr val="accent1"/>
-            </a:fillRef>
-            <a:effectRef idx="0">
-              <a:schemeClr val="accent1"/>
-            </a:effectRef>
-            <a:fontRef idx="minor">
-              <a:schemeClr val="lt1"/>
-            </a:fontRef>
-          </p:style>
-          <p:txBody>
-            <a:bodyPr rtlCol="0" anchor="ctr"/>
-            <a:lstStyle/>
-            <a:p>
-              <a:pPr algn="ctr"/>
-              <a:endParaRPr lang="en-US" sz="704"/>
-            </a:p>
-          </p:txBody>
-        </p:sp>
-        <p:sp>
-          <p:nvSpPr>
-            <p:cNvPr id="14" name="Right Arrow 13">
-              <a:extLst>
-                <a:ext uri="{FF2B5EF4-FFF2-40B4-BE49-F238E27FC236}">
-                  <a16:creationId xmlns:a16="http://schemas.microsoft.com/office/drawing/2014/main" id="{109379A3-BF94-6B4B-96B4-4AB40678588B}"/>
-                </a:ext>
-              </a:extLst>
-            </p:cNvPr>
-            <p:cNvSpPr/>
-            <p:nvPr/>
-          </p:nvSpPr>
-          <p:spPr>
-            <a:xfrm flipH="1">
-              <a:off x="2796526" y="680187"/>
-              <a:ext cx="776088" cy="197183"/>
-            </a:xfrm>
-            <a:prstGeom prst="rightArrow">
-              <a:avLst>
-                <a:gd name="adj1" fmla="val 100000"/>
-                <a:gd name="adj2" fmla="val 50000"/>
-              </a:avLst>
-            </a:prstGeom>
-            <a:solidFill>
-              <a:schemeClr val="bg2"/>
-            </a:solidFill>
-            <a:ln>
-              <a:solidFill>
-                <a:schemeClr val="tx1"/>
-              </a:solidFill>
-            </a:ln>
-          </p:spPr>
-          <p:style>
-            <a:lnRef idx="2">
-              <a:schemeClr val="accent1">
-                <a:shade val="50000"/>
-              </a:schemeClr>
-            </a:lnRef>
-            <a:fillRef idx="1">
-              <a:schemeClr val="accent1"/>
-            </a:fillRef>
-            <a:effectRef idx="0">
-              <a:schemeClr val="accent1"/>
-            </a:effectRef>
-            <a:fontRef idx="minor">
-              <a:schemeClr val="lt1"/>
-            </a:fontRef>
-          </p:style>
-          <p:txBody>
-            <a:bodyPr rtlCol="0" anchor="ctr"/>
-            <a:lstStyle/>
-            <a:p>
-              <a:pPr algn="ctr"/>
-              <a:r>
-                <a:rPr lang="en-US" sz="751" i="1" dirty="0">
-                  <a:solidFill>
-                    <a:schemeClr val="tx1"/>
-                  </a:solidFill>
-                </a:rPr>
-                <a:t>1</a:t>
-              </a:r>
-            </a:p>
-          </p:txBody>
-        </p:sp>
-      </p:grpSp>
-      <p:grpSp>
-        <p:nvGrpSpPr>
           <p:cNvPr id="860" name="Group 859">
             <a:extLst>
               <a:ext uri="{FF2B5EF4-FFF2-40B4-BE49-F238E27FC236}">
@@ -3960,7 +3446,7 @@
         </p:nvGrpSpPr>
         <p:grpSpPr>
           <a:xfrm>
-            <a:off x="584209" y="2454783"/>
+            <a:off x="584212" y="1797860"/>
             <a:ext cx="4585053" cy="123318"/>
             <a:chOff x="912682" y="5732888"/>
             <a:chExt cx="7331385" cy="197183"/>
@@ -3968,7 +3454,7 @@
         </p:grpSpPr>
         <p:sp>
           <p:nvSpPr>
-            <p:cNvPr id="185" name="Right Arrow 184">
+            <p:cNvPr id="185" name="Right Arrow 184" descr="Opf00431">
               <a:extLst>
                 <a:ext uri="{FF2B5EF4-FFF2-40B4-BE49-F238E27FC236}">
                   <a16:creationId xmlns:a16="http://schemas.microsoft.com/office/drawing/2014/main" id="{39F26A7E-BF72-1C4F-8EAD-BBC0775F801E}"/>
@@ -4023,14 +3509,14 @@
               <a:pPr algn="ctr"/>
               <a:r>
                 <a:rPr lang="en-US" sz="751" i="1" dirty="0"/>
-                <a:t>9</a:t>
+                <a:t>8</a:t>
               </a:r>
             </a:p>
           </p:txBody>
         </p:sp>
         <p:sp>
           <p:nvSpPr>
-            <p:cNvPr id="186" name="Right Arrow 185">
+            <p:cNvPr id="186" name="Right Arrow 185" descr="Opf15294">
               <a:extLst>
                 <a:ext uri="{FF2B5EF4-FFF2-40B4-BE49-F238E27FC236}">
                   <a16:creationId xmlns:a16="http://schemas.microsoft.com/office/drawing/2014/main" id="{94DEFCC6-43DD-384F-8FCC-6EB13881F93E}"/>
@@ -4052,7 +3538,10 @@
               </a:avLst>
             </a:prstGeom>
             <a:solidFill>
-              <a:schemeClr val="bg2"/>
+              <a:schemeClr val="accent1">
+                <a:lumMod val="40000"/>
+                <a:lumOff val="60000"/>
+              </a:schemeClr>
             </a:solidFill>
             <a:ln w="28575">
               <a:solidFill>
@@ -4087,14 +3576,14 @@
                     <a:schemeClr val="tx1"/>
                   </a:solidFill>
                 </a:rPr>
-                <a:t>11</a:t>
+                <a:t>10</a:t>
               </a:r>
             </a:p>
           </p:txBody>
         </p:sp>
         <p:sp>
           <p:nvSpPr>
-            <p:cNvPr id="187" name="Right Arrow 186">
+            <p:cNvPr id="187" name="Right Arrow 186" descr="Opf09589">
               <a:extLst>
                 <a:ext uri="{FF2B5EF4-FFF2-40B4-BE49-F238E27FC236}">
                   <a16:creationId xmlns:a16="http://schemas.microsoft.com/office/drawing/2014/main" id="{9FF6AB23-86A0-9A46-BB0D-525544DBAEF1}"/>
@@ -4149,7 +3638,7 @@
               <a:pPr algn="ctr"/>
               <a:r>
                 <a:rPr lang="en-US" sz="751" i="1" dirty="0"/>
-                <a:t>10</a:t>
+                <a:t>9</a:t>
               </a:r>
             </a:p>
           </p:txBody>
@@ -4270,14 +3759,14 @@
                     <a:schemeClr val="tx1"/>
                   </a:solidFill>
                 </a:rPr>
-                <a:t>5</a:t>
+                <a:t>4</a:t>
               </a:r>
             </a:p>
           </p:txBody>
         </p:sp>
         <p:sp>
           <p:nvSpPr>
-            <p:cNvPr id="190" name="Right Arrow 189">
+            <p:cNvPr id="190" name="Right Arrow 189" descr="Opf14773">
               <a:extLst>
                 <a:ext uri="{FF2B5EF4-FFF2-40B4-BE49-F238E27FC236}">
                   <a16:creationId xmlns:a16="http://schemas.microsoft.com/office/drawing/2014/main" id="{A4CF2925-7475-0A48-95F2-F329661E4F84}"/>
@@ -4299,10 +3788,7 @@
               </a:avLst>
             </a:prstGeom>
             <a:solidFill>
-              <a:schemeClr val="accent1">
-                <a:lumMod val="40000"/>
-                <a:lumOff val="60000"/>
-              </a:schemeClr>
+              <a:schemeClr val="bg2"/>
             </a:solidFill>
             <a:ln w="28575">
               <a:solidFill>
@@ -4337,7 +3823,7 @@
                     <a:schemeClr val="tx1"/>
                   </a:solidFill>
                 </a:rPr>
-                <a:t>12</a:t>
+                <a:t>11</a:t>
               </a:r>
             </a:p>
           </p:txBody>
@@ -4401,14 +3887,14 @@
                     <a:schemeClr val="tx1"/>
                   </a:solidFill>
                 </a:rPr>
-                <a:t>6</a:t>
+                <a:t>5</a:t>
               </a:r>
             </a:p>
           </p:txBody>
         </p:sp>
         <p:sp>
           <p:nvSpPr>
-            <p:cNvPr id="204" name="Right Arrow 203">
+            <p:cNvPr id="204" name="Right Arrow 203" descr="Opf01765">
               <a:extLst>
                 <a:ext uri="{FF2B5EF4-FFF2-40B4-BE49-F238E27FC236}">
                   <a16:creationId xmlns:a16="http://schemas.microsoft.com/office/drawing/2014/main" id="{D6681E39-2668-0E48-AC36-166902A242AB}"/>
@@ -4465,7 +3951,7 @@
                     <a:schemeClr val="tx1"/>
                   </a:solidFill>
                 </a:rPr>
-                <a:t>8</a:t>
+                <a:t>7</a:t>
               </a:r>
             </a:p>
           </p:txBody>
@@ -4485,7 +3971,7 @@
         </p:nvGrpSpPr>
         <p:grpSpPr>
           <a:xfrm>
-            <a:off x="1715566" y="4028178"/>
+            <a:off x="1715569" y="3371258"/>
             <a:ext cx="4291153" cy="127571"/>
             <a:chOff x="2721695" y="8252513"/>
             <a:chExt cx="6861446" cy="203983"/>
@@ -4493,7 +3979,7 @@
         </p:grpSpPr>
         <p:sp>
           <p:nvSpPr>
-            <p:cNvPr id="222" name="Right Arrow 221">
+            <p:cNvPr id="222" name="Right Arrow 221" descr="Opf01209">
               <a:extLst>
                 <a:ext uri="{FF2B5EF4-FFF2-40B4-BE49-F238E27FC236}">
                   <a16:creationId xmlns:a16="http://schemas.microsoft.com/office/drawing/2014/main" id="{5F38EF72-FFAF-1049-A1CA-60E7A222CA69}"/>
@@ -4548,14 +4034,14 @@
               <a:pPr algn="ctr"/>
               <a:r>
                 <a:rPr lang="en-US" sz="751" i="1" dirty="0"/>
-                <a:t>13</a:t>
+                <a:t>12</a:t>
               </a:r>
             </a:p>
           </p:txBody>
         </p:sp>
         <p:sp>
           <p:nvSpPr>
-            <p:cNvPr id="223" name="Right Arrow 222">
+            <p:cNvPr id="223" name="Right Arrow 222" descr="Opf04347">
               <a:extLst>
                 <a:ext uri="{FF2B5EF4-FFF2-40B4-BE49-F238E27FC236}">
                   <a16:creationId xmlns:a16="http://schemas.microsoft.com/office/drawing/2014/main" id="{F62884E0-0E59-0747-96A4-0F63AB8700FB}"/>
@@ -4615,14 +4101,14 @@
                     <a:schemeClr val="tx1"/>
                   </a:solidFill>
                 </a:rPr>
-                <a:t>15</a:t>
+                <a:t>14</a:t>
               </a:r>
             </a:p>
           </p:txBody>
         </p:sp>
         <p:sp>
           <p:nvSpPr>
-            <p:cNvPr id="224" name="Right Arrow 223">
+            <p:cNvPr id="224" name="Right Arrow 223" descr="Opf03138">
               <a:extLst>
                 <a:ext uri="{FF2B5EF4-FFF2-40B4-BE49-F238E27FC236}">
                   <a16:creationId xmlns:a16="http://schemas.microsoft.com/office/drawing/2014/main" id="{1E09BD25-D3D6-DB40-9538-469F9A200E0B}"/>
@@ -4677,7 +4163,7 @@
               <a:pPr algn="ctr"/>
               <a:r>
                 <a:rPr lang="en-US" sz="751" i="1" dirty="0"/>
-                <a:t>14</a:t>
+                <a:t>13</a:t>
               </a:r>
             </a:p>
           </p:txBody>
@@ -4741,7 +4227,7 @@
                     <a:prstClr val="black"/>
                   </a:solidFill>
                 </a:rPr>
-                <a:t>5</a:t>
+                <a:t>4</a:t>
               </a:r>
               <a:endParaRPr lang="en-US" sz="704" dirty="0">
                 <a:solidFill>
@@ -4810,7 +4296,7 @@
                     <a:prstClr val="black"/>
                   </a:solidFill>
                 </a:rPr>
-                <a:t>6</a:t>
+                <a:t>5</a:t>
               </a:r>
               <a:endParaRPr lang="en-US" sz="704" dirty="0"/>
             </a:p>
@@ -4818,7 +4304,7 @@
         </p:sp>
         <p:sp>
           <p:nvSpPr>
-            <p:cNvPr id="236" name="Right Arrow 235">
+            <p:cNvPr id="236" name="Right Arrow 235" descr="Opf04327">
               <a:extLst>
                 <a:ext uri="{FF2B5EF4-FFF2-40B4-BE49-F238E27FC236}">
                   <a16:creationId xmlns:a16="http://schemas.microsoft.com/office/drawing/2014/main" id="{0563F6BD-D3D5-1144-BD0A-1D9865A4219E}"/>
@@ -4875,7 +4361,7 @@
                     <a:prstClr val="black"/>
                   </a:solidFill>
                 </a:rPr>
-                <a:t>16</a:t>
+                <a:t>15</a:t>
               </a:r>
             </a:p>
           </p:txBody>
@@ -5003,599 +4489,6 @@
       </p:grpSp>
       <p:grpSp>
         <p:nvGrpSpPr>
-          <p:cNvPr id="855" name="Group 854">
-            <a:extLst>
-              <a:ext uri="{FF2B5EF4-FFF2-40B4-BE49-F238E27FC236}">
-                <a16:creationId xmlns:a16="http://schemas.microsoft.com/office/drawing/2014/main" id="{7689CC4A-8A99-B640-8A61-0057486A7EEB}"/>
-              </a:ext>
-            </a:extLst>
-          </p:cNvPr>
-          <p:cNvGrpSpPr/>
-          <p:nvPr/>
-        </p:nvGrpSpPr>
-        <p:grpSpPr>
-          <a:xfrm>
-            <a:off x="1798077" y="881389"/>
-            <a:ext cx="4258150" cy="123318"/>
-            <a:chOff x="2834579" y="1520064"/>
-            <a:chExt cx="6808675" cy="197183"/>
-          </a:xfrm>
-        </p:grpSpPr>
-        <p:sp>
-          <p:nvSpPr>
-            <p:cNvPr id="28" name="Right Arrow 27">
-              <a:extLst>
-                <a:ext uri="{FF2B5EF4-FFF2-40B4-BE49-F238E27FC236}">
-                  <a16:creationId xmlns:a16="http://schemas.microsoft.com/office/drawing/2014/main" id="{F43FCF8C-AC43-AA43-AAB4-64A04C467480}"/>
-                </a:ext>
-              </a:extLst>
-            </p:cNvPr>
-            <p:cNvSpPr/>
-            <p:nvPr/>
-          </p:nvSpPr>
-          <p:spPr>
-            <a:xfrm>
-              <a:off x="3668190" y="1520064"/>
-              <a:ext cx="1401769" cy="197183"/>
-            </a:xfrm>
-            <a:prstGeom prst="rightArrow">
-              <a:avLst>
-                <a:gd name="adj1" fmla="val 100000"/>
-                <a:gd name="adj2" fmla="val 50000"/>
-              </a:avLst>
-            </a:prstGeom>
-            <a:solidFill>
-              <a:schemeClr val="bg2">
-                <a:lumMod val="50000"/>
-              </a:schemeClr>
-            </a:solidFill>
-            <a:ln>
-              <a:solidFill>
-                <a:schemeClr val="tx1"/>
-              </a:solidFill>
-            </a:ln>
-          </p:spPr>
-          <p:style>
-            <a:lnRef idx="2">
-              <a:schemeClr val="accent1">
-                <a:shade val="50000"/>
-              </a:schemeClr>
-            </a:lnRef>
-            <a:fillRef idx="1">
-              <a:schemeClr val="accent1"/>
-            </a:fillRef>
-            <a:effectRef idx="0">
-              <a:schemeClr val="accent1"/>
-            </a:effectRef>
-            <a:fontRef idx="minor">
-              <a:schemeClr val="lt1"/>
-            </a:fontRef>
-          </p:style>
-          <p:txBody>
-            <a:bodyPr rtlCol="0" anchor="ctr"/>
-            <a:lstStyle/>
-            <a:p>
-              <a:pPr algn="ctr"/>
-              <a:r>
-                <a:rPr lang="en-US" sz="751" i="1" dirty="0">
-                  <a:solidFill>
-                    <a:prstClr val="white"/>
-                  </a:solidFill>
-                </a:rPr>
-                <a:t>2</a:t>
-              </a:r>
-              <a:endParaRPr lang="en-US" sz="704" dirty="0"/>
-            </a:p>
-          </p:txBody>
-        </p:sp>
-        <p:sp>
-          <p:nvSpPr>
-            <p:cNvPr id="29" name="Right Arrow 28">
-              <a:extLst>
-                <a:ext uri="{FF2B5EF4-FFF2-40B4-BE49-F238E27FC236}">
-                  <a16:creationId xmlns:a16="http://schemas.microsoft.com/office/drawing/2014/main" id="{11D50A8E-BB65-4840-8029-E57BA86970F2}"/>
-                </a:ext>
-              </a:extLst>
-            </p:cNvPr>
-            <p:cNvSpPr/>
-            <p:nvPr/>
-          </p:nvSpPr>
-          <p:spPr>
-            <a:xfrm>
-              <a:off x="5945973" y="1520064"/>
-              <a:ext cx="238141" cy="197183"/>
-            </a:xfrm>
-            <a:prstGeom prst="rightArrow">
-              <a:avLst>
-                <a:gd name="adj1" fmla="val 100000"/>
-                <a:gd name="adj2" fmla="val 50000"/>
-              </a:avLst>
-            </a:prstGeom>
-            <a:solidFill>
-              <a:schemeClr val="accent1">
-                <a:lumMod val="40000"/>
-                <a:lumOff val="60000"/>
-              </a:schemeClr>
-            </a:solidFill>
-            <a:ln>
-              <a:solidFill>
-                <a:schemeClr val="tx1"/>
-              </a:solidFill>
-            </a:ln>
-          </p:spPr>
-          <p:style>
-            <a:lnRef idx="2">
-              <a:schemeClr val="accent1">
-                <a:shade val="50000"/>
-              </a:schemeClr>
-            </a:lnRef>
-            <a:fillRef idx="1">
-              <a:schemeClr val="accent1"/>
-            </a:fillRef>
-            <a:effectRef idx="0">
-              <a:schemeClr val="accent1"/>
-            </a:effectRef>
-            <a:fontRef idx="minor">
-              <a:schemeClr val="lt1"/>
-            </a:fontRef>
-          </p:style>
-          <p:txBody>
-            <a:bodyPr rtlCol="0" anchor="ctr"/>
-            <a:lstStyle/>
-            <a:p>
-              <a:pPr algn="ctr"/>
-              <a:endParaRPr lang="en-US" sz="704" dirty="0"/>
-            </a:p>
-          </p:txBody>
-        </p:sp>
-        <p:sp>
-          <p:nvSpPr>
-            <p:cNvPr id="30" name="Right Arrow 29">
-              <a:extLst>
-                <a:ext uri="{FF2B5EF4-FFF2-40B4-BE49-F238E27FC236}">
-                  <a16:creationId xmlns:a16="http://schemas.microsoft.com/office/drawing/2014/main" id="{231E5876-22BD-FF43-9CEC-B2F96F432445}"/>
-                </a:ext>
-              </a:extLst>
-            </p:cNvPr>
-            <p:cNvSpPr/>
-            <p:nvPr/>
-          </p:nvSpPr>
-          <p:spPr>
-            <a:xfrm>
-              <a:off x="5109606" y="1520064"/>
-              <a:ext cx="816668" cy="197183"/>
-            </a:xfrm>
-            <a:prstGeom prst="rightArrow">
-              <a:avLst>
-                <a:gd name="adj1" fmla="val 100000"/>
-                <a:gd name="adj2" fmla="val 50000"/>
-              </a:avLst>
-            </a:prstGeom>
-            <a:solidFill>
-              <a:schemeClr val="bg2">
-                <a:lumMod val="50000"/>
-              </a:schemeClr>
-            </a:solidFill>
-            <a:ln w="28575">
-              <a:solidFill>
-                <a:schemeClr val="tx1"/>
-              </a:solidFill>
-            </a:ln>
-          </p:spPr>
-          <p:style>
-            <a:lnRef idx="2">
-              <a:schemeClr val="accent1">
-                <a:shade val="50000"/>
-              </a:schemeClr>
-            </a:lnRef>
-            <a:fillRef idx="1">
-              <a:schemeClr val="accent1"/>
-            </a:fillRef>
-            <a:effectRef idx="0">
-              <a:schemeClr val="accent1"/>
-            </a:effectRef>
-            <a:fontRef idx="minor">
-              <a:schemeClr val="lt1"/>
-            </a:fontRef>
-          </p:style>
-          <p:txBody>
-            <a:bodyPr rtlCol="0" anchor="ctr"/>
-            <a:lstStyle/>
-            <a:p>
-              <a:pPr algn="ctr"/>
-              <a:r>
-                <a:rPr lang="en-US" sz="751" i="1" dirty="0">
-                  <a:solidFill>
-                    <a:prstClr val="white"/>
-                  </a:solidFill>
-                </a:rPr>
-                <a:t>3</a:t>
-              </a:r>
-              <a:endParaRPr lang="en-US" sz="704" dirty="0"/>
-            </a:p>
-          </p:txBody>
-        </p:sp>
-        <p:sp>
-          <p:nvSpPr>
-            <p:cNvPr id="31" name="Right Arrow 30">
-              <a:extLst>
-                <a:ext uri="{FF2B5EF4-FFF2-40B4-BE49-F238E27FC236}">
-                  <a16:creationId xmlns:a16="http://schemas.microsoft.com/office/drawing/2014/main" id="{DA7A4591-28B0-EA4D-A873-C45B33F32FBF}"/>
-                </a:ext>
-              </a:extLst>
-            </p:cNvPr>
-            <p:cNvSpPr/>
-            <p:nvPr/>
-          </p:nvSpPr>
-          <p:spPr>
-            <a:xfrm>
-              <a:off x="6202690" y="1520064"/>
-              <a:ext cx="1040196" cy="197183"/>
-            </a:xfrm>
-            <a:prstGeom prst="rightArrow">
-              <a:avLst>
-                <a:gd name="adj1" fmla="val 100000"/>
-                <a:gd name="adj2" fmla="val 50000"/>
-              </a:avLst>
-            </a:prstGeom>
-            <a:solidFill>
-              <a:srgbClr val="FECDAD"/>
-            </a:solidFill>
-            <a:ln>
-              <a:solidFill>
-                <a:schemeClr val="tx1"/>
-              </a:solidFill>
-            </a:ln>
-          </p:spPr>
-          <p:style>
-            <a:lnRef idx="2">
-              <a:schemeClr val="accent1">
-                <a:shade val="50000"/>
-              </a:schemeClr>
-            </a:lnRef>
-            <a:fillRef idx="1">
-              <a:schemeClr val="accent1"/>
-            </a:fillRef>
-            <a:effectRef idx="0">
-              <a:schemeClr val="accent1"/>
-            </a:effectRef>
-            <a:fontRef idx="minor">
-              <a:schemeClr val="lt1"/>
-            </a:fontRef>
-          </p:style>
-          <p:txBody>
-            <a:bodyPr rtlCol="0" anchor="ctr"/>
-            <a:lstStyle/>
-            <a:p>
-              <a:pPr lvl="0" algn="ctr"/>
-              <a:r>
-                <a:rPr lang="en-US" sz="751" i="1" dirty="0">
-                  <a:solidFill>
-                    <a:prstClr val="black"/>
-                  </a:solidFill>
-                </a:rPr>
-                <a:t>4</a:t>
-              </a:r>
-              <a:endParaRPr lang="en-US" sz="704" dirty="0">
-                <a:solidFill>
-                  <a:prstClr val="white"/>
-                </a:solidFill>
-              </a:endParaRPr>
-            </a:p>
-          </p:txBody>
-        </p:sp>
-        <p:sp>
-          <p:nvSpPr>
-            <p:cNvPr id="32" name="Right Arrow 31">
-              <a:extLst>
-                <a:ext uri="{FF2B5EF4-FFF2-40B4-BE49-F238E27FC236}">
-                  <a16:creationId xmlns:a16="http://schemas.microsoft.com/office/drawing/2014/main" id="{C03A334C-C0CF-F94F-BBA1-19ED537D876C}"/>
-                </a:ext>
-              </a:extLst>
-            </p:cNvPr>
-            <p:cNvSpPr/>
-            <p:nvPr/>
-          </p:nvSpPr>
-          <p:spPr>
-            <a:xfrm>
-              <a:off x="7269484" y="1520064"/>
-              <a:ext cx="686548" cy="197183"/>
-            </a:xfrm>
-            <a:prstGeom prst="rightArrow">
-              <a:avLst>
-                <a:gd name="adj1" fmla="val 100000"/>
-                <a:gd name="adj2" fmla="val 50000"/>
-              </a:avLst>
-            </a:prstGeom>
-            <a:solidFill>
-              <a:srgbClr val="FFB9B7"/>
-            </a:solidFill>
-            <a:ln w="28575">
-              <a:solidFill>
-                <a:schemeClr val="tx1"/>
-              </a:solidFill>
-            </a:ln>
-          </p:spPr>
-          <p:style>
-            <a:lnRef idx="2">
-              <a:schemeClr val="accent1">
-                <a:shade val="50000"/>
-              </a:schemeClr>
-            </a:lnRef>
-            <a:fillRef idx="1">
-              <a:schemeClr val="accent1"/>
-            </a:fillRef>
-            <a:effectRef idx="0">
-              <a:schemeClr val="accent1"/>
-            </a:effectRef>
-            <a:fontRef idx="minor">
-              <a:schemeClr val="lt1"/>
-            </a:fontRef>
-          </p:style>
-          <p:txBody>
-            <a:bodyPr rtlCol="0" anchor="ctr"/>
-            <a:lstStyle/>
-            <a:p>
-              <a:pPr algn="ctr"/>
-              <a:r>
-                <a:rPr lang="en-US" sz="751" i="1" dirty="0">
-                  <a:solidFill>
-                    <a:prstClr val="black"/>
-                  </a:solidFill>
-                </a:rPr>
-                <a:t>4</a:t>
-              </a:r>
-              <a:endParaRPr lang="en-US" sz="704" dirty="0"/>
-            </a:p>
-          </p:txBody>
-        </p:sp>
-        <p:sp>
-          <p:nvSpPr>
-            <p:cNvPr id="33" name="Right Arrow 32">
-              <a:extLst>
-                <a:ext uri="{FF2B5EF4-FFF2-40B4-BE49-F238E27FC236}">
-                  <a16:creationId xmlns:a16="http://schemas.microsoft.com/office/drawing/2014/main" id="{C3A6D2AF-2511-8E40-A319-F74851B25C57}"/>
-                </a:ext>
-              </a:extLst>
-            </p:cNvPr>
-            <p:cNvSpPr/>
-            <p:nvPr/>
-          </p:nvSpPr>
-          <p:spPr>
-            <a:xfrm>
-              <a:off x="7977974" y="1520064"/>
-              <a:ext cx="469051" cy="197183"/>
-            </a:xfrm>
-            <a:prstGeom prst="rightArrow">
-              <a:avLst>
-                <a:gd name="adj1" fmla="val 100000"/>
-                <a:gd name="adj2" fmla="val 50000"/>
-              </a:avLst>
-            </a:prstGeom>
-            <a:solidFill>
-              <a:schemeClr val="accent1">
-                <a:lumMod val="40000"/>
-                <a:lumOff val="60000"/>
-              </a:schemeClr>
-            </a:solidFill>
-            <a:ln>
-              <a:solidFill>
-                <a:schemeClr val="tx1"/>
-              </a:solidFill>
-            </a:ln>
-          </p:spPr>
-          <p:style>
-            <a:lnRef idx="2">
-              <a:schemeClr val="accent1">
-                <a:shade val="50000"/>
-              </a:schemeClr>
-            </a:lnRef>
-            <a:fillRef idx="1">
-              <a:schemeClr val="accent1"/>
-            </a:fillRef>
-            <a:effectRef idx="0">
-              <a:schemeClr val="accent1"/>
-            </a:effectRef>
-            <a:fontRef idx="minor">
-              <a:schemeClr val="lt1"/>
-            </a:fontRef>
-          </p:style>
-          <p:txBody>
-            <a:bodyPr rtlCol="0" anchor="ctr"/>
-            <a:lstStyle/>
-            <a:p>
-              <a:pPr algn="ctr"/>
-              <a:endParaRPr lang="en-US" sz="704"/>
-            </a:p>
-          </p:txBody>
-        </p:sp>
-        <p:sp>
-          <p:nvSpPr>
-            <p:cNvPr id="34" name="Right Arrow 33">
-              <a:extLst>
-                <a:ext uri="{FF2B5EF4-FFF2-40B4-BE49-F238E27FC236}">
-                  <a16:creationId xmlns:a16="http://schemas.microsoft.com/office/drawing/2014/main" id="{5370F50A-C9E4-2140-B6A4-344EC298D74F}"/>
-                </a:ext>
-              </a:extLst>
-            </p:cNvPr>
-            <p:cNvSpPr/>
-            <p:nvPr/>
-          </p:nvSpPr>
-          <p:spPr>
-            <a:xfrm>
-              <a:off x="8845000" y="1520064"/>
-              <a:ext cx="798254" cy="197183"/>
-            </a:xfrm>
-            <a:prstGeom prst="rightArrow">
-              <a:avLst>
-                <a:gd name="adj1" fmla="val 100000"/>
-                <a:gd name="adj2" fmla="val 50000"/>
-              </a:avLst>
-            </a:prstGeom>
-            <a:solidFill>
-              <a:schemeClr val="bg2"/>
-            </a:solidFill>
-            <a:ln w="28575">
-              <a:solidFill>
-                <a:schemeClr val="tx1"/>
-              </a:solidFill>
-            </a:ln>
-          </p:spPr>
-          <p:style>
-            <a:lnRef idx="2">
-              <a:schemeClr val="accent1">
-                <a:shade val="50000"/>
-              </a:schemeClr>
-            </a:lnRef>
-            <a:fillRef idx="1">
-              <a:schemeClr val="accent1"/>
-            </a:fillRef>
-            <a:effectRef idx="0">
-              <a:schemeClr val="accent1"/>
-            </a:effectRef>
-            <a:fontRef idx="minor">
-              <a:schemeClr val="lt1"/>
-            </a:fontRef>
-          </p:style>
-          <p:txBody>
-            <a:bodyPr rtlCol="0" anchor="ctr"/>
-            <a:lstStyle/>
-            <a:p>
-              <a:pPr algn="ctr"/>
-              <a:endParaRPr lang="en-US" sz="704"/>
-            </a:p>
-          </p:txBody>
-        </p:sp>
-        <p:sp>
-          <p:nvSpPr>
-            <p:cNvPr id="35" name="Right Arrow 34">
-              <a:extLst>
-                <a:ext uri="{FF2B5EF4-FFF2-40B4-BE49-F238E27FC236}">
-                  <a16:creationId xmlns:a16="http://schemas.microsoft.com/office/drawing/2014/main" id="{931C089E-E8F7-B444-B407-A11630AA3CFB}"/>
-                </a:ext>
-              </a:extLst>
-            </p:cNvPr>
-            <p:cNvSpPr/>
-            <p:nvPr/>
-          </p:nvSpPr>
-          <p:spPr>
-            <a:xfrm flipH="1">
-              <a:off x="3254805" y="1520064"/>
-              <a:ext cx="331537" cy="197183"/>
-            </a:xfrm>
-            <a:prstGeom prst="rightArrow">
-              <a:avLst>
-                <a:gd name="adj1" fmla="val 100000"/>
-                <a:gd name="adj2" fmla="val 50000"/>
-              </a:avLst>
-            </a:prstGeom>
-            <a:solidFill>
-              <a:schemeClr val="bg2"/>
-            </a:solidFill>
-            <a:ln>
-              <a:solidFill>
-                <a:schemeClr val="tx1"/>
-              </a:solidFill>
-            </a:ln>
-          </p:spPr>
-          <p:style>
-            <a:lnRef idx="2">
-              <a:schemeClr val="accent1">
-                <a:shade val="50000"/>
-              </a:schemeClr>
-            </a:lnRef>
-            <a:fillRef idx="1">
-              <a:schemeClr val="accent1"/>
-            </a:fillRef>
-            <a:effectRef idx="0">
-              <a:schemeClr val="accent1"/>
-            </a:effectRef>
-            <a:fontRef idx="minor">
-              <a:schemeClr val="lt1"/>
-            </a:fontRef>
-          </p:style>
-          <p:txBody>
-            <a:bodyPr rtlCol="0" anchor="ctr"/>
-            <a:lstStyle/>
-            <a:p>
-              <a:pPr algn="ctr"/>
-              <a:r>
-                <a:rPr lang="en-US" sz="751" i="1" dirty="0">
-                  <a:solidFill>
-                    <a:prstClr val="black"/>
-                  </a:solidFill>
-                </a:rPr>
-                <a:t>1</a:t>
-              </a:r>
-              <a:endParaRPr lang="en-US" sz="704" dirty="0"/>
-            </a:p>
-          </p:txBody>
-        </p:sp>
-        <p:sp>
-          <p:nvSpPr>
-            <p:cNvPr id="44" name="Right Arrow 43">
-              <a:extLst>
-                <a:ext uri="{FF2B5EF4-FFF2-40B4-BE49-F238E27FC236}">
-                  <a16:creationId xmlns:a16="http://schemas.microsoft.com/office/drawing/2014/main" id="{6079E282-128A-BD46-930D-3B72207BDF1F}"/>
-                </a:ext>
-              </a:extLst>
-            </p:cNvPr>
-            <p:cNvSpPr/>
-            <p:nvPr/>
-          </p:nvSpPr>
-          <p:spPr>
-            <a:xfrm flipH="1">
-              <a:off x="2834579" y="1520064"/>
-              <a:ext cx="405596" cy="197183"/>
-            </a:xfrm>
-            <a:prstGeom prst="rightArrow">
-              <a:avLst>
-                <a:gd name="adj1" fmla="val 100000"/>
-                <a:gd name="adj2" fmla="val 50000"/>
-              </a:avLst>
-            </a:prstGeom>
-            <a:solidFill>
-              <a:schemeClr val="bg2"/>
-            </a:solidFill>
-            <a:ln>
-              <a:noFill/>
-            </a:ln>
-          </p:spPr>
-          <p:style>
-            <a:lnRef idx="2">
-              <a:schemeClr val="accent1">
-                <a:shade val="50000"/>
-              </a:schemeClr>
-            </a:lnRef>
-            <a:fillRef idx="1">
-              <a:schemeClr val="accent1"/>
-            </a:fillRef>
-            <a:effectRef idx="0">
-              <a:schemeClr val="accent1"/>
-            </a:effectRef>
-            <a:fontRef idx="minor">
-              <a:schemeClr val="lt1"/>
-            </a:fontRef>
-          </p:style>
-          <p:txBody>
-            <a:bodyPr rtlCol="0" anchor="ctr"/>
-            <a:lstStyle/>
-            <a:p>
-              <a:pPr algn="ctr"/>
-              <a:r>
-                <a:rPr lang="en-US" sz="751" i="1" dirty="0">
-                  <a:solidFill>
-                    <a:schemeClr val="tx1"/>
-                  </a:solidFill>
-                </a:rPr>
-                <a:t>1</a:t>
-              </a:r>
-            </a:p>
-          </p:txBody>
-        </p:sp>
-      </p:grpSp>
-      <p:grpSp>
-        <p:nvGrpSpPr>
           <p:cNvPr id="856" name="Group 855">
             <a:extLst>
               <a:ext uri="{FF2B5EF4-FFF2-40B4-BE49-F238E27FC236}">
@@ -5608,7 +4501,7 @@
         </p:nvGrpSpPr>
         <p:grpSpPr>
           <a:xfrm>
-            <a:off x="1797925" y="1405854"/>
+            <a:off x="1797928" y="748931"/>
             <a:ext cx="4457489" cy="123318"/>
             <a:chOff x="2834335" y="2359939"/>
             <a:chExt cx="7127413" cy="197183"/>
@@ -5728,7 +4621,7 @@
               <a:pPr algn="ctr"/>
               <a:r>
                 <a:rPr lang="en-US" sz="751" i="1" dirty="0"/>
-                <a:t>2</a:t>
+                <a:t>1</a:t>
               </a:r>
             </a:p>
           </p:txBody>
@@ -5790,7 +4683,7 @@
               <a:pPr algn="ctr"/>
               <a:r>
                 <a:rPr lang="en-US" sz="751" i="1" dirty="0"/>
-                <a:t>3</a:t>
+                <a:t>2</a:t>
               </a:r>
             </a:p>
           </p:txBody>
@@ -5857,7 +4750,7 @@
         </p:sp>
         <p:sp>
           <p:nvSpPr>
-            <p:cNvPr id="71" name="Right Arrow 70">
+            <p:cNvPr id="71" name="Right Arrow 70" descr="Opf00042">
               <a:extLst>
                 <a:ext uri="{FF2B5EF4-FFF2-40B4-BE49-F238E27FC236}">
                   <a16:creationId xmlns:a16="http://schemas.microsoft.com/office/drawing/2014/main" id="{9E0ADB6B-09A9-C74D-9393-F46B92D0784F}"/>
@@ -5912,7 +4805,7 @@
                     <a:prstClr val="black"/>
                   </a:solidFill>
                 </a:rPr>
-                <a:t>5</a:t>
+                <a:t>4</a:t>
               </a:r>
               <a:endParaRPr lang="en-US" sz="704" dirty="0"/>
             </a:p>
@@ -6050,7 +4943,7 @@
         </p:nvGrpSpPr>
         <p:grpSpPr>
           <a:xfrm>
-            <a:off x="1783474" y="1930319"/>
+            <a:off x="1783477" y="1273396"/>
             <a:ext cx="3443295" cy="123318"/>
             <a:chOff x="2811229" y="4039690"/>
             <a:chExt cx="5505742" cy="197183"/>
@@ -6113,14 +5006,14 @@
               <a:pPr algn="ctr"/>
               <a:r>
                 <a:rPr lang="en-US" sz="751" i="1" dirty="0"/>
-                <a:t>2</a:t>
+                <a:t>1</a:t>
               </a:r>
             </a:p>
           </p:txBody>
         </p:sp>
         <p:sp>
           <p:nvSpPr>
-            <p:cNvPr id="114" name="Right Arrow 113">
+            <p:cNvPr id="114" name="Right Arrow 113" descr="Opf02584">
               <a:extLst>
                 <a:ext uri="{FF2B5EF4-FFF2-40B4-BE49-F238E27FC236}">
                   <a16:creationId xmlns:a16="http://schemas.microsoft.com/office/drawing/2014/main" id="{B14DE3A8-D0F2-B444-8464-005B48F3FD6C}"/>
@@ -6180,7 +5073,7 @@
                     <a:schemeClr val="tx1"/>
                   </a:solidFill>
                 </a:rPr>
-                <a:t>7</a:t>
+                <a:t>6</a:t>
               </a:r>
             </a:p>
           </p:txBody>
@@ -6242,7 +5135,7 @@
               <a:pPr algn="ctr"/>
               <a:r>
                 <a:rPr lang="en-US" sz="751" i="1" dirty="0"/>
-                <a:t>3</a:t>
+                <a:t>2</a:t>
               </a:r>
             </a:p>
           </p:txBody>
@@ -6306,7 +5199,7 @@
                     <a:prstClr val="black"/>
                   </a:solidFill>
                 </a:rPr>
-                <a:t>4</a:t>
+                <a:t>3</a:t>
               </a:r>
               <a:endParaRPr lang="en-US" sz="704" dirty="0"/>
             </a:p>
@@ -6371,7 +5264,7 @@
                     <a:prstClr val="black"/>
                   </a:solidFill>
                 </a:rPr>
-                <a:t>5</a:t>
+                <a:t>4</a:t>
               </a:r>
               <a:endParaRPr lang="en-US" sz="704" dirty="0"/>
             </a:p>
@@ -6379,7 +5272,7 @@
         </p:sp>
         <p:sp>
           <p:nvSpPr>
-            <p:cNvPr id="132" name="Right Arrow 131">
+            <p:cNvPr id="132" name="Right Arrow 131" descr="Opf01405">
               <a:extLst>
                 <a:ext uri="{FF2B5EF4-FFF2-40B4-BE49-F238E27FC236}">
                   <a16:creationId xmlns:a16="http://schemas.microsoft.com/office/drawing/2014/main" id="{F77FD22D-C333-1E40-9481-74BF53576390}"/>
@@ -6436,7 +5329,7 @@
                     <a:prstClr val="black"/>
                   </a:solidFill>
                 </a:rPr>
-                <a:t>6</a:t>
+                <a:t>5</a:t>
               </a:r>
               <a:endParaRPr lang="en-US" sz="704" dirty="0"/>
             </a:p>
@@ -6457,7 +5350,7 @@
         </p:nvGrpSpPr>
         <p:grpSpPr>
           <a:xfrm>
-            <a:off x="25331" y="2979248"/>
+            <a:off x="25334" y="2322325"/>
             <a:ext cx="5176943" cy="123318"/>
             <a:chOff x="19050" y="6572763"/>
             <a:chExt cx="8277803" cy="197183"/>
@@ -6521,7 +5414,7 @@
               <a:pPr algn="ctr"/>
               <a:r>
                 <a:rPr lang="en-US" sz="751" i="1" dirty="0"/>
-                <a:t>9</a:t>
+                <a:t>8</a:t>
               </a:r>
             </a:p>
           </p:txBody>
@@ -6644,7 +5537,7 @@
               <a:pPr algn="ctr"/>
               <a:r>
                 <a:rPr lang="en-US" sz="751" i="1" dirty="0"/>
-                <a:t>10</a:t>
+                <a:t>9</a:t>
               </a:r>
             </a:p>
           </p:txBody>
@@ -6778,14 +5671,14 @@
                     <a:schemeClr val="tx1"/>
                   </a:solidFill>
                 </a:rPr>
-                <a:t>5</a:t>
+                <a:t>4</a:t>
               </a:r>
             </a:p>
           </p:txBody>
         </p:sp>
         <p:sp>
           <p:nvSpPr>
-            <p:cNvPr id="169" name="Right Arrow 168">
+            <p:cNvPr id="169" name="Right Arrow 168" descr="Opf14773">
               <a:extLst>
                 <a:ext uri="{FF2B5EF4-FFF2-40B4-BE49-F238E27FC236}">
                   <a16:creationId xmlns:a16="http://schemas.microsoft.com/office/drawing/2014/main" id="{7B08999F-8378-7B44-A397-9F071F175104}"/>
@@ -6846,7 +5739,7 @@
                     <a:prstClr val="black"/>
                   </a:solidFill>
                 </a:rPr>
-                <a:t>12</a:t>
+                <a:t>11</a:t>
               </a:r>
               <a:endParaRPr lang="en-US" sz="704" dirty="0"/>
             </a:p>
@@ -6971,7 +5864,7 @@
                     <a:schemeClr val="tx1"/>
                   </a:solidFill>
                 </a:rPr>
-                <a:t>8</a:t>
+                <a:t>7</a:t>
               </a:r>
             </a:p>
           </p:txBody>
@@ -7036,7 +5929,7 @@
                     <a:schemeClr val="tx1"/>
                   </a:solidFill>
                 </a:rPr>
-                <a:t>6</a:t>
+                <a:t>5</a:t>
               </a:r>
             </a:p>
           </p:txBody>
@@ -7056,7 +5949,7 @@
         </p:nvGrpSpPr>
         <p:grpSpPr>
           <a:xfrm>
-            <a:off x="1770775" y="3503712"/>
+            <a:off x="1770775" y="2846789"/>
             <a:ext cx="3844388" cy="123318"/>
             <a:chOff x="2809973" y="7412638"/>
             <a:chExt cx="6147081" cy="197183"/>
@@ -7119,7 +6012,7 @@
               <a:pPr algn="ctr"/>
               <a:r>
                 <a:rPr lang="en-US" sz="751" i="1" dirty="0"/>
-                <a:t>2</a:t>
+                <a:t>1</a:t>
               </a:r>
             </a:p>
           </p:txBody>
@@ -7187,7 +6080,7 @@
                     <a:prstClr val="black"/>
                   </a:solidFill>
                 </a:rPr>
-                <a:t>7</a:t>
+                <a:t>6</a:t>
               </a:r>
               <a:endParaRPr lang="en-US" sz="704" dirty="0"/>
             </a:p>
@@ -7250,7 +6143,7 @@
               <a:pPr algn="ctr"/>
               <a:r>
                 <a:rPr lang="en-US" sz="751" i="1" dirty="0"/>
-                <a:t>3</a:t>
+                <a:t>2</a:t>
               </a:r>
             </a:p>
           </p:txBody>
@@ -7315,7 +6208,7 @@
                     <a:prstClr val="black"/>
                   </a:solidFill>
                 </a:rPr>
-                <a:t>4</a:t>
+                <a:t>3</a:t>
               </a:r>
               <a:endParaRPr lang="en-US" sz="704" dirty="0"/>
             </a:p>
@@ -7380,7 +6273,7 @@
                     <a:prstClr val="black"/>
                   </a:solidFill>
                 </a:rPr>
-                <a:t>5</a:t>
+                <a:t>4</a:t>
               </a:r>
               <a:endParaRPr lang="en-US" sz="704" dirty="0"/>
             </a:p>
@@ -7445,7 +6338,7 @@
                     <a:prstClr val="black"/>
                   </a:solidFill>
                 </a:rPr>
-                <a:t>6</a:t>
+                <a:t>5</a:t>
               </a:r>
               <a:endParaRPr lang="en-US" sz="704" dirty="0"/>
             </a:p>
@@ -7526,7 +6419,7 @@
         </p:nvGrpSpPr>
         <p:grpSpPr>
           <a:xfrm>
-            <a:off x="1766406" y="4556895"/>
+            <a:off x="1766406" y="3899975"/>
             <a:ext cx="4315298" cy="124923"/>
             <a:chOff x="2802988" y="9099188"/>
             <a:chExt cx="6900053" cy="199749"/>
@@ -7589,7 +6482,7 @@
               <a:pPr algn="ctr"/>
               <a:r>
                 <a:rPr lang="en-US" sz="751" i="1" dirty="0"/>
-                <a:t>13</a:t>
+                <a:t>12</a:t>
               </a:r>
             </a:p>
           </p:txBody>
@@ -7656,7 +6549,7 @@
                     <a:schemeClr val="tx1"/>
                   </a:solidFill>
                 </a:rPr>
-                <a:t>15</a:t>
+                <a:t>14</a:t>
               </a:r>
             </a:p>
           </p:txBody>
@@ -7718,14 +6611,14 @@
               <a:pPr algn="ctr"/>
               <a:r>
                 <a:rPr lang="en-US" sz="751" i="1" dirty="0"/>
-                <a:t>14</a:t>
+                <a:t>13</a:t>
               </a:r>
             </a:p>
           </p:txBody>
         </p:sp>
         <p:sp>
           <p:nvSpPr>
-            <p:cNvPr id="263" name="Right Arrow 262">
+            <p:cNvPr id="263" name="Right Arrow 262" descr="Opf16791">
               <a:extLst>
                 <a:ext uri="{FF2B5EF4-FFF2-40B4-BE49-F238E27FC236}">
                   <a16:creationId xmlns:a16="http://schemas.microsoft.com/office/drawing/2014/main" id="{54757034-EB82-004B-B9A9-2AD85587F6EF}"/>
@@ -7782,7 +6675,7 @@
                     <a:schemeClr val="tx1"/>
                   </a:solidFill>
                 </a:rPr>
-                <a:t>17</a:t>
+                <a:t>16</a:t>
               </a:r>
             </a:p>
           </p:txBody>
@@ -7846,7 +6739,7 @@
                     <a:prstClr val="black"/>
                   </a:solidFill>
                 </a:rPr>
-                <a:t>6</a:t>
+                <a:t>5</a:t>
               </a:r>
               <a:endParaRPr lang="en-US" sz="704" dirty="0"/>
             </a:p>
@@ -7911,7 +6804,7 @@
                     <a:prstClr val="black"/>
                   </a:solidFill>
                 </a:rPr>
-                <a:t>16</a:t>
+                <a:t>15</a:t>
               </a:r>
             </a:p>
           </p:txBody>
@@ -7992,10 +6885,10 @@
         </p:nvGrpSpPr>
         <p:grpSpPr>
           <a:xfrm>
-            <a:off x="1749840" y="5082962"/>
-            <a:ext cx="3588909" cy="127674"/>
+            <a:off x="1749843" y="4426057"/>
+            <a:ext cx="3588909" cy="123319"/>
             <a:chOff x="2776497" y="9941638"/>
-            <a:chExt cx="5738575" cy="204147"/>
+            <a:chExt cx="5738575" cy="197183"/>
           </a:xfrm>
         </p:grpSpPr>
         <p:sp>
@@ -8012,8 +6905,8 @@
           </p:nvSpPr>
           <p:spPr>
             <a:xfrm>
-              <a:off x="3668190" y="9948465"/>
-              <a:ext cx="1417850" cy="197183"/>
+              <a:off x="3668189" y="9941638"/>
+              <a:ext cx="1417849" cy="197183"/>
             </a:xfrm>
             <a:prstGeom prst="rightArrow">
               <a:avLst>
@@ -8027,6 +6920,135 @@
               </a:schemeClr>
             </a:solidFill>
             <a:ln>
+              <a:solidFill>
+                <a:schemeClr val="tx1"/>
+              </a:solidFill>
+            </a:ln>
+          </p:spPr>
+          <p:style>
+            <a:lnRef idx="2">
+              <a:schemeClr val="accent1">
+                <a:shade val="50000"/>
+              </a:schemeClr>
+            </a:lnRef>
+            <a:fillRef idx="1">
+              <a:schemeClr val="accent1"/>
+            </a:fillRef>
+            <a:effectRef idx="0">
+              <a:schemeClr val="accent1"/>
+            </a:effectRef>
+            <a:fontRef idx="minor">
+              <a:schemeClr val="lt1"/>
+            </a:fontRef>
+          </p:style>
+          <p:txBody>
+            <a:bodyPr rtlCol="0" anchor="ctr"/>
+            <a:lstStyle/>
+            <a:p>
+              <a:pPr algn="ctr"/>
+              <a:r>
+                <a:rPr lang="en-US" sz="751" i="1" dirty="0"/>
+                <a:t>12</a:t>
+              </a:r>
+            </a:p>
+          </p:txBody>
+        </p:sp>
+        <p:sp>
+          <p:nvSpPr>
+            <p:cNvPr id="280" name="Right Arrow 279">
+              <a:extLst>
+                <a:ext uri="{FF2B5EF4-FFF2-40B4-BE49-F238E27FC236}">
+                  <a16:creationId xmlns:a16="http://schemas.microsoft.com/office/drawing/2014/main" id="{4BB03C24-AF6E-024B-BA1F-F9B0FB19C517}"/>
+                </a:ext>
+              </a:extLst>
+            </p:cNvPr>
+            <p:cNvSpPr/>
+            <p:nvPr/>
+          </p:nvSpPr>
+          <p:spPr>
+            <a:xfrm>
+              <a:off x="5786348" y="9941638"/>
+              <a:ext cx="887114" cy="197183"/>
+            </a:xfrm>
+            <a:prstGeom prst="rightArrow">
+              <a:avLst>
+                <a:gd name="adj1" fmla="val 100000"/>
+                <a:gd name="adj2" fmla="val 50000"/>
+              </a:avLst>
+            </a:prstGeom>
+            <a:solidFill>
+              <a:schemeClr val="accent1">
+                <a:lumMod val="40000"/>
+                <a:lumOff val="60000"/>
+              </a:schemeClr>
+            </a:solidFill>
+            <a:ln>
+              <a:solidFill>
+                <a:schemeClr val="tx1"/>
+              </a:solidFill>
+            </a:ln>
+          </p:spPr>
+          <p:style>
+            <a:lnRef idx="2">
+              <a:schemeClr val="accent1">
+                <a:shade val="50000"/>
+              </a:schemeClr>
+            </a:lnRef>
+            <a:fillRef idx="1">
+              <a:schemeClr val="accent1"/>
+            </a:fillRef>
+            <a:effectRef idx="0">
+              <a:schemeClr val="accent1"/>
+            </a:effectRef>
+            <a:fontRef idx="minor">
+              <a:schemeClr val="lt1"/>
+            </a:fontRef>
+          </p:style>
+          <p:txBody>
+            <a:bodyPr rtlCol="0" anchor="ctr"/>
+            <a:lstStyle/>
+            <a:p>
+              <a:pPr algn="ctr"/>
+              <a:r>
+                <a:rPr lang="en-US" sz="751" i="1" dirty="0">
+                  <a:solidFill>
+                    <a:schemeClr val="tx1"/>
+                  </a:solidFill>
+                </a:rPr>
+                <a:t>14</a:t>
+              </a:r>
+            </a:p>
+          </p:txBody>
+        </p:sp>
+        <p:sp>
+          <p:nvSpPr>
+            <p:cNvPr id="281" name="Right Arrow 280">
+              <a:extLst>
+                <a:ext uri="{FF2B5EF4-FFF2-40B4-BE49-F238E27FC236}">
+                  <a16:creationId xmlns:a16="http://schemas.microsoft.com/office/drawing/2014/main" id="{960AADA6-FF1A-0446-BA25-0A01F7B6F9BD}"/>
+                </a:ext>
+              </a:extLst>
+            </p:cNvPr>
+            <p:cNvSpPr/>
+            <p:nvPr/>
+          </p:nvSpPr>
+          <p:spPr>
+            <a:xfrm>
+              <a:off x="5104395" y="9941638"/>
+              <a:ext cx="667270" cy="197183"/>
+            </a:xfrm>
+            <a:prstGeom prst="rightArrow">
+              <a:avLst>
+                <a:gd name="adj1" fmla="val 100000"/>
+                <a:gd name="adj2" fmla="val 50000"/>
+              </a:avLst>
+            </a:prstGeom>
+            <a:solidFill>
+              <a:schemeClr val="bg2">
+                <a:lumMod val="50000"/>
+              </a:schemeClr>
+            </a:solidFill>
+            <a:ln w="28575">
               <a:solidFill>
                 <a:schemeClr val="tx1"/>
               </a:solidFill>
@@ -8062,135 +7084,6 @@
         </p:sp>
         <p:sp>
           <p:nvSpPr>
-            <p:cNvPr id="280" name="Right Arrow 279">
-              <a:extLst>
-                <a:ext uri="{FF2B5EF4-FFF2-40B4-BE49-F238E27FC236}">
-                  <a16:creationId xmlns:a16="http://schemas.microsoft.com/office/drawing/2014/main" id="{4BB03C24-AF6E-024B-BA1F-F9B0FB19C517}"/>
-                </a:ext>
-              </a:extLst>
-            </p:cNvPr>
-            <p:cNvSpPr/>
-            <p:nvPr/>
-          </p:nvSpPr>
-          <p:spPr>
-            <a:xfrm>
-              <a:off x="5786348" y="9941638"/>
-              <a:ext cx="887115" cy="197183"/>
-            </a:xfrm>
-            <a:prstGeom prst="rightArrow">
-              <a:avLst>
-                <a:gd name="adj1" fmla="val 100000"/>
-                <a:gd name="adj2" fmla="val 50000"/>
-              </a:avLst>
-            </a:prstGeom>
-            <a:solidFill>
-              <a:schemeClr val="accent1">
-                <a:lumMod val="40000"/>
-                <a:lumOff val="60000"/>
-              </a:schemeClr>
-            </a:solidFill>
-            <a:ln>
-              <a:solidFill>
-                <a:schemeClr val="tx1"/>
-              </a:solidFill>
-            </a:ln>
-          </p:spPr>
-          <p:style>
-            <a:lnRef idx="2">
-              <a:schemeClr val="accent1">
-                <a:shade val="50000"/>
-              </a:schemeClr>
-            </a:lnRef>
-            <a:fillRef idx="1">
-              <a:schemeClr val="accent1"/>
-            </a:fillRef>
-            <a:effectRef idx="0">
-              <a:schemeClr val="accent1"/>
-            </a:effectRef>
-            <a:fontRef idx="minor">
-              <a:schemeClr val="lt1"/>
-            </a:fontRef>
-          </p:style>
-          <p:txBody>
-            <a:bodyPr rtlCol="0" anchor="ctr"/>
-            <a:lstStyle/>
-            <a:p>
-              <a:pPr algn="ctr"/>
-              <a:r>
-                <a:rPr lang="en-US" sz="751" i="1" dirty="0">
-                  <a:solidFill>
-                    <a:schemeClr val="tx1"/>
-                  </a:solidFill>
-                </a:rPr>
-                <a:t>15</a:t>
-              </a:r>
-            </a:p>
-          </p:txBody>
-        </p:sp>
-        <p:sp>
-          <p:nvSpPr>
-            <p:cNvPr id="281" name="Right Arrow 280">
-              <a:extLst>
-                <a:ext uri="{FF2B5EF4-FFF2-40B4-BE49-F238E27FC236}">
-                  <a16:creationId xmlns:a16="http://schemas.microsoft.com/office/drawing/2014/main" id="{960AADA6-FF1A-0446-BA25-0A01F7B6F9BD}"/>
-                </a:ext>
-              </a:extLst>
-            </p:cNvPr>
-            <p:cNvSpPr/>
-            <p:nvPr/>
-          </p:nvSpPr>
-          <p:spPr>
-            <a:xfrm>
-              <a:off x="5104395" y="9942564"/>
-              <a:ext cx="667270" cy="197183"/>
-            </a:xfrm>
-            <a:prstGeom prst="rightArrow">
-              <a:avLst>
-                <a:gd name="adj1" fmla="val 100000"/>
-                <a:gd name="adj2" fmla="val 50000"/>
-              </a:avLst>
-            </a:prstGeom>
-            <a:solidFill>
-              <a:schemeClr val="bg2">
-                <a:lumMod val="50000"/>
-              </a:schemeClr>
-            </a:solidFill>
-            <a:ln w="28575">
-              <a:solidFill>
-                <a:schemeClr val="tx1"/>
-              </a:solidFill>
-            </a:ln>
-          </p:spPr>
-          <p:style>
-            <a:lnRef idx="2">
-              <a:schemeClr val="accent1">
-                <a:shade val="50000"/>
-              </a:schemeClr>
-            </a:lnRef>
-            <a:fillRef idx="1">
-              <a:schemeClr val="accent1"/>
-            </a:fillRef>
-            <a:effectRef idx="0">
-              <a:schemeClr val="accent1"/>
-            </a:effectRef>
-            <a:fontRef idx="minor">
-              <a:schemeClr val="lt1"/>
-            </a:fontRef>
-          </p:style>
-          <p:txBody>
-            <a:bodyPr rtlCol="0" anchor="ctr"/>
-            <a:lstStyle/>
-            <a:p>
-              <a:pPr algn="ctr"/>
-              <a:r>
-                <a:rPr lang="en-US" sz="751" i="1" dirty="0"/>
-                <a:t>14</a:t>
-              </a:r>
-            </a:p>
-          </p:txBody>
-        </p:sp>
-        <p:sp>
-          <p:nvSpPr>
             <p:cNvPr id="282" name="Right Arrow 281">
               <a:extLst>
                 <a:ext uri="{FF2B5EF4-FFF2-40B4-BE49-F238E27FC236}">
@@ -8203,8 +7096,8 @@
           </p:nvSpPr>
           <p:spPr>
             <a:xfrm>
-              <a:off x="7376683" y="9944187"/>
-              <a:ext cx="1138389" cy="197183"/>
+              <a:off x="7376684" y="9941638"/>
+              <a:ext cx="1138388" cy="197183"/>
             </a:xfrm>
             <a:prstGeom prst="rightArrow">
               <a:avLst>
@@ -8248,7 +7141,7 @@
                     <a:prstClr val="black"/>
                   </a:solidFill>
                 </a:rPr>
-                <a:t>17</a:t>
+                <a:t>16</a:t>
               </a:r>
               <a:endParaRPr lang="en-US" sz="704" dirty="0">
                 <a:solidFill>
@@ -8272,7 +7165,7 @@
           </p:nvSpPr>
           <p:spPr>
             <a:xfrm>
-              <a:off x="2776497" y="9948602"/>
+              <a:off x="2776497" y="9941638"/>
               <a:ext cx="755305" cy="197183"/>
             </a:xfrm>
             <a:prstGeom prst="rightArrow">
@@ -8317,7 +7210,7 @@
                     <a:prstClr val="black"/>
                   </a:solidFill>
                 </a:rPr>
-                <a:t>6</a:t>
+                <a:t>5</a:t>
               </a:r>
               <a:endParaRPr lang="en-US" sz="704" dirty="0"/>
             </a:p>
@@ -8337,8 +7230,8 @@
           </p:nvSpPr>
           <p:spPr>
             <a:xfrm>
-              <a:off x="6680790" y="9942562"/>
-              <a:ext cx="678716" cy="197183"/>
+              <a:off x="6680790" y="9941638"/>
+              <a:ext cx="678715" cy="197183"/>
             </a:xfrm>
             <a:prstGeom prst="rightArrow">
               <a:avLst>
@@ -8382,7 +7275,7 @@
                     <a:prstClr val="black"/>
                   </a:solidFill>
                 </a:rPr>
-                <a:t>16</a:t>
+                <a:t>15</a:t>
               </a:r>
             </a:p>
           </p:txBody>
@@ -8402,8 +7295,8 @@
         </p:nvSpPr>
         <p:spPr>
           <a:xfrm>
-            <a:off x="1259656" y="122156"/>
-            <a:ext cx="1990392" cy="246221"/>
+            <a:off x="1259656" y="29680"/>
+            <a:ext cx="3755104" cy="246221"/>
           </a:xfrm>
           <a:prstGeom prst="rect">
             <a:avLst/>
@@ -8425,49 +7318,7 @@
                   </a:schemeClr>
                 </a:solidFill>
               </a:rPr>
-              <a:t>B1A: Contig 194:22723-8169</a:t>
-            </a:r>
-          </a:p>
-        </p:txBody>
-      </p:sp>
-      <p:sp>
-        <p:nvSpPr>
-          <p:cNvPr id="685" name="TextBox 684">
-            <a:extLst>
-              <a:ext uri="{FF2B5EF4-FFF2-40B4-BE49-F238E27FC236}">
-                <a16:creationId xmlns:a16="http://schemas.microsoft.com/office/drawing/2014/main" id="{AAAE16B7-F61B-CA48-BDEC-3C2A7F083288}"/>
-              </a:ext>
-            </a:extLst>
-          </p:cNvPr>
-          <p:cNvSpPr txBox="1"/>
-          <p:nvPr/>
-        </p:nvSpPr>
-        <p:spPr>
-          <a:xfrm>
-            <a:off x="1259656" y="647270"/>
-            <a:ext cx="1990392" cy="246221"/>
-          </a:xfrm>
-          <a:prstGeom prst="rect">
-            <a:avLst/>
-          </a:prstGeom>
-          <a:noFill/>
-        </p:spPr>
-        <p:txBody>
-          <a:bodyPr wrap="square" rtlCol="0">
-            <a:spAutoFit/>
-          </a:bodyPr>
-          <a:lstStyle/>
-          <a:p>
-            <a:r>
-              <a:rPr lang="en-US" sz="1000" i="1" dirty="0">
-                <a:solidFill>
-                  <a:schemeClr val="tx1">
-                    <a:lumMod val="65000"/>
-                    <a:lumOff val="35000"/>
-                  </a:schemeClr>
-                </a:solidFill>
-              </a:rPr>
-              <a:t>B1B: Contig 194:22669-8137</a:t>
+              <a:t>B1A: Contig 194:22723-8169 (B1B: Contig 194:22669-8137)</a:t>
             </a:r>
           </a:p>
         </p:txBody>
@@ -8486,7 +7337,7 @@
         </p:nvSpPr>
         <p:spPr>
           <a:xfrm>
-            <a:off x="1259657" y="1172385"/>
+            <a:off x="1259657" y="515465"/>
             <a:ext cx="4677322" cy="246221"/>
           </a:xfrm>
           <a:prstGeom prst="rect">
@@ -8509,7 +7360,7 @@
                   </a:schemeClr>
                 </a:solidFill>
               </a:rPr>
-              <a:t>B1A: Contig 194:62827-47556 and B1B: Contig 194: 62770-47499</a:t>
+              <a:t>B1A: Contig 194:62827-47556 (B1B: Contig 194: 62770-47499)</a:t>
             </a:r>
           </a:p>
         </p:txBody>
@@ -8528,7 +7379,7 @@
         </p:nvSpPr>
         <p:spPr>
           <a:xfrm>
-            <a:off x="1259655" y="1697499"/>
+            <a:off x="1259655" y="1040579"/>
             <a:ext cx="4683128" cy="246221"/>
           </a:xfrm>
           <a:prstGeom prst="rect">
@@ -8551,8 +7402,27 @@
                   </a:schemeClr>
                 </a:solidFill>
               </a:rPr>
-              <a:t>B1A: Contig 254: 3335-15076 and B1B: Contig 278:3335-15076</a:t>
+              <a:t>B1A: Contig 254: 3335-15076 (B1B: </a:t>
             </a:r>
+            <a:r>
+              <a:rPr lang="en-US" sz="1000" i="1">
+                <a:solidFill>
+                  <a:schemeClr val="tx1">
+                    <a:lumMod val="65000"/>
+                    <a:lumOff val="35000"/>
+                  </a:schemeClr>
+                </a:solidFill>
+              </a:rPr>
+              <a:t>Contig 278:3335-15076)</a:t>
+            </a:r>
+            <a:endParaRPr lang="en-US" sz="1000" i="1" dirty="0">
+              <a:solidFill>
+                <a:schemeClr val="tx1">
+                  <a:lumMod val="65000"/>
+                  <a:lumOff val="35000"/>
+                </a:schemeClr>
+              </a:solidFill>
+            </a:endParaRPr>
           </a:p>
         </p:txBody>
       </p:sp>
@@ -8570,7 +7440,7 @@
         </p:nvSpPr>
         <p:spPr>
           <a:xfrm>
-            <a:off x="1259656" y="2222613"/>
+            <a:off x="1259656" y="1565693"/>
             <a:ext cx="3453816" cy="246221"/>
           </a:xfrm>
           <a:prstGeom prst="rect">
@@ -8634,7 +7504,7 @@
         </p:nvSpPr>
         <p:spPr>
           <a:xfrm>
-            <a:off x="1259657" y="2747728"/>
+            <a:off x="1259660" y="2090808"/>
             <a:ext cx="3526751" cy="246221"/>
           </a:xfrm>
           <a:prstGeom prst="rect">
@@ -8698,7 +7568,7 @@
         </p:nvSpPr>
         <p:spPr>
           <a:xfrm>
-            <a:off x="1259657" y="3272843"/>
+            <a:off x="1259660" y="2615923"/>
             <a:ext cx="2427001" cy="246221"/>
           </a:xfrm>
           <a:prstGeom prst="rect">
@@ -8740,7 +7610,7 @@
         </p:nvSpPr>
         <p:spPr>
           <a:xfrm>
-            <a:off x="1259657" y="3797957"/>
+            <a:off x="1259660" y="3141037"/>
             <a:ext cx="2427001" cy="246221"/>
           </a:xfrm>
           <a:prstGeom prst="rect">
@@ -8782,7 +7652,7 @@
         </p:nvSpPr>
         <p:spPr>
           <a:xfrm>
-            <a:off x="1259657" y="4323071"/>
+            <a:off x="1259660" y="3666151"/>
             <a:ext cx="3526751" cy="246221"/>
           </a:xfrm>
           <a:prstGeom prst="rect">
@@ -8846,7 +7716,7 @@
         </p:nvSpPr>
         <p:spPr>
           <a:xfrm>
-            <a:off x="1259656" y="4848187"/>
+            <a:off x="1259656" y="4191267"/>
             <a:ext cx="3904624" cy="246221"/>
           </a:xfrm>
           <a:prstGeom prst="rect">
@@ -8910,7 +7780,7 @@
         </p:nvGrpSpPr>
         <p:grpSpPr>
           <a:xfrm>
-            <a:off x="147837" y="5486724"/>
+            <a:off x="147837" y="4829801"/>
             <a:ext cx="3734252" cy="1373512"/>
             <a:chOff x="587017" y="12329978"/>
             <a:chExt cx="5970975" cy="2196210"/>
@@ -9323,8 +8193,8 @@
           </p:nvSpPr>
           <p:spPr>
             <a:xfrm>
-              <a:off x="3652966" y="12662508"/>
-              <a:ext cx="2743332" cy="197183"/>
+              <a:off x="3652967" y="12662509"/>
+              <a:ext cx="2743332" cy="219315"/>
             </a:xfrm>
             <a:prstGeom prst="rightArrow">
               <a:avLst>
@@ -9385,8 +8255,8 @@
           </p:nvSpPr>
           <p:spPr>
             <a:xfrm>
-              <a:off x="3652966" y="12985600"/>
-              <a:ext cx="2743332" cy="197183"/>
+              <a:off x="3652967" y="12985601"/>
+              <a:ext cx="2743332" cy="219315"/>
             </a:xfrm>
             <a:prstGeom prst="rightArrow">
               <a:avLst>
@@ -9430,7 +8300,7 @@
                     <a:schemeClr val="tx1"/>
                   </a:solidFill>
                 </a:rPr>
-                <a:t>periplasmic</a:t>
+                <a:t>exported</a:t>
               </a:r>
             </a:p>
           </p:txBody>
@@ -9449,8 +8319,8 @@
           </p:nvSpPr>
           <p:spPr>
             <a:xfrm>
-              <a:off x="3652966" y="13308692"/>
-              <a:ext cx="2743332" cy="197183"/>
+              <a:off x="3652967" y="13308692"/>
+              <a:ext cx="2743332" cy="219315"/>
             </a:xfrm>
             <a:prstGeom prst="rightArrow">
               <a:avLst>
@@ -9494,7 +8364,23 @@
                     <a:schemeClr val="tx1"/>
                   </a:solidFill>
                 </a:rPr>
-                <a:t>outer membrane</a:t>
+                <a:t>exported + </a:t>
+              </a:r>
+              <a:r>
+                <a:rPr lang="en-US" sz="751" dirty="0" err="1">
+                  <a:solidFill>
+                    <a:schemeClr val="tx1"/>
+                  </a:solidFill>
+                </a:rPr>
+                <a:t>lipidated</a:t>
+              </a:r>
+              <a:r>
+                <a:rPr lang="en-US" sz="751" dirty="0">
+                  <a:solidFill>
+                    <a:schemeClr val="tx1"/>
+                  </a:solidFill>
+                </a:rPr>
+                <a:t> (OM)</a:t>
               </a:r>
             </a:p>
           </p:txBody>
@@ -9513,8 +8399,8 @@
           </p:nvSpPr>
           <p:spPr>
             <a:xfrm>
-              <a:off x="3652966" y="13631784"/>
-              <a:ext cx="2743332" cy="197183"/>
+              <a:off x="3652967" y="13631784"/>
+              <a:ext cx="2748753" cy="219315"/>
             </a:xfrm>
             <a:prstGeom prst="rightArrow">
               <a:avLst>
@@ -9559,7 +8445,23 @@
                     <a:schemeClr val="tx1"/>
                   </a:solidFill>
                 </a:rPr>
-                <a:t>inner membrane</a:t>
+                <a:t>exported + </a:t>
+              </a:r>
+              <a:r>
+                <a:rPr lang="en-US" sz="751" dirty="0" err="1">
+                  <a:solidFill>
+                    <a:schemeClr val="tx1"/>
+                  </a:solidFill>
+                </a:rPr>
+                <a:t>lipidated</a:t>
+              </a:r>
+              <a:r>
+                <a:rPr lang="en-US" sz="751" dirty="0">
+                  <a:solidFill>
+                    <a:schemeClr val="tx1"/>
+                  </a:solidFill>
+                </a:rPr>
+                <a:t> (IM)</a:t>
               </a:r>
             </a:p>
           </p:txBody>
@@ -9932,7 +8834,7 @@
       </p:grpSp>
       <p:sp>
         <p:nvSpPr>
-          <p:cNvPr id="118" name="TextBox 117">
+          <p:cNvPr id="118" name="TextBox 117" descr="Opf15294">
             <a:extLst>
               <a:ext uri="{FF2B5EF4-FFF2-40B4-BE49-F238E27FC236}">
                 <a16:creationId xmlns:a16="http://schemas.microsoft.com/office/drawing/2014/main" id="{53C2B0C1-2FFB-9D40-9A1A-EC6C47F6231B}"/>
@@ -9944,7 +8846,7 @@
         </p:nvSpPr>
         <p:spPr>
           <a:xfrm>
-            <a:off x="3731500" y="2937848"/>
+            <a:off x="3731503" y="2280928"/>
             <a:ext cx="308763" cy="207749"/>
           </a:xfrm>
           <a:prstGeom prst="rect">
@@ -9960,11 +8862,527 @@
           <a:p>
             <a:r>
               <a:rPr lang="en-US" sz="750" dirty="0"/>
-              <a:t>11</a:t>
+              <a:t>10</a:t>
             </a:r>
           </a:p>
         </p:txBody>
       </p:sp>
+      <p:grpSp>
+        <p:nvGrpSpPr>
+          <p:cNvPr id="2" name="Group 1">
+            <a:extLst>
+              <a:ext uri="{FF2B5EF4-FFF2-40B4-BE49-F238E27FC236}">
+                <a16:creationId xmlns:a16="http://schemas.microsoft.com/office/drawing/2014/main" id="{9CBC2BC3-3511-704F-B01E-F235B9F73C4D}"/>
+              </a:ext>
+            </a:extLst>
+          </p:cNvPr>
+          <p:cNvGrpSpPr/>
+          <p:nvPr/>
+        </p:nvGrpSpPr>
+        <p:grpSpPr>
+          <a:xfrm>
+            <a:off x="1774278" y="264448"/>
+            <a:ext cx="4271548" cy="125006"/>
+            <a:chOff x="1774278" y="356924"/>
+            <a:chExt cx="4271548" cy="125006"/>
+          </a:xfrm>
+        </p:grpSpPr>
+        <p:sp>
+          <p:nvSpPr>
+            <p:cNvPr id="4" name="Right Arrow 3" descr="Opf01209">
+              <a:extLst>
+                <a:ext uri="{FF2B5EF4-FFF2-40B4-BE49-F238E27FC236}">
+                  <a16:creationId xmlns:a16="http://schemas.microsoft.com/office/drawing/2014/main" id="{106B2A51-3082-5144-BD0B-989DA03EFEE3}"/>
+                </a:ext>
+              </a:extLst>
+            </p:cNvPr>
+            <p:cNvSpPr/>
+            <p:nvPr/>
+          </p:nvSpPr>
+          <p:spPr>
+            <a:xfrm>
+              <a:off x="2319417" y="356924"/>
+              <a:ext cx="874136" cy="123318"/>
+            </a:xfrm>
+            <a:prstGeom prst="rightArrow">
+              <a:avLst>
+                <a:gd name="adj1" fmla="val 100000"/>
+                <a:gd name="adj2" fmla="val 50000"/>
+              </a:avLst>
+            </a:prstGeom>
+            <a:solidFill>
+              <a:schemeClr val="bg2">
+                <a:lumMod val="50000"/>
+              </a:schemeClr>
+            </a:solidFill>
+            <a:ln>
+              <a:solidFill>
+                <a:schemeClr val="tx1"/>
+              </a:solidFill>
+            </a:ln>
+          </p:spPr>
+          <p:style>
+            <a:lnRef idx="2">
+              <a:schemeClr val="accent1">
+                <a:shade val="50000"/>
+              </a:schemeClr>
+            </a:lnRef>
+            <a:fillRef idx="1">
+              <a:schemeClr val="accent1"/>
+            </a:fillRef>
+            <a:effectRef idx="0">
+              <a:schemeClr val="accent1"/>
+            </a:effectRef>
+            <a:fontRef idx="minor">
+              <a:schemeClr val="lt1"/>
+            </a:fontRef>
+          </p:style>
+          <p:txBody>
+            <a:bodyPr rtlCol="0" anchor="ctr"/>
+            <a:lstStyle/>
+            <a:p>
+              <a:pPr algn="ctr"/>
+              <a:r>
+                <a:rPr lang="en-US" sz="751" i="1" dirty="0"/>
+                <a:t>1</a:t>
+              </a:r>
+            </a:p>
+          </p:txBody>
+        </p:sp>
+        <p:sp>
+          <p:nvSpPr>
+            <p:cNvPr id="8" name="Right Arrow 7">
+              <a:extLst>
+                <a:ext uri="{FF2B5EF4-FFF2-40B4-BE49-F238E27FC236}">
+                  <a16:creationId xmlns:a16="http://schemas.microsoft.com/office/drawing/2014/main" id="{7CE7EC2F-FA7C-6341-A24B-8CABD655F522}"/>
+                </a:ext>
+              </a:extLst>
+            </p:cNvPr>
+            <p:cNvSpPr/>
+            <p:nvPr/>
+          </p:nvSpPr>
+          <p:spPr>
+            <a:xfrm>
+              <a:off x="3735659" y="356924"/>
+              <a:ext cx="148504" cy="123318"/>
+            </a:xfrm>
+            <a:prstGeom prst="rightArrow">
+              <a:avLst>
+                <a:gd name="adj1" fmla="val 100000"/>
+                <a:gd name="adj2" fmla="val 50000"/>
+              </a:avLst>
+            </a:prstGeom>
+            <a:solidFill>
+              <a:schemeClr val="accent1">
+                <a:lumMod val="40000"/>
+                <a:lumOff val="60000"/>
+              </a:schemeClr>
+            </a:solidFill>
+            <a:ln>
+              <a:solidFill>
+                <a:schemeClr val="tx1"/>
+              </a:solidFill>
+            </a:ln>
+          </p:spPr>
+          <p:style>
+            <a:lnRef idx="2">
+              <a:schemeClr val="accent1">
+                <a:shade val="50000"/>
+              </a:schemeClr>
+            </a:lnRef>
+            <a:fillRef idx="1">
+              <a:schemeClr val="accent1"/>
+            </a:fillRef>
+            <a:effectRef idx="0">
+              <a:schemeClr val="accent1"/>
+            </a:effectRef>
+            <a:fontRef idx="minor">
+              <a:schemeClr val="lt1"/>
+            </a:fontRef>
+          </p:style>
+          <p:txBody>
+            <a:bodyPr rtlCol="0" anchor="ctr"/>
+            <a:lstStyle/>
+            <a:p>
+              <a:pPr algn="ctr"/>
+              <a:endParaRPr lang="en-US" sz="704" dirty="0"/>
+            </a:p>
+          </p:txBody>
+        </p:sp>
+        <p:sp>
+          <p:nvSpPr>
+            <p:cNvPr id="10" name="Right Arrow 9" descr="Opf02000">
+              <a:extLst>
+                <a:ext uri="{FF2B5EF4-FFF2-40B4-BE49-F238E27FC236}">
+                  <a16:creationId xmlns:a16="http://schemas.microsoft.com/office/drawing/2014/main" id="{4F640832-2B63-9245-8258-F41CABA02316}"/>
+                </a:ext>
+              </a:extLst>
+            </p:cNvPr>
+            <p:cNvSpPr/>
+            <p:nvPr/>
+          </p:nvSpPr>
+          <p:spPr>
+            <a:xfrm>
+              <a:off x="3884163" y="356924"/>
+              <a:ext cx="670171" cy="123318"/>
+            </a:xfrm>
+            <a:prstGeom prst="rightArrow">
+              <a:avLst>
+                <a:gd name="adj1" fmla="val 100000"/>
+                <a:gd name="adj2" fmla="val 50000"/>
+              </a:avLst>
+            </a:prstGeom>
+            <a:solidFill>
+              <a:srgbClr val="FECDAD"/>
+            </a:solidFill>
+            <a:ln>
+              <a:solidFill>
+                <a:schemeClr val="tx1"/>
+              </a:solidFill>
+            </a:ln>
+          </p:spPr>
+          <p:style>
+            <a:lnRef idx="2">
+              <a:schemeClr val="accent1">
+                <a:shade val="50000"/>
+              </a:schemeClr>
+            </a:lnRef>
+            <a:fillRef idx="1">
+              <a:schemeClr val="accent1"/>
+            </a:fillRef>
+            <a:effectRef idx="0">
+              <a:schemeClr val="accent1"/>
+            </a:effectRef>
+            <a:fontRef idx="minor">
+              <a:schemeClr val="lt1"/>
+            </a:fontRef>
+          </p:style>
+          <p:txBody>
+            <a:bodyPr rtlCol="0" anchor="ctr"/>
+            <a:lstStyle/>
+            <a:p>
+              <a:pPr lvl="0" algn="ctr"/>
+              <a:r>
+                <a:rPr lang="en-US" sz="751" i="1" dirty="0">
+                  <a:solidFill>
+                    <a:prstClr val="black"/>
+                  </a:solidFill>
+                </a:rPr>
+                <a:t>3</a:t>
+              </a:r>
+            </a:p>
+          </p:txBody>
+        </p:sp>
+        <p:sp>
+          <p:nvSpPr>
+            <p:cNvPr id="11" name="Right Arrow 10">
+              <a:extLst>
+                <a:ext uri="{FF2B5EF4-FFF2-40B4-BE49-F238E27FC236}">
+                  <a16:creationId xmlns:a16="http://schemas.microsoft.com/office/drawing/2014/main" id="{ADA63BF1-DFE6-7940-B9FC-AE2E034E1BB2}"/>
+                </a:ext>
+              </a:extLst>
+            </p:cNvPr>
+            <p:cNvSpPr/>
+            <p:nvPr/>
+          </p:nvSpPr>
+          <p:spPr>
+            <a:xfrm>
+              <a:off x="4560293" y="356924"/>
+              <a:ext cx="428128" cy="123318"/>
+            </a:xfrm>
+            <a:prstGeom prst="rightArrow">
+              <a:avLst>
+                <a:gd name="adj1" fmla="val 100000"/>
+                <a:gd name="adj2" fmla="val 50000"/>
+              </a:avLst>
+            </a:prstGeom>
+            <a:solidFill>
+              <a:srgbClr val="FFB9B7"/>
+            </a:solidFill>
+            <a:ln w="28575">
+              <a:solidFill>
+                <a:schemeClr val="tx1"/>
+              </a:solidFill>
+            </a:ln>
+          </p:spPr>
+          <p:style>
+            <a:lnRef idx="2">
+              <a:schemeClr val="accent1">
+                <a:shade val="50000"/>
+              </a:schemeClr>
+            </a:lnRef>
+            <a:fillRef idx="1">
+              <a:schemeClr val="accent1"/>
+            </a:fillRef>
+            <a:effectRef idx="0">
+              <a:schemeClr val="accent1"/>
+            </a:effectRef>
+            <a:fontRef idx="minor">
+              <a:schemeClr val="lt1"/>
+            </a:fontRef>
+          </p:style>
+          <p:txBody>
+            <a:bodyPr rtlCol="0" anchor="ctr"/>
+            <a:lstStyle/>
+            <a:p>
+              <a:pPr algn="ctr"/>
+              <a:r>
+                <a:rPr lang="en-US" sz="751" i="1" dirty="0">
+                  <a:solidFill>
+                    <a:schemeClr val="tx1"/>
+                  </a:solidFill>
+                </a:rPr>
+                <a:t>3</a:t>
+              </a:r>
+            </a:p>
+          </p:txBody>
+        </p:sp>
+        <p:sp>
+          <p:nvSpPr>
+            <p:cNvPr id="12" name="Right Arrow 11">
+              <a:extLst>
+                <a:ext uri="{FF2B5EF4-FFF2-40B4-BE49-F238E27FC236}">
+                  <a16:creationId xmlns:a16="http://schemas.microsoft.com/office/drawing/2014/main" id="{D89DFE37-B310-5D4D-AA43-F6B135620427}"/>
+                </a:ext>
+              </a:extLst>
+            </p:cNvPr>
+            <p:cNvSpPr/>
+            <p:nvPr/>
+          </p:nvSpPr>
+          <p:spPr>
+            <a:xfrm>
+              <a:off x="4994382" y="356924"/>
+              <a:ext cx="292498" cy="123318"/>
+            </a:xfrm>
+            <a:prstGeom prst="rightArrow">
+              <a:avLst>
+                <a:gd name="adj1" fmla="val 100000"/>
+                <a:gd name="adj2" fmla="val 50000"/>
+              </a:avLst>
+            </a:prstGeom>
+            <a:solidFill>
+              <a:schemeClr val="accent1">
+                <a:lumMod val="40000"/>
+                <a:lumOff val="60000"/>
+              </a:schemeClr>
+            </a:solidFill>
+            <a:ln>
+              <a:solidFill>
+                <a:schemeClr val="tx1"/>
+              </a:solidFill>
+            </a:ln>
+          </p:spPr>
+          <p:style>
+            <a:lnRef idx="2">
+              <a:schemeClr val="accent1">
+                <a:shade val="50000"/>
+              </a:schemeClr>
+            </a:lnRef>
+            <a:fillRef idx="1">
+              <a:schemeClr val="accent1"/>
+            </a:fillRef>
+            <a:effectRef idx="0">
+              <a:schemeClr val="accent1"/>
+            </a:effectRef>
+            <a:fontRef idx="minor">
+              <a:schemeClr val="lt1"/>
+            </a:fontRef>
+          </p:style>
+          <p:txBody>
+            <a:bodyPr rtlCol="0" anchor="ctr"/>
+            <a:lstStyle/>
+            <a:p>
+              <a:pPr algn="ctr"/>
+              <a:endParaRPr lang="en-US" sz="704"/>
+            </a:p>
+          </p:txBody>
+        </p:sp>
+        <p:sp>
+          <p:nvSpPr>
+            <p:cNvPr id="13" name="Right Arrow 12">
+              <a:extLst>
+                <a:ext uri="{FF2B5EF4-FFF2-40B4-BE49-F238E27FC236}">
+                  <a16:creationId xmlns:a16="http://schemas.microsoft.com/office/drawing/2014/main" id="{B609A91A-3D86-D247-B424-17C99A042DE5}"/>
+                </a:ext>
+              </a:extLst>
+            </p:cNvPr>
+            <p:cNvSpPr/>
+            <p:nvPr/>
+          </p:nvSpPr>
+          <p:spPr>
+            <a:xfrm>
+              <a:off x="5548039" y="356924"/>
+              <a:ext cx="497787" cy="123318"/>
+            </a:xfrm>
+            <a:prstGeom prst="rightArrow">
+              <a:avLst>
+                <a:gd name="adj1" fmla="val 100000"/>
+                <a:gd name="adj2" fmla="val 50000"/>
+              </a:avLst>
+            </a:prstGeom>
+            <a:solidFill>
+              <a:schemeClr val="bg2"/>
+            </a:solidFill>
+            <a:ln w="28575">
+              <a:solidFill>
+                <a:schemeClr val="tx1"/>
+              </a:solidFill>
+            </a:ln>
+          </p:spPr>
+          <p:style>
+            <a:lnRef idx="2">
+              <a:schemeClr val="accent1">
+                <a:shade val="50000"/>
+              </a:schemeClr>
+            </a:lnRef>
+            <a:fillRef idx="1">
+              <a:schemeClr val="accent1"/>
+            </a:fillRef>
+            <a:effectRef idx="0">
+              <a:schemeClr val="accent1"/>
+            </a:effectRef>
+            <a:fontRef idx="minor">
+              <a:schemeClr val="lt1"/>
+            </a:fontRef>
+          </p:style>
+          <p:txBody>
+            <a:bodyPr rtlCol="0" anchor="ctr"/>
+            <a:lstStyle/>
+            <a:p>
+              <a:pPr algn="ctr"/>
+              <a:endParaRPr lang="en-US" sz="704"/>
+            </a:p>
+          </p:txBody>
+        </p:sp>
+        <p:sp>
+          <p:nvSpPr>
+            <p:cNvPr id="14" name="Right Arrow 13" descr="Opf03680">
+              <a:extLst>
+                <a:ext uri="{FF2B5EF4-FFF2-40B4-BE49-F238E27FC236}">
+                  <a16:creationId xmlns:a16="http://schemas.microsoft.com/office/drawing/2014/main" id="{109379A3-BF94-6B4B-96B4-4AB40678588B}"/>
+                </a:ext>
+              </a:extLst>
+            </p:cNvPr>
+            <p:cNvSpPr/>
+            <p:nvPr/>
+          </p:nvSpPr>
+          <p:spPr>
+            <a:xfrm flipH="1">
+              <a:off x="1774278" y="356924"/>
+              <a:ext cx="485366" cy="123318"/>
+            </a:xfrm>
+            <a:prstGeom prst="rightArrow">
+              <a:avLst>
+                <a:gd name="adj1" fmla="val 100000"/>
+                <a:gd name="adj2" fmla="val 50000"/>
+              </a:avLst>
+            </a:prstGeom>
+            <a:solidFill>
+              <a:schemeClr val="bg2"/>
+            </a:solidFill>
+            <a:ln>
+              <a:solidFill>
+                <a:schemeClr val="tx1"/>
+              </a:solidFill>
+            </a:ln>
+          </p:spPr>
+          <p:style>
+            <a:lnRef idx="2">
+              <a:schemeClr val="accent1">
+                <a:shade val="50000"/>
+              </a:schemeClr>
+            </a:lnRef>
+            <a:fillRef idx="1">
+              <a:schemeClr val="accent1"/>
+            </a:fillRef>
+            <a:effectRef idx="0">
+              <a:schemeClr val="accent1"/>
+            </a:effectRef>
+            <a:fontRef idx="minor">
+              <a:schemeClr val="lt1"/>
+            </a:fontRef>
+          </p:style>
+          <p:txBody>
+            <a:bodyPr rtlCol="0" anchor="ctr"/>
+            <a:lstStyle/>
+            <a:p>
+              <a:pPr algn="ctr"/>
+              <a:endParaRPr lang="en-US" sz="751" i="1" dirty="0">
+                <a:solidFill>
+                  <a:schemeClr val="tx1"/>
+                </a:solidFill>
+              </a:endParaRPr>
+            </a:p>
+          </p:txBody>
+        </p:sp>
+        <p:sp>
+          <p:nvSpPr>
+            <p:cNvPr id="119" name="Right Arrow 118" descr="Opf02007">
+              <a:extLst>
+                <a:ext uri="{FF2B5EF4-FFF2-40B4-BE49-F238E27FC236}">
+                  <a16:creationId xmlns:a16="http://schemas.microsoft.com/office/drawing/2014/main" id="{2C230DC6-D1D0-FE47-AD45-9FD5A8E9A535}"/>
+                </a:ext>
+              </a:extLst>
+            </p:cNvPr>
+            <p:cNvSpPr/>
+            <p:nvPr/>
+          </p:nvSpPr>
+          <p:spPr>
+            <a:xfrm>
+              <a:off x="3212634" y="358612"/>
+              <a:ext cx="510745" cy="123318"/>
+            </a:xfrm>
+            <a:prstGeom prst="rightArrow">
+              <a:avLst>
+                <a:gd name="adj1" fmla="val 100000"/>
+                <a:gd name="adj2" fmla="val 50000"/>
+              </a:avLst>
+            </a:prstGeom>
+            <a:solidFill>
+              <a:schemeClr val="bg2">
+                <a:lumMod val="50000"/>
+              </a:schemeClr>
+            </a:solidFill>
+            <a:ln w="28575">
+              <a:solidFill>
+                <a:schemeClr val="tx1"/>
+              </a:solidFill>
+            </a:ln>
+          </p:spPr>
+          <p:style>
+            <a:lnRef idx="2">
+              <a:schemeClr val="accent1">
+                <a:shade val="50000"/>
+              </a:schemeClr>
+            </a:lnRef>
+            <a:fillRef idx="1">
+              <a:schemeClr val="accent1"/>
+            </a:fillRef>
+            <a:effectRef idx="0">
+              <a:schemeClr val="accent1"/>
+            </a:effectRef>
+            <a:fontRef idx="minor">
+              <a:schemeClr val="lt1"/>
+            </a:fontRef>
+          </p:style>
+          <p:txBody>
+            <a:bodyPr rtlCol="0" anchor="ctr"/>
+            <a:lstStyle/>
+            <a:p>
+              <a:pPr algn="ctr"/>
+              <a:r>
+                <a:rPr lang="en-US" sz="751" i="1" dirty="0">
+                  <a:solidFill>
+                    <a:prstClr val="white"/>
+                  </a:solidFill>
+                </a:rPr>
+                <a:t>2</a:t>
+              </a:r>
+              <a:endParaRPr lang="en-US" sz="704" dirty="0"/>
+            </a:p>
+          </p:txBody>
+        </p:sp>
+      </p:grpSp>
     </p:spTree>
     <p:extLst>
       <p:ext uri="{BB962C8B-B14F-4D97-AF65-F5344CB8AC3E}">

</xml_diff>

<commit_message>
Update Figure 2 and caption.
</commit_message>
<xml_diff>
--- a/doc/static/starch_related_PULs.pptx
+++ b/doc/static/starch_related_PULs.pptx
@@ -2,7 +2,7 @@
 <file path=ppt/presentation.xml><?xml version="1.0" encoding="utf-8"?>
 <p:presentation xmlns:a="http://schemas.openxmlformats.org/drawingml/2006/main" xmlns:r="http://schemas.openxmlformats.org/officeDocument/2006/relationships" xmlns:p="http://schemas.openxmlformats.org/presentationml/2006/main" saveSubsetFonts="1" autoCompressPictures="0">
   <p:sldMasterIdLst>
-    <p:sldMasterId id="2147483840" r:id="rId1"/>
+    <p:sldMasterId id="2147483876" r:id="rId1"/>
   </p:sldMasterIdLst>
   <p:notesMasterIdLst>
     <p:notesMasterId r:id="rId3"/>
@@ -10,7 +10,7 @@
   <p:sldIdLst>
     <p:sldId id="257" r:id="rId2"/>
   </p:sldIdLst>
-  <p:sldSz cx="6291263" cy="6308725"/>
+  <p:sldSz cx="6291263" cy="5943600"/>
   <p:notesSz cx="6858000" cy="9144000"/>
   <p:defaultTextStyle>
     <a:defPPr>
@@ -209,7 +209,7 @@
           <a:p>
             <a:fld id="{56FAAB6E-97AE-0847-93C3-7045BD03F9C5}" type="datetimeFigureOut">
               <a:rPr lang="en-US" smtClean="0"/>
-              <a:t>8/17/21</a:t>
+              <a:t>8/18/21</a:t>
             </a:fld>
             <a:endParaRPr lang="en-US"/>
           </a:p>
@@ -227,8 +227,8 @@
         </p:nvSpPr>
         <p:spPr>
           <a:xfrm>
-            <a:off x="1890713" y="1143000"/>
-            <a:ext cx="3076575" cy="3086100"/>
+            <a:off x="1797050" y="1143000"/>
+            <a:ext cx="3263900" cy="3086100"/>
           </a:xfrm>
           <a:prstGeom prst="rect">
             <a:avLst/>
@@ -505,8 +505,8 @@
         </p:nvSpPr>
         <p:spPr>
           <a:xfrm>
-            <a:off x="1890713" y="1143000"/>
-            <a:ext cx="3076575" cy="3086100"/>
+            <a:off x="1797050" y="1143000"/>
+            <a:ext cx="3263900" cy="3086100"/>
           </a:xfrm>
         </p:spPr>
       </p:sp>
@@ -594,8 +594,8 @@
         </p:nvSpPr>
         <p:spPr>
           <a:xfrm>
-            <a:off x="471845" y="1032470"/>
-            <a:ext cx="5347574" cy="2196371"/>
+            <a:off x="471845" y="972715"/>
+            <a:ext cx="5347574" cy="2069253"/>
           </a:xfrm>
         </p:spPr>
         <p:txBody>
@@ -626,8 +626,8 @@
         </p:nvSpPr>
         <p:spPr>
           <a:xfrm>
-            <a:off x="786408" y="3313541"/>
-            <a:ext cx="4718447" cy="1523148"/>
+            <a:off x="786408" y="3121766"/>
+            <a:ext cx="4718447" cy="1434994"/>
           </a:xfrm>
         </p:spPr>
         <p:txBody>
@@ -696,7 +696,7 @@
           <a:p>
             <a:fld id="{3F6A62D9-65B6-4743-B091-3F210FFD6B26}" type="datetimeFigureOut">
               <a:rPr lang="en-US" smtClean="0"/>
-              <a:t>8/17/21</a:t>
+              <a:t>8/18/21</a:t>
             </a:fld>
             <a:endParaRPr lang="en-US"/>
           </a:p>
@@ -747,7 +747,7 @@
     </p:spTree>
     <p:extLst>
       <p:ext uri="{BB962C8B-B14F-4D97-AF65-F5344CB8AC3E}">
-        <p14:creationId xmlns:p14="http://schemas.microsoft.com/office/powerpoint/2010/main" val="1630030108"/>
+        <p14:creationId xmlns:p14="http://schemas.microsoft.com/office/powerpoint/2010/main" val="4259058477"/>
       </p:ext>
     </p:extLst>
   </p:cSld>
@@ -866,7 +866,7 @@
           <a:p>
             <a:fld id="{3F6A62D9-65B6-4743-B091-3F210FFD6B26}" type="datetimeFigureOut">
               <a:rPr lang="en-US" smtClean="0"/>
-              <a:t>8/17/21</a:t>
+              <a:t>8/18/21</a:t>
             </a:fld>
             <a:endParaRPr lang="en-US"/>
           </a:p>
@@ -917,7 +917,7 @@
     </p:spTree>
     <p:extLst>
       <p:ext uri="{BB962C8B-B14F-4D97-AF65-F5344CB8AC3E}">
-        <p14:creationId xmlns:p14="http://schemas.microsoft.com/office/powerpoint/2010/main" val="4220422598"/>
+        <p14:creationId xmlns:p14="http://schemas.microsoft.com/office/powerpoint/2010/main" val="1691119996"/>
       </p:ext>
     </p:extLst>
   </p:cSld>
@@ -956,8 +956,8 @@
         </p:nvSpPr>
         <p:spPr>
           <a:xfrm>
-            <a:off x="4502185" y="335881"/>
-            <a:ext cx="1356554" cy="5346353"/>
+            <a:off x="4502185" y="316442"/>
+            <a:ext cx="1356554" cy="5036926"/>
           </a:xfrm>
         </p:spPr>
         <p:txBody>
@@ -984,8 +984,8 @@
         </p:nvSpPr>
         <p:spPr>
           <a:xfrm>
-            <a:off x="432525" y="335881"/>
-            <a:ext cx="3991020" cy="5346353"/>
+            <a:off x="432525" y="316442"/>
+            <a:ext cx="3991020" cy="5036926"/>
           </a:xfrm>
         </p:spPr>
         <p:txBody>
@@ -1046,7 +1046,7 @@
           <a:p>
             <a:fld id="{3F6A62D9-65B6-4743-B091-3F210FFD6B26}" type="datetimeFigureOut">
               <a:rPr lang="en-US" smtClean="0"/>
-              <a:t>8/17/21</a:t>
+              <a:t>8/18/21</a:t>
             </a:fld>
             <a:endParaRPr lang="en-US"/>
           </a:p>
@@ -1097,7 +1097,7 @@
     </p:spTree>
     <p:extLst>
       <p:ext uri="{BB962C8B-B14F-4D97-AF65-F5344CB8AC3E}">
-        <p14:creationId xmlns:p14="http://schemas.microsoft.com/office/powerpoint/2010/main" val="1316528350"/>
+        <p14:creationId xmlns:p14="http://schemas.microsoft.com/office/powerpoint/2010/main" val="2732603400"/>
       </p:ext>
     </p:extLst>
   </p:cSld>
@@ -1216,7 +1216,7 @@
           <a:p>
             <a:fld id="{3F6A62D9-65B6-4743-B091-3F210FFD6B26}" type="datetimeFigureOut">
               <a:rPr lang="en-US" smtClean="0"/>
-              <a:t>8/17/21</a:t>
+              <a:t>8/18/21</a:t>
             </a:fld>
             <a:endParaRPr lang="en-US"/>
           </a:p>
@@ -1267,7 +1267,7 @@
     </p:spTree>
     <p:extLst>
       <p:ext uri="{BB962C8B-B14F-4D97-AF65-F5344CB8AC3E}">
-        <p14:creationId xmlns:p14="http://schemas.microsoft.com/office/powerpoint/2010/main" val="3860679469"/>
+        <p14:creationId xmlns:p14="http://schemas.microsoft.com/office/powerpoint/2010/main" val="203566895"/>
       </p:ext>
     </p:extLst>
   </p:cSld>
@@ -1306,8 +1306,8 @@
         </p:nvSpPr>
         <p:spPr>
           <a:xfrm>
-            <a:off x="429248" y="1572802"/>
-            <a:ext cx="5426214" cy="2624254"/>
+            <a:off x="429248" y="1481774"/>
+            <a:ext cx="5426214" cy="2472372"/>
           </a:xfrm>
         </p:spPr>
         <p:txBody>
@@ -1338,8 +1338,8 @@
         </p:nvSpPr>
         <p:spPr>
           <a:xfrm>
-            <a:off x="429248" y="4221882"/>
-            <a:ext cx="5426214" cy="1380033"/>
+            <a:off x="429248" y="3977536"/>
+            <a:ext cx="5426214" cy="1300162"/>
           </a:xfrm>
         </p:spPr>
         <p:txBody>
@@ -1460,7 +1460,7 @@
           <a:p>
             <a:fld id="{3F6A62D9-65B6-4743-B091-3F210FFD6B26}" type="datetimeFigureOut">
               <a:rPr lang="en-US" smtClean="0"/>
-              <a:t>8/17/21</a:t>
+              <a:t>8/18/21</a:t>
             </a:fld>
             <a:endParaRPr lang="en-US"/>
           </a:p>
@@ -1511,7 +1511,7 @@
     </p:spTree>
     <p:extLst>
       <p:ext uri="{BB962C8B-B14F-4D97-AF65-F5344CB8AC3E}">
-        <p14:creationId xmlns:p14="http://schemas.microsoft.com/office/powerpoint/2010/main" val="2241373492"/>
+        <p14:creationId xmlns:p14="http://schemas.microsoft.com/office/powerpoint/2010/main" val="3339398347"/>
       </p:ext>
     </p:extLst>
   </p:cSld>
@@ -1573,8 +1573,8 @@
         </p:nvSpPr>
         <p:spPr>
           <a:xfrm>
-            <a:off x="432524" y="1679406"/>
-            <a:ext cx="2673787" cy="4002828"/>
+            <a:off x="432524" y="1582208"/>
+            <a:ext cx="2673787" cy="3771160"/>
           </a:xfrm>
         </p:spPr>
         <p:txBody>
@@ -1630,8 +1630,8 @@
         </p:nvSpPr>
         <p:spPr>
           <a:xfrm>
-            <a:off x="3184952" y="1679406"/>
-            <a:ext cx="2673787" cy="4002828"/>
+            <a:off x="3184952" y="1582208"/>
+            <a:ext cx="2673787" cy="3771160"/>
           </a:xfrm>
         </p:spPr>
         <p:txBody>
@@ -1692,7 +1692,7 @@
           <a:p>
             <a:fld id="{3F6A62D9-65B6-4743-B091-3F210FFD6B26}" type="datetimeFigureOut">
               <a:rPr lang="en-US" smtClean="0"/>
-              <a:t>8/17/21</a:t>
+              <a:t>8/18/21</a:t>
             </a:fld>
             <a:endParaRPr lang="en-US"/>
           </a:p>
@@ -1743,7 +1743,7 @@
     </p:spTree>
     <p:extLst>
       <p:ext uri="{BB962C8B-B14F-4D97-AF65-F5344CB8AC3E}">
-        <p14:creationId xmlns:p14="http://schemas.microsoft.com/office/powerpoint/2010/main" val="3510193938"/>
+        <p14:creationId xmlns:p14="http://schemas.microsoft.com/office/powerpoint/2010/main" val="2034321673"/>
       </p:ext>
     </p:extLst>
   </p:cSld>
@@ -1782,8 +1782,8 @@
         </p:nvSpPr>
         <p:spPr>
           <a:xfrm>
-            <a:off x="433344" y="335883"/>
-            <a:ext cx="5426214" cy="1219395"/>
+            <a:off x="433344" y="316443"/>
+            <a:ext cx="5426214" cy="1148821"/>
           </a:xfrm>
         </p:spPr>
         <p:txBody>
@@ -1810,8 +1810,8 @@
         </p:nvSpPr>
         <p:spPr>
           <a:xfrm>
-            <a:off x="433344" y="1546514"/>
-            <a:ext cx="2661499" cy="757923"/>
+            <a:off x="433344" y="1457008"/>
+            <a:ext cx="2661499" cy="714057"/>
           </a:xfrm>
         </p:spPr>
         <p:txBody>
@@ -1875,8 +1875,8 @@
         </p:nvSpPr>
         <p:spPr>
           <a:xfrm>
-            <a:off x="433344" y="2304437"/>
-            <a:ext cx="2661499" cy="3389480"/>
+            <a:off x="433344" y="2171065"/>
+            <a:ext cx="2661499" cy="3193310"/>
           </a:xfrm>
         </p:spPr>
         <p:txBody>
@@ -1932,8 +1932,8 @@
         </p:nvSpPr>
         <p:spPr>
           <a:xfrm>
-            <a:off x="3184952" y="1546514"/>
-            <a:ext cx="2674606" cy="757923"/>
+            <a:off x="3184952" y="1457008"/>
+            <a:ext cx="2674606" cy="714057"/>
           </a:xfrm>
         </p:spPr>
         <p:txBody>
@@ -1997,8 +1997,8 @@
         </p:nvSpPr>
         <p:spPr>
           <a:xfrm>
-            <a:off x="3184952" y="2304437"/>
-            <a:ext cx="2674606" cy="3389480"/>
+            <a:off x="3184952" y="2171065"/>
+            <a:ext cx="2674606" cy="3193310"/>
           </a:xfrm>
         </p:spPr>
         <p:txBody>
@@ -2059,7 +2059,7 @@
           <a:p>
             <a:fld id="{3F6A62D9-65B6-4743-B091-3F210FFD6B26}" type="datetimeFigureOut">
               <a:rPr lang="en-US" smtClean="0"/>
-              <a:t>8/17/21</a:t>
+              <a:t>8/18/21</a:t>
             </a:fld>
             <a:endParaRPr lang="en-US"/>
           </a:p>
@@ -2110,7 +2110,7 @@
     </p:spTree>
     <p:extLst>
       <p:ext uri="{BB962C8B-B14F-4D97-AF65-F5344CB8AC3E}">
-        <p14:creationId xmlns:p14="http://schemas.microsoft.com/office/powerpoint/2010/main" val="3461308158"/>
+        <p14:creationId xmlns:p14="http://schemas.microsoft.com/office/powerpoint/2010/main" val="2387344152"/>
       </p:ext>
     </p:extLst>
   </p:cSld>
@@ -2177,7 +2177,7 @@
           <a:p>
             <a:fld id="{3F6A62D9-65B6-4743-B091-3F210FFD6B26}" type="datetimeFigureOut">
               <a:rPr lang="en-US" smtClean="0"/>
-              <a:t>8/17/21</a:t>
+              <a:t>8/18/21</a:t>
             </a:fld>
             <a:endParaRPr lang="en-US"/>
           </a:p>
@@ -2228,7 +2228,7 @@
     </p:spTree>
     <p:extLst>
       <p:ext uri="{BB962C8B-B14F-4D97-AF65-F5344CB8AC3E}">
-        <p14:creationId xmlns:p14="http://schemas.microsoft.com/office/powerpoint/2010/main" val="515300044"/>
+        <p14:creationId xmlns:p14="http://schemas.microsoft.com/office/powerpoint/2010/main" val="3955190713"/>
       </p:ext>
     </p:extLst>
   </p:cSld>
@@ -2272,7 +2272,7 @@
           <a:p>
             <a:fld id="{3F6A62D9-65B6-4743-B091-3F210FFD6B26}" type="datetimeFigureOut">
               <a:rPr lang="en-US" smtClean="0"/>
-              <a:t>8/17/21</a:t>
+              <a:t>8/18/21</a:t>
             </a:fld>
             <a:endParaRPr lang="en-US"/>
           </a:p>
@@ -2323,7 +2323,7 @@
     </p:spTree>
     <p:extLst>
       <p:ext uri="{BB962C8B-B14F-4D97-AF65-F5344CB8AC3E}">
-        <p14:creationId xmlns:p14="http://schemas.microsoft.com/office/powerpoint/2010/main" val="503087150"/>
+        <p14:creationId xmlns:p14="http://schemas.microsoft.com/office/powerpoint/2010/main" val="2312048656"/>
       </p:ext>
     </p:extLst>
   </p:cSld>
@@ -2362,8 +2362,8 @@
         </p:nvSpPr>
         <p:spPr>
           <a:xfrm>
-            <a:off x="433344" y="420582"/>
-            <a:ext cx="2029096" cy="1472036"/>
+            <a:off x="433344" y="396240"/>
+            <a:ext cx="2029096" cy="1386840"/>
           </a:xfrm>
         </p:spPr>
         <p:txBody>
@@ -2394,8 +2394,8 @@
         </p:nvSpPr>
         <p:spPr>
           <a:xfrm>
-            <a:off x="2674606" y="908341"/>
-            <a:ext cx="3184952" cy="4483284"/>
+            <a:off x="2674606" y="855770"/>
+            <a:ext cx="3184952" cy="4223808"/>
           </a:xfrm>
         </p:spPr>
         <p:txBody>
@@ -2479,8 +2479,8 @@
         </p:nvSpPr>
         <p:spPr>
           <a:xfrm>
-            <a:off x="433344" y="1892618"/>
-            <a:ext cx="2029096" cy="3506308"/>
+            <a:off x="433344" y="1783080"/>
+            <a:ext cx="2029096" cy="3303376"/>
           </a:xfrm>
         </p:spPr>
         <p:txBody>
@@ -2549,7 +2549,7 @@
           <a:p>
             <a:fld id="{3F6A62D9-65B6-4743-B091-3F210FFD6B26}" type="datetimeFigureOut">
               <a:rPr lang="en-US" smtClean="0"/>
-              <a:t>8/17/21</a:t>
+              <a:t>8/18/21</a:t>
             </a:fld>
             <a:endParaRPr lang="en-US"/>
           </a:p>
@@ -2600,7 +2600,7 @@
     </p:spTree>
     <p:extLst>
       <p:ext uri="{BB962C8B-B14F-4D97-AF65-F5344CB8AC3E}">
-        <p14:creationId xmlns:p14="http://schemas.microsoft.com/office/powerpoint/2010/main" val="1458838898"/>
+        <p14:creationId xmlns:p14="http://schemas.microsoft.com/office/powerpoint/2010/main" val="1571560998"/>
       </p:ext>
     </p:extLst>
   </p:cSld>
@@ -2639,8 +2639,8 @@
         </p:nvSpPr>
         <p:spPr>
           <a:xfrm>
-            <a:off x="433344" y="420582"/>
-            <a:ext cx="2029096" cy="1472036"/>
+            <a:off x="433344" y="396240"/>
+            <a:ext cx="2029096" cy="1386840"/>
           </a:xfrm>
         </p:spPr>
         <p:txBody>
@@ -2671,8 +2671,8 @@
         </p:nvSpPr>
         <p:spPr>
           <a:xfrm>
-            <a:off x="2674606" y="908341"/>
-            <a:ext cx="3184952" cy="4483284"/>
+            <a:off x="2674606" y="855770"/>
+            <a:ext cx="3184952" cy="4223808"/>
           </a:xfrm>
         </p:spPr>
         <p:txBody>
@@ -2736,8 +2736,8 @@
         </p:nvSpPr>
         <p:spPr>
           <a:xfrm>
-            <a:off x="433344" y="1892618"/>
-            <a:ext cx="2029096" cy="3506308"/>
+            <a:off x="433344" y="1783080"/>
+            <a:ext cx="2029096" cy="3303376"/>
           </a:xfrm>
         </p:spPr>
         <p:txBody>
@@ -2806,7 +2806,7 @@
           <a:p>
             <a:fld id="{3F6A62D9-65B6-4743-B091-3F210FFD6B26}" type="datetimeFigureOut">
               <a:rPr lang="en-US" smtClean="0"/>
-              <a:t>8/17/21</a:t>
+              <a:t>8/18/21</a:t>
             </a:fld>
             <a:endParaRPr lang="en-US"/>
           </a:p>
@@ -2857,7 +2857,7 @@
     </p:spTree>
     <p:extLst>
       <p:ext uri="{BB962C8B-B14F-4D97-AF65-F5344CB8AC3E}">
-        <p14:creationId xmlns:p14="http://schemas.microsoft.com/office/powerpoint/2010/main" val="2687918306"/>
+        <p14:creationId xmlns:p14="http://schemas.microsoft.com/office/powerpoint/2010/main" val="2638509036"/>
       </p:ext>
     </p:extLst>
   </p:cSld>
@@ -2901,8 +2901,8 @@
         </p:nvSpPr>
         <p:spPr>
           <a:xfrm>
-            <a:off x="432525" y="335883"/>
-            <a:ext cx="5426214" cy="1219395"/>
+            <a:off x="432525" y="316443"/>
+            <a:ext cx="5426214" cy="1148821"/>
           </a:xfrm>
           <a:prstGeom prst="rect">
             <a:avLst/>
@@ -2934,8 +2934,8 @@
         </p:nvSpPr>
         <p:spPr>
           <a:xfrm>
-            <a:off x="432525" y="1679406"/>
-            <a:ext cx="5426214" cy="4002828"/>
+            <a:off x="432525" y="1582208"/>
+            <a:ext cx="5426214" cy="3771160"/>
           </a:xfrm>
           <a:prstGeom prst="rect">
             <a:avLst/>
@@ -2996,8 +2996,8 @@
         </p:nvSpPr>
         <p:spPr>
           <a:xfrm>
-            <a:off x="432524" y="5847255"/>
-            <a:ext cx="1415534" cy="335881"/>
+            <a:off x="432524" y="5508838"/>
+            <a:ext cx="1415534" cy="316442"/>
           </a:xfrm>
           <a:prstGeom prst="rect">
             <a:avLst/>
@@ -3019,7 +3019,7 @@
           <a:p>
             <a:fld id="{3F6A62D9-65B6-4743-B091-3F210FFD6B26}" type="datetimeFigureOut">
               <a:rPr lang="en-US" smtClean="0"/>
-              <a:t>8/17/21</a:t>
+              <a:t>8/18/21</a:t>
             </a:fld>
             <a:endParaRPr lang="en-US"/>
           </a:p>
@@ -3037,8 +3037,8 @@
         </p:nvSpPr>
         <p:spPr>
           <a:xfrm>
-            <a:off x="2083981" y="5847255"/>
-            <a:ext cx="2123301" cy="335881"/>
+            <a:off x="2083981" y="5508838"/>
+            <a:ext cx="2123301" cy="316442"/>
           </a:xfrm>
           <a:prstGeom prst="rect">
             <a:avLst/>
@@ -3074,8 +3074,8 @@
         </p:nvSpPr>
         <p:spPr>
           <a:xfrm>
-            <a:off x="4443205" y="5847255"/>
-            <a:ext cx="1415534" cy="335881"/>
+            <a:off x="4443205" y="5508838"/>
+            <a:ext cx="1415534" cy="316442"/>
           </a:xfrm>
           <a:prstGeom prst="rect">
             <a:avLst/>
@@ -3106,23 +3106,23 @@
     </p:spTree>
     <p:extLst>
       <p:ext uri="{BB962C8B-B14F-4D97-AF65-F5344CB8AC3E}">
-        <p14:creationId xmlns:p14="http://schemas.microsoft.com/office/powerpoint/2010/main" val="4069398579"/>
+        <p14:creationId xmlns:p14="http://schemas.microsoft.com/office/powerpoint/2010/main" val="3888865353"/>
       </p:ext>
     </p:extLst>
   </p:cSld>
   <p:clrMap bg1="lt1" tx1="dk1" bg2="lt2" tx2="dk2" accent1="accent1" accent2="accent2" accent3="accent3" accent4="accent4" accent5="accent5" accent6="accent6" hlink="hlink" folHlink="folHlink"/>
   <p:sldLayoutIdLst>
-    <p:sldLayoutId id="2147483841" r:id="rId1"/>
-    <p:sldLayoutId id="2147483842" r:id="rId2"/>
-    <p:sldLayoutId id="2147483843" r:id="rId3"/>
-    <p:sldLayoutId id="2147483844" r:id="rId4"/>
-    <p:sldLayoutId id="2147483845" r:id="rId5"/>
-    <p:sldLayoutId id="2147483846" r:id="rId6"/>
-    <p:sldLayoutId id="2147483847" r:id="rId7"/>
-    <p:sldLayoutId id="2147483848" r:id="rId8"/>
-    <p:sldLayoutId id="2147483849" r:id="rId9"/>
-    <p:sldLayoutId id="2147483850" r:id="rId10"/>
-    <p:sldLayoutId id="2147483851" r:id="rId11"/>
+    <p:sldLayoutId id="2147483877" r:id="rId1"/>
+    <p:sldLayoutId id="2147483878" r:id="rId2"/>
+    <p:sldLayoutId id="2147483879" r:id="rId3"/>
+    <p:sldLayoutId id="2147483880" r:id="rId4"/>
+    <p:sldLayoutId id="2147483881" r:id="rId5"/>
+    <p:sldLayoutId id="2147483882" r:id="rId6"/>
+    <p:sldLayoutId id="2147483883" r:id="rId7"/>
+    <p:sldLayoutId id="2147483884" r:id="rId8"/>
+    <p:sldLayoutId id="2147483885" r:id="rId9"/>
+    <p:sldLayoutId id="2147483886" r:id="rId10"/>
+    <p:sldLayoutId id="2147483887" r:id="rId11"/>
   </p:sldLayoutIdLst>
   <p:txStyles>
     <p:titleStyle>
@@ -3446,7 +3446,7 @@
         </p:nvGrpSpPr>
         <p:grpSpPr>
           <a:xfrm>
-            <a:off x="584212" y="1797860"/>
+            <a:off x="584217" y="1722039"/>
             <a:ext cx="4585053" cy="123318"/>
             <a:chOff x="912682" y="5732888"/>
             <a:chExt cx="7331385" cy="197183"/>
@@ -3971,7 +3971,7 @@
         </p:nvGrpSpPr>
         <p:grpSpPr>
           <a:xfrm>
-            <a:off x="1715569" y="3371258"/>
+            <a:off x="1715574" y="3295442"/>
             <a:ext cx="4291153" cy="127571"/>
             <a:chOff x="2721695" y="8252513"/>
             <a:chExt cx="6861446" cy="203983"/>
@@ -4501,7 +4501,7 @@
         </p:nvGrpSpPr>
         <p:grpSpPr>
           <a:xfrm>
-            <a:off x="1797928" y="748931"/>
+            <a:off x="1797933" y="673110"/>
             <a:ext cx="4457489" cy="123318"/>
             <a:chOff x="2834335" y="2359939"/>
             <a:chExt cx="7127413" cy="197183"/>
@@ -4943,7 +4943,7 @@
         </p:nvGrpSpPr>
         <p:grpSpPr>
           <a:xfrm>
-            <a:off x="1783477" y="1273396"/>
+            <a:off x="1783482" y="1197575"/>
             <a:ext cx="3443295" cy="123318"/>
             <a:chOff x="2811229" y="4039690"/>
             <a:chExt cx="5505742" cy="197183"/>
@@ -5350,7 +5350,7 @@
         </p:nvGrpSpPr>
         <p:grpSpPr>
           <a:xfrm>
-            <a:off x="25334" y="2322325"/>
+            <a:off x="25337" y="2246504"/>
             <a:ext cx="5176943" cy="123318"/>
             <a:chOff x="19050" y="6572763"/>
             <a:chExt cx="8277803" cy="197183"/>
@@ -5949,7 +5949,7 @@
         </p:nvGrpSpPr>
         <p:grpSpPr>
           <a:xfrm>
-            <a:off x="1770775" y="2846789"/>
+            <a:off x="1770775" y="2770968"/>
             <a:ext cx="3844388" cy="123318"/>
             <a:chOff x="2809973" y="7412638"/>
             <a:chExt cx="6147081" cy="197183"/>
@@ -6419,7 +6419,7 @@
         </p:nvGrpSpPr>
         <p:grpSpPr>
           <a:xfrm>
-            <a:off x="1766406" y="3899975"/>
+            <a:off x="1766406" y="3824159"/>
             <a:ext cx="4315298" cy="124923"/>
             <a:chOff x="2802988" y="9099188"/>
             <a:chExt cx="6900053" cy="199749"/>
@@ -6885,7 +6885,7 @@
         </p:nvGrpSpPr>
         <p:grpSpPr>
           <a:xfrm>
-            <a:off x="1749843" y="4426057"/>
+            <a:off x="1749848" y="4350241"/>
             <a:ext cx="3588909" cy="123319"/>
             <a:chOff x="2776497" y="9941638"/>
             <a:chExt cx="5738575" cy="197183"/>
@@ -7295,8 +7295,8 @@
         </p:nvSpPr>
         <p:spPr>
           <a:xfrm>
-            <a:off x="1259656" y="29680"/>
-            <a:ext cx="3755104" cy="246221"/>
+            <a:off x="449678" y="15712"/>
+            <a:ext cx="1371600" cy="153888"/>
           </a:xfrm>
           <a:prstGeom prst="rect">
             <a:avLst/>
@@ -7304,7 +7304,7 @@
           <a:noFill/>
         </p:spPr>
         <p:txBody>
-          <a:bodyPr wrap="square" rtlCol="0">
+          <a:bodyPr wrap="square" lIns="0" tIns="0" rIns="0" bIns="0" rtlCol="0" anchor="b" anchorCtr="0">
             <a:spAutoFit/>
           </a:bodyPr>
           <a:lstStyle/>
@@ -7318,7 +7318,7 @@
                   </a:schemeClr>
                 </a:solidFill>
               </a:rPr>
-              <a:t>B1A: Contig 194:22723-8169 (B1B: Contig 194:22669-8137)</a:t>
+              <a:t>B1A</a:t>
             </a:r>
           </a:p>
         </p:txBody>
@@ -7337,8 +7337,8 @@
         </p:nvSpPr>
         <p:spPr>
           <a:xfrm>
-            <a:off x="1259657" y="515465"/>
-            <a:ext cx="4677322" cy="246221"/>
+            <a:off x="449678" y="501497"/>
+            <a:ext cx="1371600" cy="153888"/>
           </a:xfrm>
           <a:prstGeom prst="rect">
             <a:avLst/>
@@ -7346,7 +7346,7 @@
           <a:noFill/>
         </p:spPr>
         <p:txBody>
-          <a:bodyPr wrap="square" rtlCol="0">
+          <a:bodyPr wrap="square" lIns="0" tIns="0" rIns="0" bIns="0" rtlCol="0" anchor="b" anchorCtr="0">
             <a:spAutoFit/>
           </a:bodyPr>
           <a:lstStyle/>
@@ -7360,7 +7360,7 @@
                   </a:schemeClr>
                 </a:solidFill>
               </a:rPr>
-              <a:t>B1A: Contig 194:62827-47556 (B1B: Contig 194: 62770-47499)</a:t>
+              <a:t>B1A</a:t>
             </a:r>
           </a:p>
         </p:txBody>
@@ -7379,8 +7379,8 @@
         </p:nvSpPr>
         <p:spPr>
           <a:xfrm>
-            <a:off x="1259655" y="1040579"/>
-            <a:ext cx="4683128" cy="246221"/>
+            <a:off x="449678" y="1026611"/>
+            <a:ext cx="1371600" cy="153888"/>
           </a:xfrm>
           <a:prstGeom prst="rect">
             <a:avLst/>
@@ -7388,7 +7388,7 @@
           <a:noFill/>
         </p:spPr>
         <p:txBody>
-          <a:bodyPr wrap="square" rtlCol="0">
+          <a:bodyPr wrap="square" lIns="0" tIns="0" rIns="0" bIns="0" rtlCol="0" anchor="b" anchorCtr="0">
             <a:spAutoFit/>
           </a:bodyPr>
           <a:lstStyle/>
@@ -7402,27 +7402,8 @@
                   </a:schemeClr>
                 </a:solidFill>
               </a:rPr>
-              <a:t>B1A: Contig 254: 3335-15076 (B1B: </a:t>
-            </a:r>
-            <a:r>
-              <a:rPr lang="en-US" sz="1000" i="1">
-                <a:solidFill>
-                  <a:schemeClr val="tx1">
-                    <a:lumMod val="65000"/>
-                    <a:lumOff val="35000"/>
-                  </a:schemeClr>
-                </a:solidFill>
-              </a:rPr>
-              <a:t>Contig 278:3335-15076)</a:t>
-            </a:r>
-            <a:endParaRPr lang="en-US" sz="1000" i="1" dirty="0">
-              <a:solidFill>
-                <a:schemeClr val="tx1">
-                  <a:lumMod val="65000"/>
-                  <a:lumOff val="35000"/>
-                </a:schemeClr>
-              </a:solidFill>
-            </a:endParaRPr>
+              <a:t>B1A</a:t>
+            </a:r>
           </a:p>
         </p:txBody>
       </p:sp>
@@ -7440,8 +7421,8 @@
         </p:nvSpPr>
         <p:spPr>
           <a:xfrm>
-            <a:off x="1259656" y="1565693"/>
-            <a:ext cx="3453816" cy="246221"/>
+            <a:off x="449678" y="1551725"/>
+            <a:ext cx="1371600" cy="153888"/>
           </a:xfrm>
           <a:prstGeom prst="rect">
             <a:avLst/>
@@ -7449,7 +7430,7 @@
           <a:noFill/>
         </p:spPr>
         <p:txBody>
-          <a:bodyPr wrap="square" rtlCol="0">
+          <a:bodyPr wrap="square" lIns="0" tIns="0" rIns="0" bIns="0" rtlCol="0" anchor="b" anchorCtr="0">
             <a:spAutoFit/>
           </a:bodyPr>
           <a:lstStyle/>
@@ -7476,17 +7457,14 @@
               </a:rPr>
               <a:t>thetaiotaomicron</a:t>
             </a:r>
-            <a:r>
-              <a:rPr lang="en-US" sz="1000" i="1" dirty="0">
-                <a:solidFill>
-                  <a:schemeClr val="tx1">
-                    <a:lumMod val="65000"/>
-                    <a:lumOff val="35000"/>
-                  </a:schemeClr>
-                </a:solidFill>
-              </a:rPr>
-              <a:t>: AE015928.1:4816693-4800873</a:t>
-            </a:r>
+            <a:endParaRPr lang="en-US" sz="1000" i="1" dirty="0">
+              <a:solidFill>
+                <a:schemeClr val="tx1">
+                  <a:lumMod val="65000"/>
+                  <a:lumOff val="35000"/>
+                </a:schemeClr>
+              </a:solidFill>
+            </a:endParaRPr>
           </a:p>
         </p:txBody>
       </p:sp>
@@ -7504,8 +7482,8 @@
         </p:nvSpPr>
         <p:spPr>
           <a:xfrm>
-            <a:off x="1259660" y="2090808"/>
-            <a:ext cx="3526751" cy="246221"/>
+            <a:off x="449678" y="2076840"/>
+            <a:ext cx="1371600" cy="153888"/>
           </a:xfrm>
           <a:prstGeom prst="rect">
             <a:avLst/>
@@ -7513,7 +7491,7 @@
           <a:noFill/>
         </p:spPr>
         <p:txBody>
-          <a:bodyPr wrap="square" rtlCol="0">
+          <a:bodyPr wrap="square" lIns="0" tIns="0" rIns="0" bIns="0" rtlCol="0" anchor="b" anchorCtr="0">
             <a:spAutoFit/>
           </a:bodyPr>
           <a:lstStyle/>
@@ -7540,17 +7518,14 @@
               </a:rPr>
               <a:t>ovatus</a:t>
             </a:r>
-            <a:r>
-              <a:rPr lang="en-US" sz="1000" i="1" dirty="0">
-                <a:solidFill>
-                  <a:schemeClr val="tx1">
-                    <a:lumMod val="65000"/>
-                    <a:lumOff val="35000"/>
-                  </a:schemeClr>
-                </a:solidFill>
-              </a:rPr>
-              <a:t>: CP012938.1:4920554-4902937</a:t>
-            </a:r>
+            <a:endParaRPr lang="en-US" sz="1000" i="1" dirty="0">
+              <a:solidFill>
+                <a:schemeClr val="tx1">
+                  <a:lumMod val="65000"/>
+                  <a:lumOff val="35000"/>
+                </a:schemeClr>
+              </a:solidFill>
+            </a:endParaRPr>
           </a:p>
         </p:txBody>
       </p:sp>
@@ -7568,8 +7543,8 @@
         </p:nvSpPr>
         <p:spPr>
           <a:xfrm>
-            <a:off x="1259660" y="2615923"/>
-            <a:ext cx="2427001" cy="246221"/>
+            <a:off x="449677" y="2601955"/>
+            <a:ext cx="1371600" cy="153888"/>
           </a:xfrm>
           <a:prstGeom prst="rect">
             <a:avLst/>
@@ -7577,7 +7552,7 @@
           <a:noFill/>
         </p:spPr>
         <p:txBody>
-          <a:bodyPr wrap="square" rtlCol="0">
+          <a:bodyPr wrap="square" lIns="0" tIns="0" rIns="0" bIns="0" rtlCol="0" anchor="b" anchorCtr="0">
             <a:spAutoFit/>
           </a:bodyPr>
           <a:lstStyle/>
@@ -7591,7 +7566,7 @@
                   </a:schemeClr>
                 </a:solidFill>
               </a:rPr>
-              <a:t>B3: Contig 11:16869-3851 </a:t>
+              <a:t>B3</a:t>
             </a:r>
           </a:p>
         </p:txBody>
@@ -7610,8 +7585,8 @@
         </p:nvSpPr>
         <p:spPr>
           <a:xfrm>
-            <a:off x="1259660" y="3141037"/>
-            <a:ext cx="2427001" cy="246221"/>
+            <a:off x="449677" y="3127069"/>
+            <a:ext cx="1371600" cy="153888"/>
           </a:xfrm>
           <a:prstGeom prst="rect">
             <a:avLst/>
@@ -7619,7 +7594,7 @@
           <a:noFill/>
         </p:spPr>
         <p:txBody>
-          <a:bodyPr wrap="square" rtlCol="0">
+          <a:bodyPr wrap="square" lIns="0" tIns="0" rIns="0" bIns="0" rtlCol="0" anchor="b" anchorCtr="0">
             <a:spAutoFit/>
           </a:bodyPr>
           <a:lstStyle/>
@@ -7633,7 +7608,7 @@
                   </a:schemeClr>
                 </a:solidFill>
               </a:rPr>
-              <a:t>B2: Contig 112:23001-8411 </a:t>
+              <a:t>B2</a:t>
             </a:r>
           </a:p>
         </p:txBody>
@@ -7652,8 +7627,8 @@
         </p:nvSpPr>
         <p:spPr>
           <a:xfrm>
-            <a:off x="1259660" y="3666151"/>
-            <a:ext cx="3526751" cy="246221"/>
+            <a:off x="449678" y="3652183"/>
+            <a:ext cx="1371600" cy="153888"/>
           </a:xfrm>
           <a:prstGeom prst="rect">
             <a:avLst/>
@@ -7661,7 +7636,7 @@
           <a:noFill/>
         </p:spPr>
         <p:txBody>
-          <a:bodyPr wrap="square" rtlCol="0">
+          <a:bodyPr wrap="square" lIns="0" tIns="0" rIns="0" bIns="0" rtlCol="0" anchor="b" anchorCtr="0">
             <a:spAutoFit/>
           </a:bodyPr>
           <a:lstStyle/>
@@ -7688,17 +7663,14 @@
               </a:rPr>
               <a:t>thetaiotaomicron</a:t>
             </a:r>
-            <a:r>
-              <a:rPr lang="en-US" sz="1000" i="1" dirty="0">
-                <a:solidFill>
-                  <a:schemeClr val="tx1">
-                    <a:lumMod val="65000"/>
-                    <a:lumOff val="35000"/>
-                  </a:schemeClr>
-                </a:solidFill>
-              </a:rPr>
-              <a:t>: AE015928.1:3925662-3910956</a:t>
-            </a:r>
+            <a:endParaRPr lang="en-US" sz="1000" i="1" dirty="0">
+              <a:solidFill>
+                <a:schemeClr val="tx1">
+                  <a:lumMod val="65000"/>
+                  <a:lumOff val="35000"/>
+                </a:schemeClr>
+              </a:solidFill>
+            </a:endParaRPr>
           </a:p>
         </p:txBody>
       </p:sp>
@@ -7716,8 +7688,8 @@
         </p:nvSpPr>
         <p:spPr>
           <a:xfrm>
-            <a:off x="1259656" y="4191267"/>
-            <a:ext cx="3904624" cy="246221"/>
+            <a:off x="449678" y="4177299"/>
+            <a:ext cx="1371600" cy="153888"/>
           </a:xfrm>
           <a:prstGeom prst="rect">
             <a:avLst/>
@@ -7725,7 +7697,7 @@
           <a:noFill/>
         </p:spPr>
         <p:txBody>
-          <a:bodyPr wrap="square" rtlCol="0">
+          <a:bodyPr wrap="square" lIns="0" tIns="0" rIns="0" bIns="0" rtlCol="0" anchor="b" anchorCtr="0">
             <a:spAutoFit/>
           </a:bodyPr>
           <a:lstStyle/>
@@ -7752,1086 +7724,1062 @@
               </a:rPr>
               <a:t>ovatus</a:t>
             </a:r>
-            <a:r>
-              <a:rPr lang="en-US" sz="1000" i="1" dirty="0">
-                <a:solidFill>
-                  <a:schemeClr val="tx1">
-                    <a:lumMod val="65000"/>
-                    <a:lumOff val="35000"/>
-                  </a:schemeClr>
-                </a:solidFill>
-              </a:rPr>
-              <a:t>: CP012938.1:3991117-3977382</a:t>
-            </a:r>
-          </a:p>
-        </p:txBody>
-      </p:sp>
-      <p:grpSp>
-        <p:nvGrpSpPr>
-          <p:cNvPr id="721" name="Group 720">
+            <a:endParaRPr lang="en-US" sz="1000" i="1" dirty="0">
+              <a:solidFill>
+                <a:schemeClr val="tx1">
+                  <a:lumMod val="65000"/>
+                  <a:lumOff val="35000"/>
+                </a:schemeClr>
+              </a:solidFill>
+            </a:endParaRPr>
+          </a:p>
+        </p:txBody>
+      </p:sp>
+      <p:sp>
+        <p:nvSpPr>
+          <p:cNvPr id="697" name="Right Arrow 696">
             <a:extLst>
               <a:ext uri="{FF2B5EF4-FFF2-40B4-BE49-F238E27FC236}">
-                <a16:creationId xmlns:a16="http://schemas.microsoft.com/office/drawing/2014/main" id="{CACCE670-1FB1-E147-96BD-726766AB8D33}"/>
+                <a16:creationId xmlns:a16="http://schemas.microsoft.com/office/drawing/2014/main" id="{1FAFAF51-722C-3442-8B78-3B801147F6F7}"/>
               </a:ext>
             </a:extLst>
           </p:cNvPr>
-          <p:cNvGrpSpPr/>
+          <p:cNvSpPr/>
           <p:nvPr/>
-        </p:nvGrpSpPr>
-        <p:grpSpPr>
+        </p:nvSpPr>
+        <p:spPr>
           <a:xfrm>
-            <a:off x="147837" y="4829801"/>
-            <a:ext cx="3734252" cy="1373512"/>
-            <a:chOff x="587017" y="12329978"/>
-            <a:chExt cx="5970975" cy="2196210"/>
+            <a:off x="280735" y="5169567"/>
+            <a:ext cx="1725195" cy="123318"/>
           </a:xfrm>
-        </p:grpSpPr>
-        <p:sp>
-          <p:nvSpPr>
-            <p:cNvPr id="697" name="Right Arrow 696">
-              <a:extLst>
-                <a:ext uri="{FF2B5EF4-FFF2-40B4-BE49-F238E27FC236}">
-                  <a16:creationId xmlns:a16="http://schemas.microsoft.com/office/drawing/2014/main" id="{1FAFAF51-722C-3442-8B78-3B801147F6F7}"/>
-                </a:ext>
-              </a:extLst>
-            </p:cNvPr>
-            <p:cNvSpPr/>
-            <p:nvPr/>
-          </p:nvSpPr>
-          <p:spPr>
-            <a:xfrm>
-              <a:off x="588317" y="12994491"/>
-              <a:ext cx="2758544" cy="197183"/>
-            </a:xfrm>
-            <a:prstGeom prst="rightArrow">
-              <a:avLst>
-                <a:gd name="adj1" fmla="val 100000"/>
-                <a:gd name="adj2" fmla="val 50000"/>
-              </a:avLst>
-            </a:prstGeom>
+          <a:prstGeom prst="rightArrow">
+            <a:avLst>
+              <a:gd name="adj1" fmla="val 100000"/>
+              <a:gd name="adj2" fmla="val 50000"/>
+            </a:avLst>
+          </a:prstGeom>
+          <a:solidFill>
+            <a:schemeClr val="accent1">
+              <a:lumMod val="40000"/>
+              <a:lumOff val="60000"/>
+            </a:schemeClr>
+          </a:solidFill>
+          <a:ln>
+            <a:noFill/>
+          </a:ln>
+        </p:spPr>
+        <p:style>
+          <a:lnRef idx="2">
+            <a:schemeClr val="accent1">
+              <a:shade val="50000"/>
+            </a:schemeClr>
+          </a:lnRef>
+          <a:fillRef idx="1">
+            <a:schemeClr val="accent1"/>
+          </a:fillRef>
+          <a:effectRef idx="0">
+            <a:schemeClr val="accent1"/>
+          </a:effectRef>
+          <a:fontRef idx="minor">
+            <a:schemeClr val="lt1"/>
+          </a:fontRef>
+        </p:style>
+        <p:txBody>
+          <a:bodyPr rtlCol="0" anchor="ctr"/>
+          <a:lstStyle/>
+          <a:p>
+            <a:pPr algn="ctr"/>
+            <a:r>
+              <a:rPr lang="en-US" sz="688" dirty="0">
+                <a:solidFill>
+                  <a:schemeClr val="tx1"/>
+                </a:solidFill>
+              </a:rPr>
+              <a:t>starch binding (CBM20, CBM26, CBM69)</a:t>
+            </a:r>
+          </a:p>
+        </p:txBody>
+      </p:sp>
+      <p:sp>
+        <p:nvSpPr>
+          <p:cNvPr id="698" name="Right Arrow 697">
+            <a:extLst>
+              <a:ext uri="{FF2B5EF4-FFF2-40B4-BE49-F238E27FC236}">
+                <a16:creationId xmlns:a16="http://schemas.microsoft.com/office/drawing/2014/main" id="{2C0B564D-03BF-5145-A21A-2656E21657C0}"/>
+              </a:ext>
+            </a:extLst>
+          </p:cNvPr>
+          <p:cNvSpPr/>
+          <p:nvPr/>
+        </p:nvSpPr>
+        <p:spPr>
+          <a:xfrm>
+            <a:off x="280731" y="4961945"/>
+            <a:ext cx="1717766" cy="123318"/>
+          </a:xfrm>
+          <a:prstGeom prst="rightArrow">
+            <a:avLst>
+              <a:gd name="adj1" fmla="val 100000"/>
+              <a:gd name="adj2" fmla="val 50000"/>
+            </a:avLst>
+          </a:prstGeom>
+          <a:solidFill>
+            <a:schemeClr val="bg2">
+              <a:lumMod val="50000"/>
+            </a:schemeClr>
+          </a:solidFill>
+          <a:ln w="28575">
+            <a:noFill/>
+          </a:ln>
+        </p:spPr>
+        <p:style>
+          <a:lnRef idx="2">
+            <a:schemeClr val="accent1">
+              <a:shade val="50000"/>
+            </a:schemeClr>
+          </a:lnRef>
+          <a:fillRef idx="1">
+            <a:schemeClr val="accent1"/>
+          </a:fillRef>
+          <a:effectRef idx="0">
+            <a:schemeClr val="accent1"/>
+          </a:effectRef>
+          <a:fontRef idx="minor">
+            <a:schemeClr val="lt1"/>
+          </a:fontRef>
+        </p:style>
+        <p:txBody>
+          <a:bodyPr rtlCol="0" anchor="ctr"/>
+          <a:lstStyle/>
+          <a:p>
+            <a:pPr algn="ctr"/>
+            <a:r>
+              <a:rPr lang="en-US" sz="688" dirty="0" err="1"/>
+              <a:t>susC</a:t>
+            </a:r>
+            <a:r>
+              <a:rPr lang="en-US" sz="688" dirty="0"/>
+              <a:t> and D</a:t>
+            </a:r>
+          </a:p>
+        </p:txBody>
+      </p:sp>
+      <p:sp>
+        <p:nvSpPr>
+          <p:cNvPr id="699" name="Right Arrow 698">
+            <a:extLst>
+              <a:ext uri="{FF2B5EF4-FFF2-40B4-BE49-F238E27FC236}">
+                <a16:creationId xmlns:a16="http://schemas.microsoft.com/office/drawing/2014/main" id="{EC9E1C2E-C714-D245-8061-1236CB6142D5}"/>
+              </a:ext>
+            </a:extLst>
+          </p:cNvPr>
+          <p:cNvSpPr/>
+          <p:nvPr/>
+        </p:nvSpPr>
+        <p:spPr>
+          <a:xfrm>
+            <a:off x="280736" y="5379683"/>
+            <a:ext cx="1725197" cy="123318"/>
+          </a:xfrm>
+          <a:prstGeom prst="rightArrow">
+            <a:avLst>
+              <a:gd name="adj1" fmla="val 100000"/>
+              <a:gd name="adj2" fmla="val 50000"/>
+            </a:avLst>
+          </a:prstGeom>
+          <a:solidFill>
+            <a:srgbClr val="FECDAD"/>
+          </a:solidFill>
+          <a:ln>
+            <a:noFill/>
+          </a:ln>
+        </p:spPr>
+        <p:style>
+          <a:lnRef idx="2">
+            <a:schemeClr val="accent1">
+              <a:shade val="50000"/>
+            </a:schemeClr>
+          </a:lnRef>
+          <a:fillRef idx="1">
+            <a:schemeClr val="accent1"/>
+          </a:fillRef>
+          <a:effectRef idx="0">
+            <a:schemeClr val="accent1"/>
+          </a:effectRef>
+          <a:fontRef idx="minor">
+            <a:schemeClr val="lt1"/>
+          </a:fontRef>
+        </p:style>
+        <p:txBody>
+          <a:bodyPr rtlCol="0" anchor="ctr"/>
+          <a:lstStyle/>
+          <a:p>
+            <a:pPr algn="ctr"/>
+            <a:r>
+              <a:rPr lang="el-GR" sz="688" dirty="0">
+                <a:solidFill>
+                  <a:schemeClr val="tx1"/>
+                </a:solidFill>
+              </a:rPr>
+              <a:t>α-</a:t>
+            </a:r>
+            <a:r>
+              <a:rPr lang="en-US" sz="688" dirty="0">
+                <a:solidFill>
+                  <a:schemeClr val="tx1"/>
+                </a:solidFill>
+              </a:rPr>
+              <a:t>glucosidase (GH31, GH97)</a:t>
+            </a:r>
+          </a:p>
+        </p:txBody>
+      </p:sp>
+      <p:sp>
+        <p:nvSpPr>
+          <p:cNvPr id="700" name="Right Arrow 699">
+            <a:extLst>
+              <a:ext uri="{FF2B5EF4-FFF2-40B4-BE49-F238E27FC236}">
+                <a16:creationId xmlns:a16="http://schemas.microsoft.com/office/drawing/2014/main" id="{CA568BAD-2C94-C54A-9A00-9EC52E538C3A}"/>
+              </a:ext>
+            </a:extLst>
+          </p:cNvPr>
+          <p:cNvSpPr/>
+          <p:nvPr/>
+        </p:nvSpPr>
+        <p:spPr>
+          <a:xfrm>
+            <a:off x="2119690" y="4987865"/>
+            <a:ext cx="1730470" cy="123318"/>
+          </a:xfrm>
+          <a:prstGeom prst="rightArrow">
+            <a:avLst>
+              <a:gd name="adj1" fmla="val 100000"/>
+              <a:gd name="adj2" fmla="val 50000"/>
+            </a:avLst>
+          </a:prstGeom>
+          <a:solidFill>
+            <a:srgbClr val="FFB9B7"/>
+          </a:solidFill>
+          <a:ln w="28575">
+            <a:noFill/>
+          </a:ln>
+        </p:spPr>
+        <p:style>
+          <a:lnRef idx="2">
+            <a:schemeClr val="accent1">
+              <a:shade val="50000"/>
+            </a:schemeClr>
+          </a:lnRef>
+          <a:fillRef idx="1">
+            <a:schemeClr val="accent1"/>
+          </a:fillRef>
+          <a:effectRef idx="0">
+            <a:schemeClr val="accent1"/>
+          </a:effectRef>
+          <a:fontRef idx="minor">
+            <a:schemeClr val="lt1"/>
+          </a:fontRef>
+        </p:style>
+        <p:txBody>
+          <a:bodyPr rtlCol="0" anchor="ctr"/>
+          <a:lstStyle/>
+          <a:p>
+            <a:pPr algn="ctr"/>
+            <a:r>
+              <a:rPr lang="el-GR" sz="688" dirty="0">
+                <a:solidFill>
+                  <a:schemeClr val="tx1"/>
+                </a:solidFill>
+              </a:rPr>
+              <a:t>α-</a:t>
+            </a:r>
+            <a:r>
+              <a:rPr lang="en-US" sz="688" dirty="0">
+                <a:solidFill>
+                  <a:schemeClr val="tx1"/>
+                </a:solidFill>
+              </a:rPr>
+              <a:t>amylase (GH13)</a:t>
+            </a:r>
+          </a:p>
+        </p:txBody>
+      </p:sp>
+      <p:sp>
+        <p:nvSpPr>
+          <p:cNvPr id="701" name="Right Arrow 700">
+            <a:extLst>
+              <a:ext uri="{FF2B5EF4-FFF2-40B4-BE49-F238E27FC236}">
+                <a16:creationId xmlns:a16="http://schemas.microsoft.com/office/drawing/2014/main" id="{B06D8364-C7F4-8C4F-AF0E-42CDE2A48D37}"/>
+              </a:ext>
+            </a:extLst>
+          </p:cNvPr>
+          <p:cNvSpPr/>
+          <p:nvPr/>
+        </p:nvSpPr>
+        <p:spPr>
+          <a:xfrm>
+            <a:off x="2120492" y="5372814"/>
+            <a:ext cx="1715682" cy="123318"/>
+          </a:xfrm>
+          <a:prstGeom prst="rightArrow">
+            <a:avLst>
+              <a:gd name="adj1" fmla="val 100000"/>
+              <a:gd name="adj2" fmla="val 50000"/>
+            </a:avLst>
+          </a:prstGeom>
+          <a:solidFill>
+            <a:schemeClr val="bg2"/>
+          </a:solidFill>
+          <a:ln>
+            <a:noFill/>
+          </a:ln>
+        </p:spPr>
+        <p:style>
+          <a:lnRef idx="2">
+            <a:schemeClr val="accent1">
+              <a:shade val="50000"/>
+            </a:schemeClr>
+          </a:lnRef>
+          <a:fillRef idx="1">
+            <a:schemeClr val="accent1"/>
+          </a:fillRef>
+          <a:effectRef idx="0">
+            <a:schemeClr val="accent1"/>
+          </a:effectRef>
+          <a:fontRef idx="minor">
+            <a:schemeClr val="lt1"/>
+          </a:fontRef>
+        </p:style>
+        <p:txBody>
+          <a:bodyPr rtlCol="0" anchor="ctr"/>
+          <a:lstStyle/>
+          <a:p>
+            <a:pPr algn="ctr"/>
+            <a:r>
+              <a:rPr lang="en-US" sz="688" dirty="0">
+                <a:solidFill>
+                  <a:schemeClr val="tx1"/>
+                </a:solidFill>
+              </a:rPr>
+              <a:t>other or no predicted function</a:t>
+            </a:r>
+          </a:p>
+        </p:txBody>
+      </p:sp>
+      <p:sp>
+        <p:nvSpPr>
+          <p:cNvPr id="702" name="Right Arrow 701">
+            <a:extLst>
+              <a:ext uri="{FF2B5EF4-FFF2-40B4-BE49-F238E27FC236}">
+                <a16:creationId xmlns:a16="http://schemas.microsoft.com/office/drawing/2014/main" id="{C4AAC07E-AEA5-C44D-9ADC-A7663C38D088}"/>
+              </a:ext>
+            </a:extLst>
+          </p:cNvPr>
+          <p:cNvSpPr/>
+          <p:nvPr/>
+        </p:nvSpPr>
+        <p:spPr>
+          <a:xfrm>
+            <a:off x="2123349" y="5180340"/>
+            <a:ext cx="1715682" cy="123318"/>
+          </a:xfrm>
+          <a:prstGeom prst="rightArrow">
+            <a:avLst>
+              <a:gd name="adj1" fmla="val 100000"/>
+              <a:gd name="adj2" fmla="val 50000"/>
+            </a:avLst>
+          </a:prstGeom>
+          <a:solidFill>
+            <a:srgbClr val="FFF2AE"/>
+          </a:solidFill>
+          <a:ln w="28575">
+            <a:noFill/>
+          </a:ln>
+        </p:spPr>
+        <p:style>
+          <a:lnRef idx="2">
+            <a:schemeClr val="accent1">
+              <a:shade val="50000"/>
+            </a:schemeClr>
+          </a:lnRef>
+          <a:fillRef idx="1">
+            <a:schemeClr val="accent1"/>
+          </a:fillRef>
+          <a:effectRef idx="0">
+            <a:schemeClr val="accent1"/>
+          </a:effectRef>
+          <a:fontRef idx="minor">
+            <a:schemeClr val="lt1"/>
+          </a:fontRef>
+        </p:style>
+        <p:txBody>
+          <a:bodyPr rtlCol="0" anchor="ctr"/>
+          <a:lstStyle/>
+          <a:p>
+            <a:pPr lvl="0" algn="ctr"/>
+            <a:r>
+              <a:rPr lang="en-US" sz="688" dirty="0">
+                <a:solidFill>
+                  <a:prstClr val="black"/>
+                </a:solidFill>
+              </a:rPr>
+              <a:t>dextranase (GH66)</a:t>
+            </a:r>
+          </a:p>
+        </p:txBody>
+      </p:sp>
+      <p:sp>
+        <p:nvSpPr>
+          <p:cNvPr id="704" name="Right Arrow 703">
+            <a:extLst>
+              <a:ext uri="{FF2B5EF4-FFF2-40B4-BE49-F238E27FC236}">
+                <a16:creationId xmlns:a16="http://schemas.microsoft.com/office/drawing/2014/main" id="{B9CC7196-A64C-7443-9FC0-CBAEC0AF1AC2}"/>
+              </a:ext>
+            </a:extLst>
+          </p:cNvPr>
+          <p:cNvSpPr/>
+          <p:nvPr/>
+        </p:nvSpPr>
+        <p:spPr>
+          <a:xfrm>
+            <a:off x="4280164" y="4961945"/>
+            <a:ext cx="1715682" cy="137160"/>
+          </a:xfrm>
+          <a:prstGeom prst="rightArrow">
+            <a:avLst>
+              <a:gd name="adj1" fmla="val 100000"/>
+              <a:gd name="adj2" fmla="val 50000"/>
+            </a:avLst>
+          </a:prstGeom>
+          <a:solidFill>
+            <a:schemeClr val="bg2"/>
+          </a:solidFill>
+          <a:ln>
+            <a:noFill/>
+          </a:ln>
+        </p:spPr>
+        <p:style>
+          <a:lnRef idx="2">
+            <a:schemeClr val="accent1">
+              <a:shade val="50000"/>
+            </a:schemeClr>
+          </a:lnRef>
+          <a:fillRef idx="1">
+            <a:schemeClr val="accent1"/>
+          </a:fillRef>
+          <a:effectRef idx="0">
+            <a:schemeClr val="accent1"/>
+          </a:effectRef>
+          <a:fontRef idx="minor">
+            <a:schemeClr val="lt1"/>
+          </a:fontRef>
+        </p:style>
+        <p:txBody>
+          <a:bodyPr rtlCol="0" anchor="ctr"/>
+          <a:lstStyle/>
+          <a:p>
+            <a:pPr algn="ctr"/>
+            <a:r>
+              <a:rPr lang="en-US" sz="751" dirty="0">
+                <a:solidFill>
+                  <a:schemeClr val="tx1"/>
+                </a:solidFill>
+              </a:rPr>
+              <a:t>cytoplasmic</a:t>
+            </a:r>
+          </a:p>
+        </p:txBody>
+      </p:sp>
+      <p:sp>
+        <p:nvSpPr>
+          <p:cNvPr id="705" name="Right Arrow 704">
+            <a:extLst>
+              <a:ext uri="{FF2B5EF4-FFF2-40B4-BE49-F238E27FC236}">
+                <a16:creationId xmlns:a16="http://schemas.microsoft.com/office/drawing/2014/main" id="{7BFB2DE9-D80D-404E-87A9-3037E0269B49}"/>
+              </a:ext>
+            </a:extLst>
+          </p:cNvPr>
+          <p:cNvSpPr/>
+          <p:nvPr/>
+        </p:nvSpPr>
+        <p:spPr>
+          <a:xfrm>
+            <a:off x="4280164" y="5164007"/>
+            <a:ext cx="1715682" cy="137160"/>
+          </a:xfrm>
+          <a:prstGeom prst="rightArrow">
+            <a:avLst>
+              <a:gd name="adj1" fmla="val 100000"/>
+              <a:gd name="adj2" fmla="val 50000"/>
+            </a:avLst>
+          </a:prstGeom>
+          <a:solidFill>
+            <a:schemeClr val="bg2"/>
+          </a:solidFill>
+          <a:ln w="12700">
             <a:solidFill>
-              <a:schemeClr val="accent1">
-                <a:lumMod val="40000"/>
-                <a:lumOff val="60000"/>
-              </a:schemeClr>
+              <a:schemeClr val="tx1"/>
             </a:solidFill>
-            <a:ln>
-              <a:noFill/>
-            </a:ln>
-          </p:spPr>
-          <p:style>
-            <a:lnRef idx="2">
-              <a:schemeClr val="accent1">
-                <a:shade val="50000"/>
-              </a:schemeClr>
-            </a:lnRef>
-            <a:fillRef idx="1">
-              <a:schemeClr val="accent1"/>
-            </a:fillRef>
-            <a:effectRef idx="0">
-              <a:schemeClr val="accent1"/>
-            </a:effectRef>
-            <a:fontRef idx="minor">
-              <a:schemeClr val="lt1"/>
-            </a:fontRef>
-          </p:style>
-          <p:txBody>
-            <a:bodyPr rtlCol="0" anchor="ctr"/>
-            <a:lstStyle/>
-            <a:p>
-              <a:pPr algn="ctr"/>
-              <a:r>
-                <a:rPr lang="en-US" sz="688" dirty="0">
-                  <a:solidFill>
-                    <a:schemeClr val="tx1"/>
-                  </a:solidFill>
-                </a:rPr>
-                <a:t>starch binding (CBM20, CBM26, CBM69)</a:t>
-              </a:r>
-            </a:p>
-          </p:txBody>
-        </p:sp>
-        <p:sp>
-          <p:nvSpPr>
-            <p:cNvPr id="698" name="Right Arrow 697">
-              <a:extLst>
-                <a:ext uri="{FF2B5EF4-FFF2-40B4-BE49-F238E27FC236}">
-                  <a16:creationId xmlns:a16="http://schemas.microsoft.com/office/drawing/2014/main" id="{2C0B564D-03BF-5145-A21A-2656E21657C0}"/>
-                </a:ext>
-              </a:extLst>
-            </p:cNvPr>
-            <p:cNvSpPr/>
-            <p:nvPr/>
-          </p:nvSpPr>
-          <p:spPr>
-            <a:xfrm>
-              <a:off x="588318" y="12662509"/>
-              <a:ext cx="2746665" cy="197183"/>
-            </a:xfrm>
-            <a:prstGeom prst="rightArrow">
-              <a:avLst>
-                <a:gd name="adj1" fmla="val 100000"/>
-                <a:gd name="adj2" fmla="val 50000"/>
-              </a:avLst>
-            </a:prstGeom>
+          </a:ln>
+        </p:spPr>
+        <p:style>
+          <a:lnRef idx="2">
+            <a:schemeClr val="accent1">
+              <a:shade val="50000"/>
+            </a:schemeClr>
+          </a:lnRef>
+          <a:fillRef idx="1">
+            <a:schemeClr val="accent1"/>
+          </a:fillRef>
+          <a:effectRef idx="0">
+            <a:schemeClr val="accent1"/>
+          </a:effectRef>
+          <a:fontRef idx="minor">
+            <a:schemeClr val="lt1"/>
+          </a:fontRef>
+        </p:style>
+        <p:txBody>
+          <a:bodyPr rtlCol="0" anchor="ctr"/>
+          <a:lstStyle/>
+          <a:p>
+            <a:pPr algn="ctr"/>
+            <a:r>
+              <a:rPr lang="en-US" sz="751" dirty="0">
+                <a:solidFill>
+                  <a:schemeClr val="tx1"/>
+                </a:solidFill>
+              </a:rPr>
+              <a:t>exported</a:t>
+            </a:r>
+          </a:p>
+        </p:txBody>
+      </p:sp>
+      <p:sp>
+        <p:nvSpPr>
+          <p:cNvPr id="706" name="Right Arrow 705">
+            <a:extLst>
+              <a:ext uri="{FF2B5EF4-FFF2-40B4-BE49-F238E27FC236}">
+                <a16:creationId xmlns:a16="http://schemas.microsoft.com/office/drawing/2014/main" id="{F8C2A5F6-7A93-5B48-B2F3-2DD4AF05133F}"/>
+              </a:ext>
+            </a:extLst>
+          </p:cNvPr>
+          <p:cNvSpPr/>
+          <p:nvPr/>
+        </p:nvSpPr>
+        <p:spPr>
+          <a:xfrm>
+            <a:off x="4280164" y="5366069"/>
+            <a:ext cx="1715682" cy="137160"/>
+          </a:xfrm>
+          <a:prstGeom prst="rightArrow">
+            <a:avLst>
+              <a:gd name="adj1" fmla="val 100000"/>
+              <a:gd name="adj2" fmla="val 50000"/>
+            </a:avLst>
+          </a:prstGeom>
+          <a:solidFill>
+            <a:schemeClr val="bg2"/>
+          </a:solidFill>
+          <a:ln w="28575">
             <a:solidFill>
-              <a:schemeClr val="bg2">
-                <a:lumMod val="50000"/>
-              </a:schemeClr>
+              <a:schemeClr val="tx1"/>
             </a:solidFill>
-            <a:ln w="28575">
-              <a:noFill/>
-            </a:ln>
-          </p:spPr>
-          <p:style>
-            <a:lnRef idx="2">
-              <a:schemeClr val="accent1">
-                <a:shade val="50000"/>
-              </a:schemeClr>
-            </a:lnRef>
-            <a:fillRef idx="1">
-              <a:schemeClr val="accent1"/>
-            </a:fillRef>
-            <a:effectRef idx="0">
-              <a:schemeClr val="accent1"/>
-            </a:effectRef>
-            <a:fontRef idx="minor">
-              <a:schemeClr val="lt1"/>
-            </a:fontRef>
-          </p:style>
-          <p:txBody>
-            <a:bodyPr rtlCol="0" anchor="ctr"/>
-            <a:lstStyle/>
-            <a:p>
-              <a:pPr algn="ctr"/>
-              <a:r>
-                <a:rPr lang="en-US" sz="688" dirty="0" err="1"/>
-                <a:t>susC</a:t>
-              </a:r>
-              <a:r>
-                <a:rPr lang="en-US" sz="688" dirty="0"/>
-                <a:t> and D</a:t>
-              </a:r>
-            </a:p>
-          </p:txBody>
-        </p:sp>
-        <p:sp>
-          <p:nvSpPr>
-            <p:cNvPr id="699" name="Right Arrow 698">
-              <a:extLst>
-                <a:ext uri="{FF2B5EF4-FFF2-40B4-BE49-F238E27FC236}">
-                  <a16:creationId xmlns:a16="http://schemas.microsoft.com/office/drawing/2014/main" id="{EC9E1C2E-C714-D245-8061-1236CB6142D5}"/>
-                </a:ext>
-              </a:extLst>
-            </p:cNvPr>
-            <p:cNvSpPr/>
-            <p:nvPr/>
-          </p:nvSpPr>
-          <p:spPr>
-            <a:xfrm>
-              <a:off x="588318" y="13330461"/>
-              <a:ext cx="2758546" cy="197183"/>
-            </a:xfrm>
-            <a:prstGeom prst="rightArrow">
-              <a:avLst>
-                <a:gd name="adj1" fmla="val 100000"/>
-                <a:gd name="adj2" fmla="val 50000"/>
-              </a:avLst>
-            </a:prstGeom>
+          </a:ln>
+        </p:spPr>
+        <p:style>
+          <a:lnRef idx="2">
+            <a:schemeClr val="accent1">
+              <a:shade val="50000"/>
+            </a:schemeClr>
+          </a:lnRef>
+          <a:fillRef idx="1">
+            <a:schemeClr val="accent1"/>
+          </a:fillRef>
+          <a:effectRef idx="0">
+            <a:schemeClr val="accent1"/>
+          </a:effectRef>
+          <a:fontRef idx="minor">
+            <a:schemeClr val="lt1"/>
+          </a:fontRef>
+        </p:style>
+        <p:txBody>
+          <a:bodyPr rtlCol="0" anchor="ctr"/>
+          <a:lstStyle/>
+          <a:p>
+            <a:pPr algn="ctr"/>
+            <a:r>
+              <a:rPr lang="en-US" sz="751" dirty="0">
+                <a:solidFill>
+                  <a:schemeClr val="tx1"/>
+                </a:solidFill>
+              </a:rPr>
+              <a:t>exported + </a:t>
+            </a:r>
+            <a:r>
+              <a:rPr lang="en-US" sz="751" dirty="0" err="1">
+                <a:solidFill>
+                  <a:schemeClr val="tx1"/>
+                </a:solidFill>
+              </a:rPr>
+              <a:t>lipidated</a:t>
+            </a:r>
+            <a:r>
+              <a:rPr lang="en-US" sz="751" dirty="0">
+                <a:solidFill>
+                  <a:schemeClr val="tx1"/>
+                </a:solidFill>
+              </a:rPr>
+              <a:t> (OM)</a:t>
+            </a:r>
+          </a:p>
+        </p:txBody>
+      </p:sp>
+      <p:sp>
+        <p:nvSpPr>
+          <p:cNvPr id="707" name="Right Arrow 706">
+            <a:extLst>
+              <a:ext uri="{FF2B5EF4-FFF2-40B4-BE49-F238E27FC236}">
+                <a16:creationId xmlns:a16="http://schemas.microsoft.com/office/drawing/2014/main" id="{80330659-F462-7E45-81F2-52D8B0F4D22D}"/>
+              </a:ext>
+            </a:extLst>
+          </p:cNvPr>
+          <p:cNvSpPr/>
+          <p:nvPr/>
+        </p:nvSpPr>
+        <p:spPr>
+          <a:xfrm>
+            <a:off x="4280164" y="5568131"/>
+            <a:ext cx="1719072" cy="137160"/>
+          </a:xfrm>
+          <a:prstGeom prst="rightArrow">
+            <a:avLst>
+              <a:gd name="adj1" fmla="val 100000"/>
+              <a:gd name="adj2" fmla="val 50000"/>
+            </a:avLst>
+          </a:prstGeom>
+          <a:solidFill>
+            <a:schemeClr val="bg2"/>
+          </a:solidFill>
+          <a:ln w="28575">
             <a:solidFill>
-              <a:srgbClr val="FECDAD"/>
+              <a:schemeClr val="tx1"/>
             </a:solidFill>
-            <a:ln>
-              <a:noFill/>
-            </a:ln>
-          </p:spPr>
-          <p:style>
-            <a:lnRef idx="2">
-              <a:schemeClr val="accent1">
-                <a:shade val="50000"/>
-              </a:schemeClr>
-            </a:lnRef>
-            <a:fillRef idx="1">
-              <a:schemeClr val="accent1"/>
-            </a:fillRef>
-            <a:effectRef idx="0">
-              <a:schemeClr val="accent1"/>
-            </a:effectRef>
-            <a:fontRef idx="minor">
-              <a:schemeClr val="lt1"/>
-            </a:fontRef>
-          </p:style>
-          <p:txBody>
-            <a:bodyPr rtlCol="0" anchor="ctr"/>
-            <a:lstStyle/>
-            <a:p>
-              <a:pPr algn="ctr"/>
-              <a:r>
-                <a:rPr lang="el-GR" sz="688" dirty="0">
-                  <a:solidFill>
-                    <a:schemeClr val="tx1"/>
-                  </a:solidFill>
-                </a:rPr>
-                <a:t>α-</a:t>
-              </a:r>
-              <a:r>
-                <a:rPr lang="en-US" sz="688" dirty="0">
-                  <a:solidFill>
-                    <a:schemeClr val="tx1"/>
-                  </a:solidFill>
-                </a:rPr>
-                <a:t>glucosidase (GH31, GH97)</a:t>
-              </a:r>
-            </a:p>
-          </p:txBody>
-        </p:sp>
-        <p:sp>
-          <p:nvSpPr>
-            <p:cNvPr id="700" name="Right Arrow 699">
-              <a:extLst>
-                <a:ext uri="{FF2B5EF4-FFF2-40B4-BE49-F238E27FC236}">
-                  <a16:creationId xmlns:a16="http://schemas.microsoft.com/office/drawing/2014/main" id="{CA568BAD-2C94-C54A-9A00-9EC52E538C3A}"/>
-                </a:ext>
-              </a:extLst>
-            </p:cNvPr>
-            <p:cNvSpPr/>
-            <p:nvPr/>
-          </p:nvSpPr>
-          <p:spPr>
-            <a:xfrm>
-              <a:off x="588317" y="13662443"/>
-              <a:ext cx="2766978" cy="197183"/>
-            </a:xfrm>
-            <a:prstGeom prst="rightArrow">
-              <a:avLst>
-                <a:gd name="adj1" fmla="val 100000"/>
-                <a:gd name="adj2" fmla="val 50000"/>
-              </a:avLst>
-            </a:prstGeom>
+            <a:prstDash val="sysDash"/>
+          </a:ln>
+        </p:spPr>
+        <p:style>
+          <a:lnRef idx="2">
+            <a:schemeClr val="accent1">
+              <a:shade val="50000"/>
+            </a:schemeClr>
+          </a:lnRef>
+          <a:fillRef idx="1">
+            <a:schemeClr val="accent1"/>
+          </a:fillRef>
+          <a:effectRef idx="0">
+            <a:schemeClr val="accent1"/>
+          </a:effectRef>
+          <a:fontRef idx="minor">
+            <a:schemeClr val="lt1"/>
+          </a:fontRef>
+        </p:style>
+        <p:txBody>
+          <a:bodyPr rtlCol="0" anchor="ctr"/>
+          <a:lstStyle/>
+          <a:p>
+            <a:pPr algn="ctr"/>
+            <a:r>
+              <a:rPr lang="en-US" sz="751" dirty="0">
+                <a:solidFill>
+                  <a:schemeClr val="tx1"/>
+                </a:solidFill>
+              </a:rPr>
+              <a:t>exported + </a:t>
+            </a:r>
+            <a:r>
+              <a:rPr lang="en-US" sz="751" dirty="0" err="1">
+                <a:solidFill>
+                  <a:schemeClr val="tx1"/>
+                </a:solidFill>
+              </a:rPr>
+              <a:t>lipidated</a:t>
+            </a:r>
+            <a:r>
+              <a:rPr lang="en-US" sz="751" dirty="0">
+                <a:solidFill>
+                  <a:schemeClr val="tx1"/>
+                </a:solidFill>
+              </a:rPr>
+              <a:t> (IM)</a:t>
+            </a:r>
+          </a:p>
+        </p:txBody>
+      </p:sp>
+      <p:sp>
+        <p:nvSpPr>
+          <p:cNvPr id="708" name="Right Arrow 707">
+            <a:extLst>
+              <a:ext uri="{FF2B5EF4-FFF2-40B4-BE49-F238E27FC236}">
+                <a16:creationId xmlns:a16="http://schemas.microsoft.com/office/drawing/2014/main" id="{CB92DFFF-AA63-4049-8FEC-CBDB3A35C69D}"/>
+              </a:ext>
+            </a:extLst>
+          </p:cNvPr>
+          <p:cNvSpPr/>
+          <p:nvPr/>
+        </p:nvSpPr>
+        <p:spPr>
+          <a:xfrm>
+            <a:off x="1285307" y="5582814"/>
+            <a:ext cx="447814" cy="123318"/>
+          </a:xfrm>
+          <a:prstGeom prst="rightArrow">
+            <a:avLst>
+              <a:gd name="adj1" fmla="val 100000"/>
+              <a:gd name="adj2" fmla="val 50000"/>
+            </a:avLst>
+          </a:prstGeom>
+          <a:solidFill>
+            <a:schemeClr val="bg2"/>
+          </a:solidFill>
+          <a:ln>
+            <a:noFill/>
+          </a:ln>
+        </p:spPr>
+        <p:style>
+          <a:lnRef idx="2">
+            <a:schemeClr val="accent1">
+              <a:shade val="50000"/>
+            </a:schemeClr>
+          </a:lnRef>
+          <a:fillRef idx="1">
+            <a:schemeClr val="accent1"/>
+          </a:fillRef>
+          <a:effectRef idx="0">
+            <a:schemeClr val="accent1"/>
+          </a:effectRef>
+          <a:fontRef idx="minor">
+            <a:schemeClr val="lt1"/>
+          </a:fontRef>
+        </p:style>
+        <p:txBody>
+          <a:bodyPr rtlCol="0" anchor="ctr"/>
+          <a:lstStyle/>
+          <a:p>
+            <a:pPr algn="ctr"/>
+            <a:r>
+              <a:rPr lang="en-US" sz="751" i="1" dirty="0">
+                <a:solidFill>
+                  <a:schemeClr val="tx1"/>
+                </a:solidFill>
+              </a:rPr>
+              <a:t>1</a:t>
+            </a:r>
+          </a:p>
+        </p:txBody>
+      </p:sp>
+      <p:sp>
+        <p:nvSpPr>
+          <p:cNvPr id="709" name="Right Arrow 708">
+            <a:extLst>
+              <a:ext uri="{FF2B5EF4-FFF2-40B4-BE49-F238E27FC236}">
+                <a16:creationId xmlns:a16="http://schemas.microsoft.com/office/drawing/2014/main" id="{11B8FFA3-7DCA-0C4D-9AF3-8CA56390D83F}"/>
+              </a:ext>
+            </a:extLst>
+          </p:cNvPr>
+          <p:cNvSpPr/>
+          <p:nvPr/>
+        </p:nvSpPr>
+        <p:spPr>
+          <a:xfrm>
+            <a:off x="1285307" y="5748567"/>
+            <a:ext cx="447814" cy="123318"/>
+          </a:xfrm>
+          <a:prstGeom prst="rightArrow">
+            <a:avLst>
+              <a:gd name="adj1" fmla="val 100000"/>
+              <a:gd name="adj2" fmla="val 50000"/>
+            </a:avLst>
+          </a:prstGeom>
+          <a:solidFill>
+            <a:schemeClr val="bg2"/>
+          </a:solidFill>
+          <a:ln>
+            <a:noFill/>
+          </a:ln>
+        </p:spPr>
+        <p:style>
+          <a:lnRef idx="2">
+            <a:schemeClr val="accent1">
+              <a:shade val="50000"/>
+            </a:schemeClr>
+          </a:lnRef>
+          <a:fillRef idx="1">
+            <a:schemeClr val="accent1"/>
+          </a:fillRef>
+          <a:effectRef idx="0">
+            <a:schemeClr val="accent1"/>
+          </a:effectRef>
+          <a:fontRef idx="minor">
+            <a:schemeClr val="lt1"/>
+          </a:fontRef>
+        </p:style>
+        <p:txBody>
+          <a:bodyPr rtlCol="0" anchor="ctr"/>
+          <a:lstStyle/>
+          <a:p>
+            <a:pPr algn="ctr"/>
+            <a:r>
+              <a:rPr lang="en-US" sz="751" i="1" dirty="0">
+                <a:solidFill>
+                  <a:schemeClr val="tx1"/>
+                </a:solidFill>
+              </a:rPr>
+              <a:t>1</a:t>
+            </a:r>
+          </a:p>
+        </p:txBody>
+      </p:sp>
+      <p:cxnSp>
+        <p:nvCxnSpPr>
+          <p:cNvPr id="711" name="Straight Arrow Connector 710">
+            <a:extLst>
+              <a:ext uri="{FF2B5EF4-FFF2-40B4-BE49-F238E27FC236}">
+                <a16:creationId xmlns:a16="http://schemas.microsoft.com/office/drawing/2014/main" id="{A227D84F-9BBD-E546-9F3A-B07DDE27D324}"/>
+              </a:ext>
+            </a:extLst>
+          </p:cNvPr>
+          <p:cNvCxnSpPr>
+            <a:cxnSpLocks/>
+          </p:cNvCxnSpPr>
+          <p:nvPr/>
+        </p:nvCxnSpPr>
+        <p:spPr>
+          <a:xfrm flipH="1" flipV="1">
+            <a:off x="1525358" y="5640564"/>
+            <a:ext cx="335086" cy="56048"/>
+          </a:xfrm>
+          <a:prstGeom prst="straightConnector1">
+            <a:avLst/>
+          </a:prstGeom>
+          <a:ln>
+            <a:tailEnd type="triangle"/>
+          </a:ln>
+        </p:spPr>
+        <p:style>
+          <a:lnRef idx="1">
+            <a:schemeClr val="accent1"/>
+          </a:lnRef>
+          <a:fillRef idx="0">
+            <a:schemeClr val="accent1"/>
+          </a:fillRef>
+          <a:effectRef idx="0">
+            <a:schemeClr val="accent1"/>
+          </a:effectRef>
+          <a:fontRef idx="minor">
+            <a:schemeClr val="tx1"/>
+          </a:fontRef>
+        </p:style>
+      </p:cxnSp>
+      <p:cxnSp>
+        <p:nvCxnSpPr>
+          <p:cNvPr id="712" name="Straight Arrow Connector 711">
+            <a:extLst>
+              <a:ext uri="{FF2B5EF4-FFF2-40B4-BE49-F238E27FC236}">
+                <a16:creationId xmlns:a16="http://schemas.microsoft.com/office/drawing/2014/main" id="{29C7ABA2-FD22-414B-95B7-220128D6DEF8}"/>
+              </a:ext>
+            </a:extLst>
+          </p:cNvPr>
+          <p:cNvCxnSpPr>
+            <a:cxnSpLocks/>
+          </p:cNvCxnSpPr>
+          <p:nvPr/>
+        </p:nvCxnSpPr>
+        <p:spPr>
+          <a:xfrm flipH="1">
+            <a:off x="1534299" y="5721783"/>
+            <a:ext cx="326149" cy="88447"/>
+          </a:xfrm>
+          <a:prstGeom prst="straightConnector1">
+            <a:avLst/>
+          </a:prstGeom>
+          <a:ln>
+            <a:tailEnd type="triangle"/>
+          </a:ln>
+        </p:spPr>
+        <p:style>
+          <a:lnRef idx="1">
+            <a:schemeClr val="accent1"/>
+          </a:lnRef>
+          <a:fillRef idx="0">
+            <a:schemeClr val="accent1"/>
+          </a:fillRef>
+          <a:effectRef idx="0">
+            <a:schemeClr val="accent1"/>
+          </a:effectRef>
+          <a:fontRef idx="minor">
+            <a:schemeClr val="tx1"/>
+          </a:fontRef>
+        </p:style>
+      </p:cxnSp>
+      <p:sp>
+        <p:nvSpPr>
+          <p:cNvPr id="716" name="TextBox 715">
+            <a:extLst>
+              <a:ext uri="{FF2B5EF4-FFF2-40B4-BE49-F238E27FC236}">
+                <a16:creationId xmlns:a16="http://schemas.microsoft.com/office/drawing/2014/main" id="{EB3C8B6B-DD10-F845-8597-0B675CC9442F}"/>
+              </a:ext>
+            </a:extLst>
+          </p:cNvPr>
+          <p:cNvSpPr txBox="1"/>
+          <p:nvPr/>
+        </p:nvSpPr>
+        <p:spPr>
+          <a:xfrm>
+            <a:off x="1860444" y="5618535"/>
+            <a:ext cx="1241668" cy="184666"/>
+          </a:xfrm>
+          <a:prstGeom prst="rect">
+            <a:avLst/>
+          </a:prstGeom>
+          <a:noFill/>
+        </p:spPr>
+        <p:txBody>
+          <a:bodyPr wrap="square" rtlCol="0" anchor="ctr">
+            <a:spAutoFit/>
+          </a:bodyPr>
+          <a:lstStyle/>
+          <a:p>
+            <a:r>
+              <a:rPr lang="en-US" sz="600" dirty="0"/>
+              <a:t>Matching number = same OPF</a:t>
+            </a:r>
+          </a:p>
+        </p:txBody>
+      </p:sp>
+      <p:sp>
+        <p:nvSpPr>
+          <p:cNvPr id="718" name="Rectangle 717">
+            <a:extLst>
+              <a:ext uri="{FF2B5EF4-FFF2-40B4-BE49-F238E27FC236}">
+                <a16:creationId xmlns:a16="http://schemas.microsoft.com/office/drawing/2014/main" id="{8C967AE2-2CB5-C64D-B25D-CFF8D45E9F88}"/>
+              </a:ext>
+            </a:extLst>
+          </p:cNvPr>
+          <p:cNvSpPr/>
+          <p:nvPr/>
+        </p:nvSpPr>
+        <p:spPr>
+          <a:xfrm>
+            <a:off x="1214503" y="5551559"/>
+            <a:ext cx="1816805" cy="352251"/>
+          </a:xfrm>
+          <a:prstGeom prst="rect">
+            <a:avLst/>
+          </a:prstGeom>
+          <a:noFill/>
+          <a:ln>
             <a:solidFill>
-              <a:srgbClr val="FFB9B7"/>
+              <a:schemeClr val="tx1"/>
             </a:solidFill>
-            <a:ln w="28575">
-              <a:noFill/>
-            </a:ln>
-          </p:spPr>
-          <p:style>
-            <a:lnRef idx="2">
-              <a:schemeClr val="accent1">
-                <a:shade val="50000"/>
-              </a:schemeClr>
-            </a:lnRef>
-            <a:fillRef idx="1">
-              <a:schemeClr val="accent1"/>
-            </a:fillRef>
-            <a:effectRef idx="0">
-              <a:schemeClr val="accent1"/>
-            </a:effectRef>
-            <a:fontRef idx="minor">
-              <a:schemeClr val="lt1"/>
-            </a:fontRef>
-          </p:style>
-          <p:txBody>
-            <a:bodyPr rtlCol="0" anchor="ctr"/>
-            <a:lstStyle/>
-            <a:p>
-              <a:pPr algn="ctr"/>
-              <a:r>
-                <a:rPr lang="el-GR" sz="688" dirty="0">
-                  <a:solidFill>
-                    <a:schemeClr val="tx1"/>
-                  </a:solidFill>
-                </a:rPr>
-                <a:t>α-</a:t>
-              </a:r>
-              <a:r>
-                <a:rPr lang="en-US" sz="688" dirty="0">
-                  <a:solidFill>
-                    <a:schemeClr val="tx1"/>
-                  </a:solidFill>
-                </a:rPr>
-                <a:t>amylase (GH13)</a:t>
-              </a:r>
-            </a:p>
-          </p:txBody>
-        </p:sp>
-        <p:sp>
-          <p:nvSpPr>
-            <p:cNvPr id="701" name="Right Arrow 700">
-              <a:extLst>
-                <a:ext uri="{FF2B5EF4-FFF2-40B4-BE49-F238E27FC236}">
-                  <a16:creationId xmlns:a16="http://schemas.microsoft.com/office/drawing/2014/main" id="{B06D8364-C7F4-8C4F-AF0E-42CDE2A48D37}"/>
-                </a:ext>
-              </a:extLst>
-            </p:cNvPr>
-            <p:cNvSpPr/>
-            <p:nvPr/>
-          </p:nvSpPr>
-          <p:spPr>
-            <a:xfrm>
-              <a:off x="589600" y="14277967"/>
-              <a:ext cx="2743332" cy="197183"/>
-            </a:xfrm>
-            <a:prstGeom prst="rightArrow">
-              <a:avLst>
-                <a:gd name="adj1" fmla="val 100000"/>
-                <a:gd name="adj2" fmla="val 50000"/>
-              </a:avLst>
-            </a:prstGeom>
-            <a:solidFill>
-              <a:schemeClr val="bg2"/>
-            </a:solidFill>
-            <a:ln>
-              <a:noFill/>
-            </a:ln>
-          </p:spPr>
-          <p:style>
-            <a:lnRef idx="2">
-              <a:schemeClr val="accent1">
-                <a:shade val="50000"/>
-              </a:schemeClr>
-            </a:lnRef>
-            <a:fillRef idx="1">
-              <a:schemeClr val="accent1"/>
-            </a:fillRef>
-            <a:effectRef idx="0">
-              <a:schemeClr val="accent1"/>
-            </a:effectRef>
-            <a:fontRef idx="minor">
-              <a:schemeClr val="lt1"/>
-            </a:fontRef>
-          </p:style>
-          <p:txBody>
-            <a:bodyPr rtlCol="0" anchor="ctr"/>
-            <a:lstStyle/>
-            <a:p>
-              <a:pPr algn="ctr"/>
-              <a:r>
-                <a:rPr lang="en-US" sz="688" dirty="0">
-                  <a:solidFill>
-                    <a:schemeClr val="tx1"/>
-                  </a:solidFill>
-                </a:rPr>
-                <a:t>other or no predicted function</a:t>
-              </a:r>
-            </a:p>
-          </p:txBody>
-        </p:sp>
-        <p:sp>
-          <p:nvSpPr>
-            <p:cNvPr id="702" name="Right Arrow 701">
-              <a:extLst>
-                <a:ext uri="{FF2B5EF4-FFF2-40B4-BE49-F238E27FC236}">
-                  <a16:creationId xmlns:a16="http://schemas.microsoft.com/office/drawing/2014/main" id="{C4AAC07E-AEA5-C44D-9ADC-A7663C38D088}"/>
-                </a:ext>
-              </a:extLst>
-            </p:cNvPr>
-            <p:cNvSpPr/>
-            <p:nvPr/>
-          </p:nvSpPr>
-          <p:spPr>
-            <a:xfrm>
-              <a:off x="594167" y="13970205"/>
-              <a:ext cx="2743332" cy="197183"/>
-            </a:xfrm>
-            <a:prstGeom prst="rightArrow">
-              <a:avLst>
-                <a:gd name="adj1" fmla="val 100000"/>
-                <a:gd name="adj2" fmla="val 50000"/>
-              </a:avLst>
-            </a:prstGeom>
-            <a:solidFill>
-              <a:srgbClr val="FFF2AE"/>
-            </a:solidFill>
-            <a:ln w="28575">
-              <a:noFill/>
-            </a:ln>
-          </p:spPr>
-          <p:style>
-            <a:lnRef idx="2">
-              <a:schemeClr val="accent1">
-                <a:shade val="50000"/>
-              </a:schemeClr>
-            </a:lnRef>
-            <a:fillRef idx="1">
-              <a:schemeClr val="accent1"/>
-            </a:fillRef>
-            <a:effectRef idx="0">
-              <a:schemeClr val="accent1"/>
-            </a:effectRef>
-            <a:fontRef idx="minor">
-              <a:schemeClr val="lt1"/>
-            </a:fontRef>
-          </p:style>
-          <p:txBody>
-            <a:bodyPr rtlCol="0" anchor="ctr"/>
-            <a:lstStyle/>
-            <a:p>
-              <a:pPr lvl="0" algn="ctr"/>
-              <a:r>
-                <a:rPr lang="en-US" sz="688" dirty="0">
-                  <a:solidFill>
-                    <a:prstClr val="black"/>
-                  </a:solidFill>
-                </a:rPr>
-                <a:t>dextranase (GH66)</a:t>
-              </a:r>
-            </a:p>
-          </p:txBody>
-        </p:sp>
-        <p:sp>
-          <p:nvSpPr>
-            <p:cNvPr id="704" name="Right Arrow 703">
-              <a:extLst>
-                <a:ext uri="{FF2B5EF4-FFF2-40B4-BE49-F238E27FC236}">
-                  <a16:creationId xmlns:a16="http://schemas.microsoft.com/office/drawing/2014/main" id="{B9CC7196-A64C-7443-9FC0-CBAEC0AF1AC2}"/>
-                </a:ext>
-              </a:extLst>
-            </p:cNvPr>
-            <p:cNvSpPr/>
-            <p:nvPr/>
-          </p:nvSpPr>
-          <p:spPr>
-            <a:xfrm>
-              <a:off x="3652967" y="12662509"/>
-              <a:ext cx="2743332" cy="219315"/>
-            </a:xfrm>
-            <a:prstGeom prst="rightArrow">
-              <a:avLst>
-                <a:gd name="adj1" fmla="val 100000"/>
-                <a:gd name="adj2" fmla="val 50000"/>
-              </a:avLst>
-            </a:prstGeom>
-            <a:solidFill>
-              <a:schemeClr val="bg2"/>
-            </a:solidFill>
-            <a:ln>
-              <a:noFill/>
-            </a:ln>
-          </p:spPr>
-          <p:style>
-            <a:lnRef idx="2">
-              <a:schemeClr val="accent1">
-                <a:shade val="50000"/>
-              </a:schemeClr>
-            </a:lnRef>
-            <a:fillRef idx="1">
-              <a:schemeClr val="accent1"/>
-            </a:fillRef>
-            <a:effectRef idx="0">
-              <a:schemeClr val="accent1"/>
-            </a:effectRef>
-            <a:fontRef idx="minor">
-              <a:schemeClr val="lt1"/>
-            </a:fontRef>
-          </p:style>
-          <p:txBody>
-            <a:bodyPr rtlCol="0" anchor="ctr"/>
-            <a:lstStyle/>
-            <a:p>
-              <a:pPr algn="ctr"/>
-              <a:r>
-                <a:rPr lang="en-US" sz="751" dirty="0">
-                  <a:solidFill>
-                    <a:schemeClr val="tx1"/>
-                  </a:solidFill>
-                </a:rPr>
-                <a:t>cytoplasmic</a:t>
-              </a:r>
-            </a:p>
-          </p:txBody>
-        </p:sp>
-        <p:sp>
-          <p:nvSpPr>
-            <p:cNvPr id="705" name="Right Arrow 704">
-              <a:extLst>
-                <a:ext uri="{FF2B5EF4-FFF2-40B4-BE49-F238E27FC236}">
-                  <a16:creationId xmlns:a16="http://schemas.microsoft.com/office/drawing/2014/main" id="{7BFB2DE9-D80D-404E-87A9-3037E0269B49}"/>
-                </a:ext>
-              </a:extLst>
-            </p:cNvPr>
-            <p:cNvSpPr/>
-            <p:nvPr/>
-          </p:nvSpPr>
-          <p:spPr>
-            <a:xfrm>
-              <a:off x="3652967" y="12985601"/>
-              <a:ext cx="2743332" cy="219315"/>
-            </a:xfrm>
-            <a:prstGeom prst="rightArrow">
-              <a:avLst>
-                <a:gd name="adj1" fmla="val 100000"/>
-                <a:gd name="adj2" fmla="val 50000"/>
-              </a:avLst>
-            </a:prstGeom>
-            <a:solidFill>
-              <a:schemeClr val="bg2"/>
-            </a:solidFill>
-            <a:ln w="12700">
-              <a:solidFill>
-                <a:schemeClr val="tx1"/>
-              </a:solidFill>
-            </a:ln>
-          </p:spPr>
-          <p:style>
-            <a:lnRef idx="2">
-              <a:schemeClr val="accent1">
-                <a:shade val="50000"/>
-              </a:schemeClr>
-            </a:lnRef>
-            <a:fillRef idx="1">
-              <a:schemeClr val="accent1"/>
-            </a:fillRef>
-            <a:effectRef idx="0">
-              <a:schemeClr val="accent1"/>
-            </a:effectRef>
-            <a:fontRef idx="minor">
-              <a:schemeClr val="lt1"/>
-            </a:fontRef>
-          </p:style>
-          <p:txBody>
-            <a:bodyPr rtlCol="0" anchor="ctr"/>
-            <a:lstStyle/>
-            <a:p>
-              <a:pPr algn="ctr"/>
-              <a:r>
-                <a:rPr lang="en-US" sz="751" dirty="0">
-                  <a:solidFill>
-                    <a:schemeClr val="tx1"/>
-                  </a:solidFill>
-                </a:rPr>
-                <a:t>exported</a:t>
-              </a:r>
-            </a:p>
-          </p:txBody>
-        </p:sp>
-        <p:sp>
-          <p:nvSpPr>
-            <p:cNvPr id="706" name="Right Arrow 705">
-              <a:extLst>
-                <a:ext uri="{FF2B5EF4-FFF2-40B4-BE49-F238E27FC236}">
-                  <a16:creationId xmlns:a16="http://schemas.microsoft.com/office/drawing/2014/main" id="{F8C2A5F6-7A93-5B48-B2F3-2DD4AF05133F}"/>
-                </a:ext>
-              </a:extLst>
-            </p:cNvPr>
-            <p:cNvSpPr/>
-            <p:nvPr/>
-          </p:nvSpPr>
-          <p:spPr>
-            <a:xfrm>
-              <a:off x="3652967" y="13308692"/>
-              <a:ext cx="2743332" cy="219315"/>
-            </a:xfrm>
-            <a:prstGeom prst="rightArrow">
-              <a:avLst>
-                <a:gd name="adj1" fmla="val 100000"/>
-                <a:gd name="adj2" fmla="val 50000"/>
-              </a:avLst>
-            </a:prstGeom>
-            <a:solidFill>
-              <a:schemeClr val="bg2"/>
-            </a:solidFill>
-            <a:ln w="28575">
-              <a:solidFill>
-                <a:schemeClr val="tx1"/>
-              </a:solidFill>
-            </a:ln>
-          </p:spPr>
-          <p:style>
-            <a:lnRef idx="2">
-              <a:schemeClr val="accent1">
-                <a:shade val="50000"/>
-              </a:schemeClr>
-            </a:lnRef>
-            <a:fillRef idx="1">
-              <a:schemeClr val="accent1"/>
-            </a:fillRef>
-            <a:effectRef idx="0">
-              <a:schemeClr val="accent1"/>
-            </a:effectRef>
-            <a:fontRef idx="minor">
-              <a:schemeClr val="lt1"/>
-            </a:fontRef>
-          </p:style>
-          <p:txBody>
-            <a:bodyPr rtlCol="0" anchor="ctr"/>
-            <a:lstStyle/>
-            <a:p>
-              <a:pPr algn="ctr"/>
-              <a:r>
-                <a:rPr lang="en-US" sz="751" dirty="0">
-                  <a:solidFill>
-                    <a:schemeClr val="tx1"/>
-                  </a:solidFill>
-                </a:rPr>
-                <a:t>exported + </a:t>
-              </a:r>
-              <a:r>
-                <a:rPr lang="en-US" sz="751" dirty="0" err="1">
-                  <a:solidFill>
-                    <a:schemeClr val="tx1"/>
-                  </a:solidFill>
-                </a:rPr>
-                <a:t>lipidated</a:t>
-              </a:r>
-              <a:r>
-                <a:rPr lang="en-US" sz="751" dirty="0">
-                  <a:solidFill>
-                    <a:schemeClr val="tx1"/>
-                  </a:solidFill>
-                </a:rPr>
-                <a:t> (OM)</a:t>
-              </a:r>
-            </a:p>
-          </p:txBody>
-        </p:sp>
-        <p:sp>
-          <p:nvSpPr>
-            <p:cNvPr id="707" name="Right Arrow 706">
-              <a:extLst>
-                <a:ext uri="{FF2B5EF4-FFF2-40B4-BE49-F238E27FC236}">
-                  <a16:creationId xmlns:a16="http://schemas.microsoft.com/office/drawing/2014/main" id="{80330659-F462-7E45-81F2-52D8B0F4D22D}"/>
-                </a:ext>
-              </a:extLst>
-            </p:cNvPr>
-            <p:cNvSpPr/>
-            <p:nvPr/>
-          </p:nvSpPr>
-          <p:spPr>
-            <a:xfrm>
-              <a:off x="3652967" y="13631784"/>
-              <a:ext cx="2748753" cy="219315"/>
-            </a:xfrm>
-            <a:prstGeom prst="rightArrow">
-              <a:avLst>
-                <a:gd name="adj1" fmla="val 100000"/>
-                <a:gd name="adj2" fmla="val 50000"/>
-              </a:avLst>
-            </a:prstGeom>
-            <a:solidFill>
-              <a:schemeClr val="bg2"/>
-            </a:solidFill>
-            <a:ln w="28575">
-              <a:solidFill>
-                <a:schemeClr val="tx1"/>
-              </a:solidFill>
-              <a:prstDash val="sysDash"/>
-            </a:ln>
-          </p:spPr>
-          <p:style>
-            <a:lnRef idx="2">
-              <a:schemeClr val="accent1">
-                <a:shade val="50000"/>
-              </a:schemeClr>
-            </a:lnRef>
-            <a:fillRef idx="1">
-              <a:schemeClr val="accent1"/>
-            </a:fillRef>
-            <a:effectRef idx="0">
-              <a:schemeClr val="accent1"/>
-            </a:effectRef>
-            <a:fontRef idx="minor">
-              <a:schemeClr val="lt1"/>
-            </a:fontRef>
-          </p:style>
-          <p:txBody>
-            <a:bodyPr rtlCol="0" anchor="ctr"/>
-            <a:lstStyle/>
-            <a:p>
-              <a:pPr algn="ctr"/>
-              <a:r>
-                <a:rPr lang="en-US" sz="751" dirty="0">
-                  <a:solidFill>
-                    <a:schemeClr val="tx1"/>
-                  </a:solidFill>
-                </a:rPr>
-                <a:t>exported + </a:t>
-              </a:r>
-              <a:r>
-                <a:rPr lang="en-US" sz="751" dirty="0" err="1">
-                  <a:solidFill>
-                    <a:schemeClr val="tx1"/>
-                  </a:solidFill>
-                </a:rPr>
-                <a:t>lipidated</a:t>
-              </a:r>
-              <a:r>
-                <a:rPr lang="en-US" sz="751" dirty="0">
-                  <a:solidFill>
-                    <a:schemeClr val="tx1"/>
-                  </a:solidFill>
-                </a:rPr>
-                <a:t> (IM)</a:t>
-              </a:r>
-            </a:p>
-          </p:txBody>
-        </p:sp>
-        <p:sp>
-          <p:nvSpPr>
-            <p:cNvPr id="708" name="Right Arrow 707">
-              <a:extLst>
-                <a:ext uri="{FF2B5EF4-FFF2-40B4-BE49-F238E27FC236}">
-                  <a16:creationId xmlns:a16="http://schemas.microsoft.com/office/drawing/2014/main" id="{CB92DFFF-AA63-4049-8FEC-CBDB3A35C69D}"/>
-                </a:ext>
-              </a:extLst>
-            </p:cNvPr>
-            <p:cNvSpPr/>
-            <p:nvPr/>
-          </p:nvSpPr>
-          <p:spPr>
-            <a:xfrm>
-              <a:off x="3652966" y="14012932"/>
-              <a:ext cx="716043" cy="197183"/>
-            </a:xfrm>
-            <a:prstGeom prst="rightArrow">
-              <a:avLst>
-                <a:gd name="adj1" fmla="val 100000"/>
-                <a:gd name="adj2" fmla="val 50000"/>
-              </a:avLst>
-            </a:prstGeom>
-            <a:solidFill>
-              <a:schemeClr val="bg2"/>
-            </a:solidFill>
-            <a:ln>
-              <a:noFill/>
-            </a:ln>
-          </p:spPr>
-          <p:style>
-            <a:lnRef idx="2">
-              <a:schemeClr val="accent1">
-                <a:shade val="50000"/>
-              </a:schemeClr>
-            </a:lnRef>
-            <a:fillRef idx="1">
-              <a:schemeClr val="accent1"/>
-            </a:fillRef>
-            <a:effectRef idx="0">
-              <a:schemeClr val="accent1"/>
-            </a:effectRef>
-            <a:fontRef idx="minor">
-              <a:schemeClr val="lt1"/>
-            </a:fontRef>
-          </p:style>
-          <p:txBody>
-            <a:bodyPr rtlCol="0" anchor="ctr"/>
-            <a:lstStyle/>
-            <a:p>
-              <a:pPr algn="ctr"/>
-              <a:r>
-                <a:rPr lang="en-US" sz="751" i="1" dirty="0">
-                  <a:solidFill>
-                    <a:schemeClr val="tx1"/>
-                  </a:solidFill>
-                </a:rPr>
-                <a:t>1</a:t>
-              </a:r>
-            </a:p>
-          </p:txBody>
-        </p:sp>
-        <p:sp>
-          <p:nvSpPr>
-            <p:cNvPr id="709" name="Right Arrow 708">
-              <a:extLst>
-                <a:ext uri="{FF2B5EF4-FFF2-40B4-BE49-F238E27FC236}">
-                  <a16:creationId xmlns:a16="http://schemas.microsoft.com/office/drawing/2014/main" id="{11B8FFA3-7DCA-0C4D-9AF3-8CA56390D83F}"/>
-                </a:ext>
-              </a:extLst>
-            </p:cNvPr>
-            <p:cNvSpPr/>
-            <p:nvPr/>
-          </p:nvSpPr>
-          <p:spPr>
-            <a:xfrm>
-              <a:off x="3652966" y="14277966"/>
-              <a:ext cx="716043" cy="197183"/>
-            </a:xfrm>
-            <a:prstGeom prst="rightArrow">
-              <a:avLst>
-                <a:gd name="adj1" fmla="val 100000"/>
-                <a:gd name="adj2" fmla="val 50000"/>
-              </a:avLst>
-            </a:prstGeom>
-            <a:solidFill>
-              <a:schemeClr val="bg2"/>
-            </a:solidFill>
-            <a:ln>
-              <a:noFill/>
-            </a:ln>
-          </p:spPr>
-          <p:style>
-            <a:lnRef idx="2">
-              <a:schemeClr val="accent1">
-                <a:shade val="50000"/>
-              </a:schemeClr>
-            </a:lnRef>
-            <a:fillRef idx="1">
-              <a:schemeClr val="accent1"/>
-            </a:fillRef>
-            <a:effectRef idx="0">
-              <a:schemeClr val="accent1"/>
-            </a:effectRef>
-            <a:fontRef idx="minor">
-              <a:schemeClr val="lt1"/>
-            </a:fontRef>
-          </p:style>
-          <p:txBody>
-            <a:bodyPr rtlCol="0" anchor="ctr"/>
-            <a:lstStyle/>
-            <a:p>
-              <a:pPr algn="ctr"/>
-              <a:r>
-                <a:rPr lang="en-US" sz="751" i="1" dirty="0">
-                  <a:solidFill>
-                    <a:schemeClr val="tx1"/>
-                  </a:solidFill>
-                </a:rPr>
-                <a:t>1</a:t>
-              </a:r>
-            </a:p>
-          </p:txBody>
-        </p:sp>
-        <p:cxnSp>
-          <p:nvCxnSpPr>
-            <p:cNvPr id="711" name="Straight Arrow Connector 710">
-              <a:extLst>
-                <a:ext uri="{FF2B5EF4-FFF2-40B4-BE49-F238E27FC236}">
-                  <a16:creationId xmlns:a16="http://schemas.microsoft.com/office/drawing/2014/main" id="{A227D84F-9BBD-E546-9F3A-B07DDE27D324}"/>
-                </a:ext>
-              </a:extLst>
-            </p:cNvPr>
-            <p:cNvCxnSpPr>
-              <a:cxnSpLocks/>
-            </p:cNvCxnSpPr>
-            <p:nvPr/>
-          </p:nvCxnSpPr>
-          <p:spPr>
-            <a:xfrm flipH="1" flipV="1">
-              <a:off x="4036802" y="14105273"/>
-              <a:ext cx="535794" cy="89620"/>
-            </a:xfrm>
-            <a:prstGeom prst="straightConnector1">
-              <a:avLst/>
-            </a:prstGeom>
-            <a:ln>
-              <a:tailEnd type="triangle"/>
-            </a:ln>
-          </p:spPr>
-          <p:style>
-            <a:lnRef idx="1">
-              <a:schemeClr val="accent1"/>
-            </a:lnRef>
-            <a:fillRef idx="0">
-              <a:schemeClr val="accent1"/>
-            </a:fillRef>
-            <a:effectRef idx="0">
-              <a:schemeClr val="accent1"/>
-            </a:effectRef>
-            <a:fontRef idx="minor">
-              <a:schemeClr val="tx1"/>
-            </a:fontRef>
-          </p:style>
-        </p:cxnSp>
-        <p:cxnSp>
-          <p:nvCxnSpPr>
-            <p:cNvPr id="712" name="Straight Arrow Connector 711">
-              <a:extLst>
-                <a:ext uri="{FF2B5EF4-FFF2-40B4-BE49-F238E27FC236}">
-                  <a16:creationId xmlns:a16="http://schemas.microsoft.com/office/drawing/2014/main" id="{29C7ABA2-FD22-414B-95B7-220128D6DEF8}"/>
-                </a:ext>
-              </a:extLst>
-            </p:cNvPr>
-            <p:cNvCxnSpPr>
-              <a:cxnSpLocks/>
-            </p:cNvCxnSpPr>
-            <p:nvPr/>
-          </p:nvCxnSpPr>
-          <p:spPr>
-            <a:xfrm flipH="1">
-              <a:off x="4051091" y="14235132"/>
-              <a:ext cx="521504" cy="141425"/>
-            </a:xfrm>
-            <a:prstGeom prst="straightConnector1">
-              <a:avLst/>
-            </a:prstGeom>
-            <a:ln>
-              <a:tailEnd type="triangle"/>
-            </a:ln>
-          </p:spPr>
-          <p:style>
-            <a:lnRef idx="1">
-              <a:schemeClr val="accent1"/>
-            </a:lnRef>
-            <a:fillRef idx="0">
-              <a:schemeClr val="accent1"/>
-            </a:fillRef>
-            <a:effectRef idx="0">
-              <a:schemeClr val="accent1"/>
-            </a:effectRef>
-            <a:fontRef idx="minor">
-              <a:schemeClr val="tx1"/>
-            </a:fontRef>
-          </p:style>
-        </p:cxnSp>
-        <p:sp>
-          <p:nvSpPr>
-            <p:cNvPr id="716" name="TextBox 715">
-              <a:extLst>
-                <a:ext uri="{FF2B5EF4-FFF2-40B4-BE49-F238E27FC236}">
-                  <a16:creationId xmlns:a16="http://schemas.microsoft.com/office/drawing/2014/main" id="{EB3C8B6B-DD10-F845-8597-0B675CC9442F}"/>
-                </a:ext>
-              </a:extLst>
-            </p:cNvPr>
-            <p:cNvSpPr txBox="1"/>
-            <p:nvPr/>
-          </p:nvSpPr>
-          <p:spPr>
-            <a:xfrm>
-              <a:off x="4572596" y="14070049"/>
-              <a:ext cx="1985396" cy="295276"/>
-            </a:xfrm>
-            <a:prstGeom prst="rect">
-              <a:avLst/>
-            </a:prstGeom>
-            <a:noFill/>
-          </p:spPr>
-          <p:txBody>
-            <a:bodyPr wrap="square" rtlCol="0" anchor="ctr">
-              <a:spAutoFit/>
-            </a:bodyPr>
-            <a:lstStyle/>
-            <a:p>
-              <a:r>
-                <a:rPr lang="en-US" sz="600" dirty="0"/>
-                <a:t>Matching number = same OPF</a:t>
-              </a:r>
-            </a:p>
-          </p:txBody>
-        </p:sp>
-        <p:sp>
-          <p:nvSpPr>
-            <p:cNvPr id="718" name="Rectangle 717">
-              <a:extLst>
-                <a:ext uri="{FF2B5EF4-FFF2-40B4-BE49-F238E27FC236}">
-                  <a16:creationId xmlns:a16="http://schemas.microsoft.com/office/drawing/2014/main" id="{8C967AE2-2CB5-C64D-B25D-CFF8D45E9F88}"/>
-                </a:ext>
-              </a:extLst>
-            </p:cNvPr>
-            <p:cNvSpPr/>
-            <p:nvPr/>
-          </p:nvSpPr>
-          <p:spPr>
-            <a:xfrm>
-              <a:off x="3539744" y="13962948"/>
-              <a:ext cx="2905025" cy="563240"/>
-            </a:xfrm>
-            <a:prstGeom prst="rect">
-              <a:avLst/>
-            </a:prstGeom>
-            <a:noFill/>
-            <a:ln>
-              <a:solidFill>
-                <a:schemeClr val="tx1"/>
-              </a:solidFill>
-            </a:ln>
-          </p:spPr>
-          <p:style>
-            <a:lnRef idx="2">
-              <a:schemeClr val="accent1">
-                <a:shade val="50000"/>
-              </a:schemeClr>
-            </a:lnRef>
-            <a:fillRef idx="1">
-              <a:schemeClr val="accent1"/>
-            </a:fillRef>
-            <a:effectRef idx="0">
-              <a:schemeClr val="accent1"/>
-            </a:effectRef>
-            <a:fontRef idx="minor">
-              <a:schemeClr val="lt1"/>
-            </a:fontRef>
-          </p:style>
-          <p:txBody>
-            <a:bodyPr rtlCol="0" anchor="ctr"/>
-            <a:lstStyle/>
-            <a:p>
-              <a:pPr algn="ctr"/>
-              <a:endParaRPr lang="en-US" sz="704" dirty="0"/>
-            </a:p>
-          </p:txBody>
-        </p:sp>
-        <p:sp>
-          <p:nvSpPr>
-            <p:cNvPr id="719" name="TextBox 718">
-              <a:extLst>
-                <a:ext uri="{FF2B5EF4-FFF2-40B4-BE49-F238E27FC236}">
-                  <a16:creationId xmlns:a16="http://schemas.microsoft.com/office/drawing/2014/main" id="{1AF62252-D39E-8741-AC61-9E0B9FC5EC4E}"/>
-                </a:ext>
-              </a:extLst>
-            </p:cNvPr>
-            <p:cNvSpPr txBox="1"/>
-            <p:nvPr/>
-          </p:nvSpPr>
-          <p:spPr>
-            <a:xfrm>
-              <a:off x="587017" y="12329978"/>
-              <a:ext cx="2748497" cy="332390"/>
-            </a:xfrm>
-            <a:prstGeom prst="rect">
-              <a:avLst/>
-            </a:prstGeom>
-            <a:noFill/>
-          </p:spPr>
-          <p:txBody>
-            <a:bodyPr wrap="square" rtlCol="0" anchor="t">
-              <a:spAutoFit/>
-            </a:bodyPr>
-            <a:lstStyle/>
-            <a:p>
-              <a:pPr algn="ctr"/>
-              <a:r>
-                <a:rPr lang="en-US" sz="751" b="1" dirty="0"/>
-                <a:t>Predicted function/homology</a:t>
-              </a:r>
-            </a:p>
-          </p:txBody>
-        </p:sp>
-        <p:sp>
-          <p:nvSpPr>
-            <p:cNvPr id="720" name="TextBox 719">
-              <a:extLst>
-                <a:ext uri="{FF2B5EF4-FFF2-40B4-BE49-F238E27FC236}">
-                  <a16:creationId xmlns:a16="http://schemas.microsoft.com/office/drawing/2014/main" id="{EE86FA91-1CEA-4147-B890-F1403FE70DB4}"/>
-                </a:ext>
-              </a:extLst>
-            </p:cNvPr>
-            <p:cNvSpPr txBox="1"/>
-            <p:nvPr/>
-          </p:nvSpPr>
-          <p:spPr>
-            <a:xfrm>
-              <a:off x="3751022" y="12329978"/>
-              <a:ext cx="2271485" cy="332390"/>
-            </a:xfrm>
-            <a:prstGeom prst="rect">
-              <a:avLst/>
-            </a:prstGeom>
-            <a:noFill/>
-          </p:spPr>
-          <p:txBody>
-            <a:bodyPr wrap="square" rtlCol="0" anchor="t">
-              <a:spAutoFit/>
-            </a:bodyPr>
-            <a:lstStyle/>
-            <a:p>
-              <a:pPr algn="ctr"/>
-              <a:r>
-                <a:rPr lang="en-US" sz="751" b="1" dirty="0"/>
-                <a:t>Predicted localization</a:t>
-              </a:r>
-            </a:p>
-          </p:txBody>
-        </p:sp>
-      </p:grpSp>
+          </a:ln>
+        </p:spPr>
+        <p:style>
+          <a:lnRef idx="2">
+            <a:schemeClr val="accent1">
+              <a:shade val="50000"/>
+            </a:schemeClr>
+          </a:lnRef>
+          <a:fillRef idx="1">
+            <a:schemeClr val="accent1"/>
+          </a:fillRef>
+          <a:effectRef idx="0">
+            <a:schemeClr val="accent1"/>
+          </a:effectRef>
+          <a:fontRef idx="minor">
+            <a:schemeClr val="lt1"/>
+          </a:fontRef>
+        </p:style>
+        <p:txBody>
+          <a:bodyPr rtlCol="0" anchor="ctr"/>
+          <a:lstStyle/>
+          <a:p>
+            <a:pPr algn="ctr"/>
+            <a:endParaRPr lang="en-US" sz="704" dirty="0"/>
+          </a:p>
+        </p:txBody>
+      </p:sp>
+      <p:sp>
+        <p:nvSpPr>
+          <p:cNvPr id="719" name="TextBox 718">
+            <a:extLst>
+              <a:ext uri="{FF2B5EF4-FFF2-40B4-BE49-F238E27FC236}">
+                <a16:creationId xmlns:a16="http://schemas.microsoft.com/office/drawing/2014/main" id="{1AF62252-D39E-8741-AC61-9E0B9FC5EC4E}"/>
+              </a:ext>
+            </a:extLst>
+          </p:cNvPr>
+          <p:cNvSpPr txBox="1"/>
+          <p:nvPr/>
+        </p:nvSpPr>
+        <p:spPr>
+          <a:xfrm>
+            <a:off x="1062241" y="4723500"/>
+            <a:ext cx="1987881" cy="230832"/>
+          </a:xfrm>
+          <a:prstGeom prst="rect">
+            <a:avLst/>
+          </a:prstGeom>
+          <a:noFill/>
+        </p:spPr>
+        <p:txBody>
+          <a:bodyPr wrap="square" rtlCol="0" anchor="t">
+            <a:spAutoFit/>
+          </a:bodyPr>
+          <a:lstStyle/>
+          <a:p>
+            <a:pPr algn="ctr"/>
+            <a:r>
+              <a:rPr lang="en-US" sz="900" b="1" dirty="0"/>
+              <a:t>Predicted function/homology</a:t>
+            </a:r>
+          </a:p>
+        </p:txBody>
+      </p:sp>
+      <p:sp>
+        <p:nvSpPr>
+          <p:cNvPr id="720" name="TextBox 719">
+            <a:extLst>
+              <a:ext uri="{FF2B5EF4-FFF2-40B4-BE49-F238E27FC236}">
+                <a16:creationId xmlns:a16="http://schemas.microsoft.com/office/drawing/2014/main" id="{EE86FA91-1CEA-4147-B890-F1403FE70DB4}"/>
+              </a:ext>
+            </a:extLst>
+          </p:cNvPr>
+          <p:cNvSpPr txBox="1"/>
+          <p:nvPr/>
+        </p:nvSpPr>
+        <p:spPr>
+          <a:xfrm>
+            <a:off x="4270368" y="4723500"/>
+            <a:ext cx="1642876" cy="230832"/>
+          </a:xfrm>
+          <a:prstGeom prst="rect">
+            <a:avLst/>
+          </a:prstGeom>
+          <a:noFill/>
+        </p:spPr>
+        <p:txBody>
+          <a:bodyPr wrap="square" rtlCol="0" anchor="t">
+            <a:spAutoFit/>
+          </a:bodyPr>
+          <a:lstStyle/>
+          <a:p>
+            <a:pPr algn="ctr"/>
+            <a:r>
+              <a:rPr lang="en-US" sz="900" b="1" dirty="0"/>
+              <a:t>Predicted localization</a:t>
+            </a:r>
+          </a:p>
+        </p:txBody>
+      </p:sp>
       <p:sp>
         <p:nvSpPr>
           <p:cNvPr id="118" name="TextBox 117" descr="Opf15294">
@@ -8846,7 +8794,7 @@
         </p:nvSpPr>
         <p:spPr>
           <a:xfrm>
-            <a:off x="3731503" y="2280928"/>
+            <a:off x="3731508" y="2205112"/>
             <a:ext cx="308763" cy="207749"/>
           </a:xfrm>
           <a:prstGeom prst="rect">
@@ -8881,7 +8829,7 @@
         </p:nvGrpSpPr>
         <p:grpSpPr>
           <a:xfrm>
-            <a:off x="1774278" y="264448"/>
+            <a:off x="1774278" y="188627"/>
             <a:ext cx="4271548" cy="125006"/>
             <a:chOff x="1774278" y="356924"/>
             <a:chExt cx="4271548" cy="125006"/>
@@ -9383,6 +9331,393 @@
           </p:txBody>
         </p:sp>
       </p:grpSp>
+      <p:sp>
+        <p:nvSpPr>
+          <p:cNvPr id="108" name="TextBox 107">
+            <a:extLst>
+              <a:ext uri="{FF2B5EF4-FFF2-40B4-BE49-F238E27FC236}">
+                <a16:creationId xmlns:a16="http://schemas.microsoft.com/office/drawing/2014/main" id="{25AA3330-5D1C-2A4D-BC76-7F36675572F6}"/>
+              </a:ext>
+            </a:extLst>
+          </p:cNvPr>
+          <p:cNvSpPr txBox="1"/>
+          <p:nvPr/>
+        </p:nvSpPr>
+        <p:spPr>
+          <a:xfrm>
+            <a:off x="3344758" y="54184"/>
+            <a:ext cx="2743200" cy="115416"/>
+          </a:xfrm>
+          <a:prstGeom prst="rect">
+            <a:avLst/>
+          </a:prstGeom>
+          <a:noFill/>
+        </p:spPr>
+        <p:txBody>
+          <a:bodyPr wrap="square" lIns="0" tIns="0" rIns="0" bIns="0" rtlCol="0" anchor="b" anchorCtr="0">
+            <a:spAutoFit/>
+          </a:bodyPr>
+          <a:lstStyle/>
+          <a:p>
+            <a:pPr algn="r"/>
+            <a:r>
+              <a:rPr lang="en-US" sz="750" i="1" dirty="0">
+                <a:solidFill>
+                  <a:schemeClr val="tx1">
+                    <a:lumMod val="50000"/>
+                    <a:lumOff val="50000"/>
+                  </a:schemeClr>
+                </a:solidFill>
+              </a:rPr>
+              <a:t>01665 - 01658 (01511 - 01502)</a:t>
+            </a:r>
+          </a:p>
+        </p:txBody>
+      </p:sp>
+      <p:sp>
+        <p:nvSpPr>
+          <p:cNvPr id="109" name="TextBox 108">
+            <a:extLst>
+              <a:ext uri="{FF2B5EF4-FFF2-40B4-BE49-F238E27FC236}">
+                <a16:creationId xmlns:a16="http://schemas.microsoft.com/office/drawing/2014/main" id="{D5B833D6-3C86-8648-AF8F-89FC720ABB76}"/>
+              </a:ext>
+            </a:extLst>
+          </p:cNvPr>
+          <p:cNvSpPr txBox="1"/>
+          <p:nvPr/>
+        </p:nvSpPr>
+        <p:spPr>
+          <a:xfrm>
+            <a:off x="3344758" y="539969"/>
+            <a:ext cx="2743200" cy="115416"/>
+          </a:xfrm>
+          <a:prstGeom prst="rect">
+            <a:avLst/>
+          </a:prstGeom>
+          <a:noFill/>
+        </p:spPr>
+        <p:txBody>
+          <a:bodyPr wrap="square" lIns="0" tIns="0" rIns="0" bIns="0" rtlCol="0" anchor="b" anchorCtr="0">
+            <a:spAutoFit/>
+          </a:bodyPr>
+          <a:lstStyle/>
+          <a:p>
+            <a:pPr algn="r"/>
+            <a:r>
+              <a:rPr lang="en-US" sz="750" i="1" dirty="0">
+                <a:solidFill>
+                  <a:schemeClr val="tx1">
+                    <a:lumMod val="50000"/>
+                    <a:lumOff val="50000"/>
+                  </a:schemeClr>
+                </a:solidFill>
+              </a:rPr>
+              <a:t>01696 - 01690 (01542 - 01536)</a:t>
+            </a:r>
+          </a:p>
+        </p:txBody>
+      </p:sp>
+      <p:sp>
+        <p:nvSpPr>
+          <p:cNvPr id="110" name="TextBox 109">
+            <a:extLst>
+              <a:ext uri="{FF2B5EF4-FFF2-40B4-BE49-F238E27FC236}">
+                <a16:creationId xmlns:a16="http://schemas.microsoft.com/office/drawing/2014/main" id="{206905D9-95F3-2E40-BB61-3F5A9FED1F9A}"/>
+              </a:ext>
+            </a:extLst>
+          </p:cNvPr>
+          <p:cNvSpPr txBox="1"/>
+          <p:nvPr/>
+        </p:nvSpPr>
+        <p:spPr>
+          <a:xfrm>
+            <a:off x="3344758" y="1065083"/>
+            <a:ext cx="2743200" cy="115416"/>
+          </a:xfrm>
+          <a:prstGeom prst="rect">
+            <a:avLst/>
+          </a:prstGeom>
+          <a:noFill/>
+        </p:spPr>
+        <p:txBody>
+          <a:bodyPr wrap="square" lIns="0" tIns="0" rIns="0" bIns="0" rtlCol="0" anchor="b" anchorCtr="0">
+            <a:spAutoFit/>
+          </a:bodyPr>
+          <a:lstStyle/>
+          <a:p>
+            <a:pPr algn="r"/>
+            <a:r>
+              <a:rPr lang="en-US" sz="750" i="1" dirty="0">
+                <a:solidFill>
+                  <a:schemeClr val="tx1">
+                    <a:lumMod val="50000"/>
+                    <a:lumOff val="50000"/>
+                  </a:schemeClr>
+                </a:solidFill>
+              </a:rPr>
+              <a:t>02263 - 02268 (02114 - 02119)</a:t>
+            </a:r>
+          </a:p>
+        </p:txBody>
+      </p:sp>
+      <p:sp>
+        <p:nvSpPr>
+          <p:cNvPr id="111" name="TextBox 110">
+            <a:extLst>
+              <a:ext uri="{FF2B5EF4-FFF2-40B4-BE49-F238E27FC236}">
+                <a16:creationId xmlns:a16="http://schemas.microsoft.com/office/drawing/2014/main" id="{A77F1B54-88AB-E942-B747-C8C0B927FDD9}"/>
+              </a:ext>
+            </a:extLst>
+          </p:cNvPr>
+          <p:cNvSpPr txBox="1"/>
+          <p:nvPr/>
+        </p:nvSpPr>
+        <p:spPr>
+          <a:xfrm>
+            <a:off x="3344758" y="1590197"/>
+            <a:ext cx="2743200" cy="115416"/>
+          </a:xfrm>
+          <a:prstGeom prst="rect">
+            <a:avLst/>
+          </a:prstGeom>
+          <a:noFill/>
+        </p:spPr>
+        <p:txBody>
+          <a:bodyPr wrap="square" lIns="0" tIns="0" rIns="0" bIns="0" rtlCol="0" anchor="b" anchorCtr="0">
+            <a:spAutoFit/>
+          </a:bodyPr>
+          <a:lstStyle/>
+          <a:p>
+            <a:pPr algn="r"/>
+            <a:r>
+              <a:rPr lang="en-US" sz="750" i="1" dirty="0">
+                <a:solidFill>
+                  <a:schemeClr val="tx1">
+                    <a:lumMod val="50000"/>
+                    <a:lumOff val="50000"/>
+                  </a:schemeClr>
+                </a:solidFill>
+              </a:rPr>
+              <a:t>03875 - 03868</a:t>
+            </a:r>
+          </a:p>
+        </p:txBody>
+      </p:sp>
+      <p:sp>
+        <p:nvSpPr>
+          <p:cNvPr id="112" name="TextBox 111">
+            <a:extLst>
+              <a:ext uri="{FF2B5EF4-FFF2-40B4-BE49-F238E27FC236}">
+                <a16:creationId xmlns:a16="http://schemas.microsoft.com/office/drawing/2014/main" id="{DA886B4A-DC2D-084A-BCDF-073F72E8CDE8}"/>
+              </a:ext>
+            </a:extLst>
+          </p:cNvPr>
+          <p:cNvSpPr txBox="1"/>
+          <p:nvPr/>
+        </p:nvSpPr>
+        <p:spPr>
+          <a:xfrm>
+            <a:off x="3344758" y="2115312"/>
+            <a:ext cx="2743200" cy="115416"/>
+          </a:xfrm>
+          <a:prstGeom prst="rect">
+            <a:avLst/>
+          </a:prstGeom>
+          <a:noFill/>
+        </p:spPr>
+        <p:txBody>
+          <a:bodyPr wrap="square" lIns="0" tIns="0" rIns="0" bIns="0" rtlCol="0" anchor="b" anchorCtr="0">
+            <a:spAutoFit/>
+          </a:bodyPr>
+          <a:lstStyle/>
+          <a:p>
+            <a:pPr algn="r"/>
+            <a:r>
+              <a:rPr lang="en-US" sz="750" i="1" dirty="0">
+                <a:solidFill>
+                  <a:schemeClr val="tx1">
+                    <a:lumMod val="50000"/>
+                    <a:lumOff val="50000"/>
+                  </a:schemeClr>
+                </a:solidFill>
+              </a:rPr>
+              <a:t>03847 - 03839</a:t>
+            </a:r>
+          </a:p>
+        </p:txBody>
+      </p:sp>
+      <p:sp>
+        <p:nvSpPr>
+          <p:cNvPr id="120" name="TextBox 119">
+            <a:extLst>
+              <a:ext uri="{FF2B5EF4-FFF2-40B4-BE49-F238E27FC236}">
+                <a16:creationId xmlns:a16="http://schemas.microsoft.com/office/drawing/2014/main" id="{A9639408-ACFD-E245-9977-426EBF88F72E}"/>
+              </a:ext>
+            </a:extLst>
+          </p:cNvPr>
+          <p:cNvSpPr txBox="1"/>
+          <p:nvPr/>
+        </p:nvSpPr>
+        <p:spPr>
+          <a:xfrm>
+            <a:off x="3344758" y="2640427"/>
+            <a:ext cx="2743200" cy="115416"/>
+          </a:xfrm>
+          <a:prstGeom prst="rect">
+            <a:avLst/>
+          </a:prstGeom>
+          <a:noFill/>
+        </p:spPr>
+        <p:txBody>
+          <a:bodyPr wrap="square" lIns="0" tIns="0" rIns="0" bIns="0" rtlCol="0" anchor="b" anchorCtr="0">
+            <a:spAutoFit/>
+          </a:bodyPr>
+          <a:lstStyle/>
+          <a:p>
+            <a:pPr algn="r"/>
+            <a:r>
+              <a:rPr lang="en-US" sz="750" i="1" dirty="0">
+                <a:solidFill>
+                  <a:schemeClr val="tx1">
+                    <a:lumMod val="50000"/>
+                    <a:lumOff val="50000"/>
+                  </a:schemeClr>
+                </a:solidFill>
+              </a:rPr>
+              <a:t>00517 - 00511</a:t>
+            </a:r>
+          </a:p>
+        </p:txBody>
+      </p:sp>
+      <p:sp>
+        <p:nvSpPr>
+          <p:cNvPr id="121" name="TextBox 120">
+            <a:extLst>
+              <a:ext uri="{FF2B5EF4-FFF2-40B4-BE49-F238E27FC236}">
+                <a16:creationId xmlns:a16="http://schemas.microsoft.com/office/drawing/2014/main" id="{B44499CF-E05B-B44D-A467-4C6D29CB1A54}"/>
+              </a:ext>
+            </a:extLst>
+          </p:cNvPr>
+          <p:cNvSpPr txBox="1"/>
+          <p:nvPr/>
+        </p:nvSpPr>
+        <p:spPr>
+          <a:xfrm>
+            <a:off x="3344758" y="3165541"/>
+            <a:ext cx="2743200" cy="115416"/>
+          </a:xfrm>
+          <a:prstGeom prst="rect">
+            <a:avLst/>
+          </a:prstGeom>
+          <a:noFill/>
+        </p:spPr>
+        <p:txBody>
+          <a:bodyPr wrap="square" lIns="0" tIns="0" rIns="0" bIns="0" rtlCol="0" anchor="b" anchorCtr="0">
+            <a:spAutoFit/>
+          </a:bodyPr>
+          <a:lstStyle/>
+          <a:p>
+            <a:pPr algn="r"/>
+            <a:r>
+              <a:rPr lang="en-US" sz="750" i="1" dirty="0">
+                <a:solidFill>
+                  <a:schemeClr val="tx1">
+                    <a:lumMod val="50000"/>
+                    <a:lumOff val="50000"/>
+                  </a:schemeClr>
+                </a:solidFill>
+              </a:rPr>
+              <a:t>02195 - 02188</a:t>
+            </a:r>
+          </a:p>
+        </p:txBody>
+      </p:sp>
+      <p:sp>
+        <p:nvSpPr>
+          <p:cNvPr id="122" name="TextBox 121">
+            <a:extLst>
+              <a:ext uri="{FF2B5EF4-FFF2-40B4-BE49-F238E27FC236}">
+                <a16:creationId xmlns:a16="http://schemas.microsoft.com/office/drawing/2014/main" id="{D01BF19C-5512-BE48-92BB-6ECE20D191FB}"/>
+              </a:ext>
+            </a:extLst>
+          </p:cNvPr>
+          <p:cNvSpPr txBox="1"/>
+          <p:nvPr/>
+        </p:nvSpPr>
+        <p:spPr>
+          <a:xfrm>
+            <a:off x="3344758" y="3690655"/>
+            <a:ext cx="2743200" cy="115416"/>
+          </a:xfrm>
+          <a:prstGeom prst="rect">
+            <a:avLst/>
+          </a:prstGeom>
+          <a:noFill/>
+        </p:spPr>
+        <p:txBody>
+          <a:bodyPr wrap="square" lIns="0" tIns="0" rIns="0" bIns="0" rtlCol="0" anchor="b" anchorCtr="0">
+            <a:spAutoFit/>
+          </a:bodyPr>
+          <a:lstStyle/>
+          <a:p>
+            <a:pPr algn="r"/>
+            <a:r>
+              <a:rPr lang="en-US" sz="750" i="1" dirty="0">
+                <a:solidFill>
+                  <a:schemeClr val="tx1">
+                    <a:lumMod val="50000"/>
+                    <a:lumOff val="50000"/>
+                  </a:schemeClr>
+                </a:solidFill>
+              </a:rPr>
+              <a:t>03233 - 03227</a:t>
+            </a:r>
+          </a:p>
+        </p:txBody>
+      </p:sp>
+      <p:sp>
+        <p:nvSpPr>
+          <p:cNvPr id="123" name="TextBox 122">
+            <a:extLst>
+              <a:ext uri="{FF2B5EF4-FFF2-40B4-BE49-F238E27FC236}">
+                <a16:creationId xmlns:a16="http://schemas.microsoft.com/office/drawing/2014/main" id="{BCB9442A-28E5-5F46-BEAF-1FDC961153C3}"/>
+              </a:ext>
+            </a:extLst>
+          </p:cNvPr>
+          <p:cNvSpPr txBox="1"/>
+          <p:nvPr/>
+        </p:nvSpPr>
+        <p:spPr>
+          <a:xfrm>
+            <a:off x="3344758" y="4215771"/>
+            <a:ext cx="2743200" cy="115416"/>
+          </a:xfrm>
+          <a:prstGeom prst="rect">
+            <a:avLst/>
+          </a:prstGeom>
+          <a:noFill/>
+        </p:spPr>
+        <p:txBody>
+          <a:bodyPr wrap="square" lIns="0" tIns="0" rIns="0" bIns="0" rtlCol="0" anchor="b" anchorCtr="0">
+            <a:spAutoFit/>
+          </a:bodyPr>
+          <a:lstStyle/>
+          <a:p>
+            <a:pPr algn="r"/>
+            <a:r>
+              <a:rPr lang="en-US" sz="750" i="1" dirty="0">
+                <a:solidFill>
+                  <a:schemeClr val="tx1">
+                    <a:lumMod val="50000"/>
+                    <a:lumOff val="50000"/>
+                  </a:schemeClr>
+                </a:solidFill>
+              </a:rPr>
+              <a:t>03209 - 03204</a:t>
+            </a:r>
+          </a:p>
+        </p:txBody>
+      </p:sp>
     </p:spTree>
     <p:extLst>
       <p:ext uri="{BB962C8B-B14F-4D97-AF65-F5344CB8AC3E}">

</xml_diff>

<commit_message>
Fix labels in PULs didiagram.
</commit_message>
<xml_diff>
--- a/doc/static/starch_related_PULs.pptx
+++ b/doc/static/starch_related_PULs.pptx
@@ -209,7 +209,7 @@
           <a:p>
             <a:fld id="{56FAAB6E-97AE-0847-93C3-7045BD03F9C5}" type="datetimeFigureOut">
               <a:rPr lang="en-US" smtClean="0"/>
-              <a:t>8/18/21</a:t>
+              <a:t>8/19/21</a:t>
             </a:fld>
             <a:endParaRPr lang="en-US"/>
           </a:p>
@@ -696,7 +696,7 @@
           <a:p>
             <a:fld id="{3F6A62D9-65B6-4743-B091-3F210FFD6B26}" type="datetimeFigureOut">
               <a:rPr lang="en-US" smtClean="0"/>
-              <a:t>8/18/21</a:t>
+              <a:t>8/19/21</a:t>
             </a:fld>
             <a:endParaRPr lang="en-US"/>
           </a:p>
@@ -866,7 +866,7 @@
           <a:p>
             <a:fld id="{3F6A62D9-65B6-4743-B091-3F210FFD6B26}" type="datetimeFigureOut">
               <a:rPr lang="en-US" smtClean="0"/>
-              <a:t>8/18/21</a:t>
+              <a:t>8/19/21</a:t>
             </a:fld>
             <a:endParaRPr lang="en-US"/>
           </a:p>
@@ -1046,7 +1046,7 @@
           <a:p>
             <a:fld id="{3F6A62D9-65B6-4743-B091-3F210FFD6B26}" type="datetimeFigureOut">
               <a:rPr lang="en-US" smtClean="0"/>
-              <a:t>8/18/21</a:t>
+              <a:t>8/19/21</a:t>
             </a:fld>
             <a:endParaRPr lang="en-US"/>
           </a:p>
@@ -1216,7 +1216,7 @@
           <a:p>
             <a:fld id="{3F6A62D9-65B6-4743-B091-3F210FFD6B26}" type="datetimeFigureOut">
               <a:rPr lang="en-US" smtClean="0"/>
-              <a:t>8/18/21</a:t>
+              <a:t>8/19/21</a:t>
             </a:fld>
             <a:endParaRPr lang="en-US"/>
           </a:p>
@@ -1460,7 +1460,7 @@
           <a:p>
             <a:fld id="{3F6A62D9-65B6-4743-B091-3F210FFD6B26}" type="datetimeFigureOut">
               <a:rPr lang="en-US" smtClean="0"/>
-              <a:t>8/18/21</a:t>
+              <a:t>8/19/21</a:t>
             </a:fld>
             <a:endParaRPr lang="en-US"/>
           </a:p>
@@ -1692,7 +1692,7 @@
           <a:p>
             <a:fld id="{3F6A62D9-65B6-4743-B091-3F210FFD6B26}" type="datetimeFigureOut">
               <a:rPr lang="en-US" smtClean="0"/>
-              <a:t>8/18/21</a:t>
+              <a:t>8/19/21</a:t>
             </a:fld>
             <a:endParaRPr lang="en-US"/>
           </a:p>
@@ -2059,7 +2059,7 @@
           <a:p>
             <a:fld id="{3F6A62D9-65B6-4743-B091-3F210FFD6B26}" type="datetimeFigureOut">
               <a:rPr lang="en-US" smtClean="0"/>
-              <a:t>8/18/21</a:t>
+              <a:t>8/19/21</a:t>
             </a:fld>
             <a:endParaRPr lang="en-US"/>
           </a:p>
@@ -2177,7 +2177,7 @@
           <a:p>
             <a:fld id="{3F6A62D9-65B6-4743-B091-3F210FFD6B26}" type="datetimeFigureOut">
               <a:rPr lang="en-US" smtClean="0"/>
-              <a:t>8/18/21</a:t>
+              <a:t>8/19/21</a:t>
             </a:fld>
             <a:endParaRPr lang="en-US"/>
           </a:p>
@@ -2272,7 +2272,7 @@
           <a:p>
             <a:fld id="{3F6A62D9-65B6-4743-B091-3F210FFD6B26}" type="datetimeFigureOut">
               <a:rPr lang="en-US" smtClean="0"/>
-              <a:t>8/18/21</a:t>
+              <a:t>8/19/21</a:t>
             </a:fld>
             <a:endParaRPr lang="en-US"/>
           </a:p>
@@ -2549,7 +2549,7 @@
           <a:p>
             <a:fld id="{3F6A62D9-65B6-4743-B091-3F210FFD6B26}" type="datetimeFigureOut">
               <a:rPr lang="en-US" smtClean="0"/>
-              <a:t>8/18/21</a:t>
+              <a:t>8/19/21</a:t>
             </a:fld>
             <a:endParaRPr lang="en-US"/>
           </a:p>
@@ -2806,7 +2806,7 @@
           <a:p>
             <a:fld id="{3F6A62D9-65B6-4743-B091-3F210FFD6B26}" type="datetimeFigureOut">
               <a:rPr lang="en-US" smtClean="0"/>
-              <a:t>8/18/21</a:t>
+              <a:t>8/19/21</a:t>
             </a:fld>
             <a:endParaRPr lang="en-US"/>
           </a:p>
@@ -3019,7 +3019,7 @@
           <a:p>
             <a:fld id="{3F6A62D9-65B6-4743-B091-3F210FFD6B26}" type="datetimeFigureOut">
               <a:rPr lang="en-US" smtClean="0"/>
-              <a:t>8/18/21</a:t>
+              <a:t>8/19/21</a:t>
             </a:fld>
             <a:endParaRPr lang="en-US"/>
           </a:p>
@@ -7295,8 +7295,8 @@
         </p:nvSpPr>
         <p:spPr>
           <a:xfrm>
-            <a:off x="449678" y="15712"/>
-            <a:ext cx="1371600" cy="153888"/>
+            <a:off x="1373704" y="15712"/>
+            <a:ext cx="4572000" cy="153888"/>
           </a:xfrm>
           <a:prstGeom prst="rect">
             <a:avLst/>
@@ -7313,12 +7313,34 @@
               <a:rPr lang="en-US" sz="1000" i="1" dirty="0">
                 <a:solidFill>
                   <a:schemeClr val="tx1">
+                    <a:lumMod val="85000"/>
+                    <a:lumOff val="15000"/>
+                  </a:schemeClr>
+                </a:solidFill>
+              </a:rPr>
+              <a:t>B1A:</a:t>
+            </a:r>
+            <a:r>
+              <a:rPr lang="en-US" sz="1000" i="1" dirty="0">
+                <a:solidFill>
+                  <a:schemeClr val="tx1">
                     <a:lumMod val="65000"/>
                     <a:lumOff val="35000"/>
                   </a:schemeClr>
                 </a:solidFill>
               </a:rPr>
-              <a:t>B1A</a:t>
+              <a:t> </a:t>
+            </a:r>
+            <a:r>
+              <a:rPr lang="en-US" sz="800" i="1" dirty="0">
+                <a:solidFill>
+                  <a:schemeClr val="tx1">
+                    <a:lumMod val="50000"/>
+                    <a:lumOff val="50000"/>
+                  </a:schemeClr>
+                </a:solidFill>
+              </a:rPr>
+              <a:t>01665 - 01658 (01511 - 01502)</a:t>
             </a:r>
           </a:p>
         </p:txBody>
@@ -7337,8 +7359,8 @@
         </p:nvSpPr>
         <p:spPr>
           <a:xfrm>
-            <a:off x="449678" y="501497"/>
-            <a:ext cx="1371600" cy="153888"/>
+            <a:off x="1373704" y="501497"/>
+            <a:ext cx="4572000" cy="153888"/>
           </a:xfrm>
           <a:prstGeom prst="rect">
             <a:avLst/>
@@ -7355,12 +7377,34 @@
               <a:rPr lang="en-US" sz="1000" i="1" dirty="0">
                 <a:solidFill>
                   <a:schemeClr val="tx1">
+                    <a:lumMod val="85000"/>
+                    <a:lumOff val="15000"/>
+                  </a:schemeClr>
+                </a:solidFill>
+              </a:rPr>
+              <a:t>B1A:</a:t>
+            </a:r>
+            <a:r>
+              <a:rPr lang="en-US" sz="1000" i="1" dirty="0">
+                <a:solidFill>
+                  <a:schemeClr val="tx1">
                     <a:lumMod val="65000"/>
                     <a:lumOff val="35000"/>
                   </a:schemeClr>
                 </a:solidFill>
               </a:rPr>
-              <a:t>B1A</a:t>
+              <a:t> </a:t>
+            </a:r>
+            <a:r>
+              <a:rPr lang="en-US" sz="800" i="1" dirty="0">
+                <a:solidFill>
+                  <a:schemeClr val="tx1">
+                    <a:lumMod val="50000"/>
+                    <a:lumOff val="50000"/>
+                  </a:schemeClr>
+                </a:solidFill>
+              </a:rPr>
+              <a:t>01696 - 01690 (01542 - 01536)</a:t>
             </a:r>
           </a:p>
         </p:txBody>
@@ -7379,8 +7423,8 @@
         </p:nvSpPr>
         <p:spPr>
           <a:xfrm>
-            <a:off x="449678" y="1026611"/>
-            <a:ext cx="1371600" cy="153888"/>
+            <a:off x="1373704" y="1026611"/>
+            <a:ext cx="4572000" cy="153888"/>
           </a:xfrm>
           <a:prstGeom prst="rect">
             <a:avLst/>
@@ -7397,12 +7441,34 @@
               <a:rPr lang="en-US" sz="1000" i="1" dirty="0">
                 <a:solidFill>
                   <a:schemeClr val="tx1">
+                    <a:lumMod val="85000"/>
+                    <a:lumOff val="15000"/>
+                  </a:schemeClr>
+                </a:solidFill>
+              </a:rPr>
+              <a:t>B1A:</a:t>
+            </a:r>
+            <a:r>
+              <a:rPr lang="en-US" sz="1000" i="1" dirty="0">
+                <a:solidFill>
+                  <a:schemeClr val="tx1">
                     <a:lumMod val="65000"/>
                     <a:lumOff val="35000"/>
                   </a:schemeClr>
                 </a:solidFill>
               </a:rPr>
-              <a:t>B1A</a:t>
+              <a:t> </a:t>
+            </a:r>
+            <a:r>
+              <a:rPr lang="en-US" sz="800" i="1" dirty="0">
+                <a:solidFill>
+                  <a:schemeClr val="tx1">
+                    <a:lumMod val="50000"/>
+                    <a:lumOff val="50000"/>
+                  </a:schemeClr>
+                </a:solidFill>
+              </a:rPr>
+              <a:t>02263 - 02268 (02114 - 02119)</a:t>
             </a:r>
           </a:p>
         </p:txBody>
@@ -7421,8 +7487,8 @@
         </p:nvSpPr>
         <p:spPr>
           <a:xfrm>
-            <a:off x="449678" y="1551725"/>
-            <a:ext cx="1371600" cy="153888"/>
+            <a:off x="1373704" y="1551725"/>
+            <a:ext cx="4572000" cy="153888"/>
           </a:xfrm>
           <a:prstGeom prst="rect">
             <a:avLst/>
@@ -7439,8 +7505,8 @@
               <a:rPr lang="en-US" sz="1000" i="1" dirty="0">
                 <a:solidFill>
                   <a:schemeClr val="tx1">
-                    <a:lumMod val="65000"/>
-                    <a:lumOff val="35000"/>
+                    <a:lumMod val="85000"/>
+                    <a:lumOff val="15000"/>
                   </a:schemeClr>
                 </a:solidFill>
               </a:rPr>
@@ -7450,21 +7516,35 @@
               <a:rPr lang="en-US" sz="1000" i="1" dirty="0" err="1">
                 <a:solidFill>
                   <a:schemeClr val="tx1">
-                    <a:lumMod val="65000"/>
-                    <a:lumOff val="35000"/>
+                    <a:lumMod val="85000"/>
+                    <a:lumOff val="15000"/>
                   </a:schemeClr>
                 </a:solidFill>
               </a:rPr>
               <a:t>thetaiotaomicron</a:t>
             </a:r>
-            <a:endParaRPr lang="en-US" sz="1000" i="1" dirty="0">
-              <a:solidFill>
-                <a:schemeClr val="tx1">
-                  <a:lumMod val="65000"/>
-                  <a:lumOff val="35000"/>
-                </a:schemeClr>
-              </a:solidFill>
-            </a:endParaRPr>
+            <a:r>
+              <a:rPr lang="en-US" sz="1000" i="1" dirty="0">
+                <a:solidFill>
+                  <a:schemeClr val="tx1">
+                    <a:lumMod val="85000"/>
+                    <a:lumOff val="15000"/>
+                  </a:schemeClr>
+                </a:solidFill>
+              </a:rPr>
+              <a:t>: </a:t>
+            </a:r>
+            <a:r>
+              <a:rPr lang="en-US" sz="800" i="1" dirty="0">
+                <a:solidFill>
+                  <a:schemeClr val="tx1">
+                    <a:lumMod val="50000"/>
+                    <a:lumOff val="50000"/>
+                  </a:schemeClr>
+                </a:solidFill>
+              </a:rPr>
+              <a:t>03875 - 03868</a:t>
+            </a:r>
           </a:p>
         </p:txBody>
       </p:sp>
@@ -7482,8 +7562,8 @@
         </p:nvSpPr>
         <p:spPr>
           <a:xfrm>
-            <a:off x="449678" y="2076840"/>
-            <a:ext cx="1371600" cy="153888"/>
+            <a:off x="1373704" y="2076840"/>
+            <a:ext cx="4572000" cy="153888"/>
           </a:xfrm>
           <a:prstGeom prst="rect">
             <a:avLst/>
@@ -7500,8 +7580,8 @@
               <a:rPr lang="en-US" sz="1000" i="1" dirty="0">
                 <a:solidFill>
                   <a:schemeClr val="tx1">
-                    <a:lumMod val="65000"/>
-                    <a:lumOff val="35000"/>
+                    <a:lumMod val="85000"/>
+                    <a:lumOff val="15000"/>
                   </a:schemeClr>
                 </a:solidFill>
               </a:rPr>
@@ -7509,6 +7589,28 @@
             </a:r>
             <a:r>
               <a:rPr lang="en-US" sz="1000" i="1" dirty="0" err="1">
+                <a:solidFill>
+                  <a:schemeClr val="tx1">
+                    <a:lumMod val="85000"/>
+                    <a:lumOff val="15000"/>
+                  </a:schemeClr>
+                </a:solidFill>
+              </a:rPr>
+              <a:t>ovatus</a:t>
+            </a:r>
+            <a:r>
+              <a:rPr lang="en-US" sz="1000" i="1" dirty="0">
+                <a:solidFill>
+                  <a:schemeClr val="tx1">
+                    <a:lumMod val="85000"/>
+                    <a:lumOff val="15000"/>
+                  </a:schemeClr>
+                </a:solidFill>
+              </a:rPr>
+              <a:t>:</a:t>
+            </a:r>
+            <a:r>
+              <a:rPr lang="en-US" sz="1000" i="1" dirty="0">
                 <a:solidFill>
                   <a:schemeClr val="tx1">
                     <a:lumMod val="65000"/>
@@ -7516,16 +7618,19 @@
                   </a:schemeClr>
                 </a:solidFill>
               </a:rPr>
-              <a:t>ovatus</a:t>
-            </a:r>
-            <a:endParaRPr lang="en-US" sz="1000" i="1" dirty="0">
-              <a:solidFill>
-                <a:schemeClr val="tx1">
-                  <a:lumMod val="65000"/>
-                  <a:lumOff val="35000"/>
-                </a:schemeClr>
-              </a:solidFill>
-            </a:endParaRPr>
+              <a:t> </a:t>
+            </a:r>
+            <a:r>
+              <a:rPr lang="en-US" sz="800" i="1" dirty="0">
+                <a:solidFill>
+                  <a:schemeClr val="tx1">
+                    <a:lumMod val="50000"/>
+                    <a:lumOff val="50000"/>
+                  </a:schemeClr>
+                </a:solidFill>
+              </a:rPr>
+              <a:t>03847 - 03839</a:t>
+            </a:r>
           </a:p>
         </p:txBody>
       </p:sp>
@@ -7543,8 +7648,8 @@
         </p:nvSpPr>
         <p:spPr>
           <a:xfrm>
-            <a:off x="449677" y="2601955"/>
-            <a:ext cx="1371600" cy="153888"/>
+            <a:off x="1373703" y="2601955"/>
+            <a:ext cx="4572000" cy="153888"/>
           </a:xfrm>
           <a:prstGeom prst="rect">
             <a:avLst/>
@@ -7561,12 +7666,34 @@
               <a:rPr lang="en-US" sz="1000" i="1" dirty="0">
                 <a:solidFill>
                   <a:schemeClr val="tx1">
+                    <a:lumMod val="85000"/>
+                    <a:lumOff val="15000"/>
+                  </a:schemeClr>
+                </a:solidFill>
+              </a:rPr>
+              <a:t>B3:</a:t>
+            </a:r>
+            <a:r>
+              <a:rPr lang="en-US" sz="1000" i="1" dirty="0">
+                <a:solidFill>
+                  <a:schemeClr val="tx1">
                     <a:lumMod val="65000"/>
                     <a:lumOff val="35000"/>
                   </a:schemeClr>
                 </a:solidFill>
               </a:rPr>
-              <a:t>B3</a:t>
+              <a:t> </a:t>
+            </a:r>
+            <a:r>
+              <a:rPr lang="en-US" sz="800" i="1" dirty="0">
+                <a:solidFill>
+                  <a:schemeClr val="tx1">
+                    <a:lumMod val="50000"/>
+                    <a:lumOff val="50000"/>
+                  </a:schemeClr>
+                </a:solidFill>
+              </a:rPr>
+              <a:t>00517 - 00511</a:t>
             </a:r>
           </a:p>
         </p:txBody>
@@ -7585,8 +7712,8 @@
         </p:nvSpPr>
         <p:spPr>
           <a:xfrm>
-            <a:off x="449677" y="3127069"/>
-            <a:ext cx="1371600" cy="153888"/>
+            <a:off x="1373703" y="3127069"/>
+            <a:ext cx="4572000" cy="153888"/>
           </a:xfrm>
           <a:prstGeom prst="rect">
             <a:avLst/>
@@ -7603,12 +7730,34 @@
               <a:rPr lang="en-US" sz="1000" i="1" dirty="0">
                 <a:solidFill>
                   <a:schemeClr val="tx1">
+                    <a:lumMod val="85000"/>
+                    <a:lumOff val="15000"/>
+                  </a:schemeClr>
+                </a:solidFill>
+              </a:rPr>
+              <a:t>B2:</a:t>
+            </a:r>
+            <a:r>
+              <a:rPr lang="en-US" sz="1000" i="1" dirty="0">
+                <a:solidFill>
+                  <a:schemeClr val="tx1">
                     <a:lumMod val="65000"/>
                     <a:lumOff val="35000"/>
                   </a:schemeClr>
                 </a:solidFill>
               </a:rPr>
-              <a:t>B2</a:t>
+              <a:t> </a:t>
+            </a:r>
+            <a:r>
+              <a:rPr lang="en-US" sz="800" i="1" dirty="0">
+                <a:solidFill>
+                  <a:schemeClr val="tx1">
+                    <a:lumMod val="50000"/>
+                    <a:lumOff val="50000"/>
+                  </a:schemeClr>
+                </a:solidFill>
+              </a:rPr>
+              <a:t>02195 - 02188</a:t>
             </a:r>
           </a:p>
         </p:txBody>
@@ -7627,8 +7776,8 @@
         </p:nvSpPr>
         <p:spPr>
           <a:xfrm>
-            <a:off x="449678" y="3652183"/>
-            <a:ext cx="1371600" cy="153888"/>
+            <a:off x="1373704" y="3652183"/>
+            <a:ext cx="4572000" cy="153888"/>
           </a:xfrm>
           <a:prstGeom prst="rect">
             <a:avLst/>
@@ -7645,8 +7794,8 @@
               <a:rPr lang="en-US" sz="1000" i="1" dirty="0">
                 <a:solidFill>
                   <a:schemeClr val="tx1">
-                    <a:lumMod val="65000"/>
-                    <a:lumOff val="35000"/>
+                    <a:lumMod val="85000"/>
+                    <a:lumOff val="15000"/>
                   </a:schemeClr>
                 </a:solidFill>
               </a:rPr>
@@ -7654,6 +7803,28 @@
             </a:r>
             <a:r>
               <a:rPr lang="en-US" sz="1000" i="1" dirty="0" err="1">
+                <a:solidFill>
+                  <a:schemeClr val="tx1">
+                    <a:lumMod val="85000"/>
+                    <a:lumOff val="15000"/>
+                  </a:schemeClr>
+                </a:solidFill>
+              </a:rPr>
+              <a:t>thetaiotaomicron</a:t>
+            </a:r>
+            <a:r>
+              <a:rPr lang="en-US" sz="1000" i="1" dirty="0">
+                <a:solidFill>
+                  <a:schemeClr val="tx1">
+                    <a:lumMod val="85000"/>
+                    <a:lumOff val="15000"/>
+                  </a:schemeClr>
+                </a:solidFill>
+              </a:rPr>
+              <a:t>:</a:t>
+            </a:r>
+            <a:r>
+              <a:rPr lang="en-US" sz="1000" i="1" dirty="0">
                 <a:solidFill>
                   <a:schemeClr val="tx1">
                     <a:lumMod val="65000"/>
@@ -7661,16 +7832,19 @@
                   </a:schemeClr>
                 </a:solidFill>
               </a:rPr>
-              <a:t>thetaiotaomicron</a:t>
-            </a:r>
-            <a:endParaRPr lang="en-US" sz="1000" i="1" dirty="0">
-              <a:solidFill>
-                <a:schemeClr val="tx1">
-                  <a:lumMod val="65000"/>
-                  <a:lumOff val="35000"/>
-                </a:schemeClr>
-              </a:solidFill>
-            </a:endParaRPr>
+              <a:t> </a:t>
+            </a:r>
+            <a:r>
+              <a:rPr lang="en-US" sz="800" i="1" dirty="0">
+                <a:solidFill>
+                  <a:schemeClr val="tx1">
+                    <a:lumMod val="50000"/>
+                    <a:lumOff val="50000"/>
+                  </a:schemeClr>
+                </a:solidFill>
+              </a:rPr>
+              <a:t>03233 - 03227</a:t>
+            </a:r>
           </a:p>
         </p:txBody>
       </p:sp>
@@ -7688,8 +7862,8 @@
         </p:nvSpPr>
         <p:spPr>
           <a:xfrm>
-            <a:off x="449678" y="4177299"/>
-            <a:ext cx="1371600" cy="153888"/>
+            <a:off x="1373704" y="4177299"/>
+            <a:ext cx="4572000" cy="153888"/>
           </a:xfrm>
           <a:prstGeom prst="rect">
             <a:avLst/>
@@ -7706,8 +7880,8 @@
               <a:rPr lang="en-US" sz="1000" i="1" dirty="0">
                 <a:solidFill>
                   <a:schemeClr val="tx1">
-                    <a:lumMod val="65000"/>
-                    <a:lumOff val="35000"/>
+                    <a:lumMod val="85000"/>
+                    <a:lumOff val="15000"/>
                   </a:schemeClr>
                 </a:solidFill>
               </a:rPr>
@@ -7715,6 +7889,28 @@
             </a:r>
             <a:r>
               <a:rPr lang="en-US" sz="1000" i="1" dirty="0" err="1">
+                <a:solidFill>
+                  <a:schemeClr val="tx1">
+                    <a:lumMod val="85000"/>
+                    <a:lumOff val="15000"/>
+                  </a:schemeClr>
+                </a:solidFill>
+              </a:rPr>
+              <a:t>ovatus</a:t>
+            </a:r>
+            <a:r>
+              <a:rPr lang="en-US" sz="1000" i="1" dirty="0">
+                <a:solidFill>
+                  <a:schemeClr val="tx1">
+                    <a:lumMod val="85000"/>
+                    <a:lumOff val="15000"/>
+                  </a:schemeClr>
+                </a:solidFill>
+              </a:rPr>
+              <a:t>:</a:t>
+            </a:r>
+            <a:r>
+              <a:rPr lang="en-US" sz="1000" i="1" dirty="0">
                 <a:solidFill>
                   <a:schemeClr val="tx1">
                     <a:lumMod val="65000"/>
@@ -7722,16 +7918,19 @@
                   </a:schemeClr>
                 </a:solidFill>
               </a:rPr>
-              <a:t>ovatus</a:t>
-            </a:r>
-            <a:endParaRPr lang="en-US" sz="1000" i="1" dirty="0">
-              <a:solidFill>
-                <a:schemeClr val="tx1">
-                  <a:lumMod val="65000"/>
-                  <a:lumOff val="35000"/>
-                </a:schemeClr>
-              </a:solidFill>
-            </a:endParaRPr>
+              <a:t> </a:t>
+            </a:r>
+            <a:r>
+              <a:rPr lang="en-US" sz="800" i="1" dirty="0">
+                <a:solidFill>
+                  <a:schemeClr val="tx1">
+                    <a:lumMod val="50000"/>
+                    <a:lumOff val="50000"/>
+                  </a:schemeClr>
+                </a:solidFill>
+              </a:rPr>
+              <a:t>03209 - 03204</a:t>
+            </a:r>
           </a:p>
         </p:txBody>
       </p:sp>
@@ -7749,8 +7948,8 @@
         </p:nvSpPr>
         <p:spPr>
           <a:xfrm>
-            <a:off x="280735" y="5169567"/>
-            <a:ext cx="1725195" cy="123318"/>
+            <a:off x="295417" y="5180428"/>
+            <a:ext cx="1710513" cy="123318"/>
           </a:xfrm>
           <a:prstGeom prst="rightArrow">
             <a:avLst>
@@ -7814,8 +8013,8 @@
         </p:nvSpPr>
         <p:spPr>
           <a:xfrm>
-            <a:off x="280731" y="4961945"/>
-            <a:ext cx="1717766" cy="123318"/>
+            <a:off x="290248" y="4987865"/>
+            <a:ext cx="1715682" cy="123318"/>
           </a:xfrm>
           <a:prstGeom prst="rightArrow">
             <a:avLst>
@@ -7878,8 +8077,8 @@
         </p:nvSpPr>
         <p:spPr>
           <a:xfrm>
-            <a:off x="280736" y="5379683"/>
-            <a:ext cx="1725197" cy="123318"/>
+            <a:off x="2134477" y="5180428"/>
+            <a:ext cx="1715683" cy="123318"/>
           </a:xfrm>
           <a:prstGeom prst="rightArrow">
             <a:avLst>
@@ -7948,8 +8147,8 @@
         </p:nvSpPr>
         <p:spPr>
           <a:xfrm>
-            <a:off x="2119690" y="4987865"/>
-            <a:ext cx="1730470" cy="123318"/>
+            <a:off x="2134477" y="4987865"/>
+            <a:ext cx="1715682" cy="123318"/>
           </a:xfrm>
           <a:prstGeom prst="rightArrow">
             <a:avLst>
@@ -8018,7 +8217,7 @@
         </p:nvSpPr>
         <p:spPr>
           <a:xfrm>
-            <a:off x="2120492" y="5372814"/>
+            <a:off x="290248" y="5372990"/>
             <a:ext cx="1715682" cy="123318"/>
           </a:xfrm>
           <a:prstGeom prst="rightArrow">
@@ -8080,8 +8279,8 @@
         </p:nvSpPr>
         <p:spPr>
           <a:xfrm>
-            <a:off x="2123349" y="5180340"/>
-            <a:ext cx="1715682" cy="123318"/>
+            <a:off x="2134477" y="5366069"/>
+            <a:ext cx="1715683" cy="123318"/>
           </a:xfrm>
           <a:prstGeom prst="rightArrow">
             <a:avLst>
@@ -8142,7 +8341,7 @@
         </p:nvSpPr>
         <p:spPr>
           <a:xfrm>
-            <a:off x="4280164" y="4961945"/>
+            <a:off x="4280164" y="4980944"/>
             <a:ext cx="1715682" cy="137160"/>
           </a:xfrm>
           <a:prstGeom prst="rightArrow">
@@ -8204,7 +8403,7 @@
         </p:nvSpPr>
         <p:spPr>
           <a:xfrm>
-            <a:off x="4280164" y="5164007"/>
+            <a:off x="4280164" y="5166586"/>
             <a:ext cx="1715682" cy="137160"/>
           </a:xfrm>
           <a:prstGeom prst="rightArrow">
@@ -8348,7 +8547,7 @@
         </p:nvSpPr>
         <p:spPr>
           <a:xfrm>
-            <a:off x="4280164" y="5568131"/>
+            <a:off x="4278469" y="5568972"/>
             <a:ext cx="1719072" cy="137160"/>
           </a:xfrm>
           <a:prstGeom prst="rightArrow">
@@ -9331,393 +9530,6 @@
           </p:txBody>
         </p:sp>
       </p:grpSp>
-      <p:sp>
-        <p:nvSpPr>
-          <p:cNvPr id="108" name="TextBox 107">
-            <a:extLst>
-              <a:ext uri="{FF2B5EF4-FFF2-40B4-BE49-F238E27FC236}">
-                <a16:creationId xmlns:a16="http://schemas.microsoft.com/office/drawing/2014/main" id="{25AA3330-5D1C-2A4D-BC76-7F36675572F6}"/>
-              </a:ext>
-            </a:extLst>
-          </p:cNvPr>
-          <p:cNvSpPr txBox="1"/>
-          <p:nvPr/>
-        </p:nvSpPr>
-        <p:spPr>
-          <a:xfrm>
-            <a:off x="3344758" y="54184"/>
-            <a:ext cx="2743200" cy="115416"/>
-          </a:xfrm>
-          <a:prstGeom prst="rect">
-            <a:avLst/>
-          </a:prstGeom>
-          <a:noFill/>
-        </p:spPr>
-        <p:txBody>
-          <a:bodyPr wrap="square" lIns="0" tIns="0" rIns="0" bIns="0" rtlCol="0" anchor="b" anchorCtr="0">
-            <a:spAutoFit/>
-          </a:bodyPr>
-          <a:lstStyle/>
-          <a:p>
-            <a:pPr algn="r"/>
-            <a:r>
-              <a:rPr lang="en-US" sz="750" i="1" dirty="0">
-                <a:solidFill>
-                  <a:schemeClr val="tx1">
-                    <a:lumMod val="50000"/>
-                    <a:lumOff val="50000"/>
-                  </a:schemeClr>
-                </a:solidFill>
-              </a:rPr>
-              <a:t>01665 - 01658 (01511 - 01502)</a:t>
-            </a:r>
-          </a:p>
-        </p:txBody>
-      </p:sp>
-      <p:sp>
-        <p:nvSpPr>
-          <p:cNvPr id="109" name="TextBox 108">
-            <a:extLst>
-              <a:ext uri="{FF2B5EF4-FFF2-40B4-BE49-F238E27FC236}">
-                <a16:creationId xmlns:a16="http://schemas.microsoft.com/office/drawing/2014/main" id="{D5B833D6-3C86-8648-AF8F-89FC720ABB76}"/>
-              </a:ext>
-            </a:extLst>
-          </p:cNvPr>
-          <p:cNvSpPr txBox="1"/>
-          <p:nvPr/>
-        </p:nvSpPr>
-        <p:spPr>
-          <a:xfrm>
-            <a:off x="3344758" y="539969"/>
-            <a:ext cx="2743200" cy="115416"/>
-          </a:xfrm>
-          <a:prstGeom prst="rect">
-            <a:avLst/>
-          </a:prstGeom>
-          <a:noFill/>
-        </p:spPr>
-        <p:txBody>
-          <a:bodyPr wrap="square" lIns="0" tIns="0" rIns="0" bIns="0" rtlCol="0" anchor="b" anchorCtr="0">
-            <a:spAutoFit/>
-          </a:bodyPr>
-          <a:lstStyle/>
-          <a:p>
-            <a:pPr algn="r"/>
-            <a:r>
-              <a:rPr lang="en-US" sz="750" i="1" dirty="0">
-                <a:solidFill>
-                  <a:schemeClr val="tx1">
-                    <a:lumMod val="50000"/>
-                    <a:lumOff val="50000"/>
-                  </a:schemeClr>
-                </a:solidFill>
-              </a:rPr>
-              <a:t>01696 - 01690 (01542 - 01536)</a:t>
-            </a:r>
-          </a:p>
-        </p:txBody>
-      </p:sp>
-      <p:sp>
-        <p:nvSpPr>
-          <p:cNvPr id="110" name="TextBox 109">
-            <a:extLst>
-              <a:ext uri="{FF2B5EF4-FFF2-40B4-BE49-F238E27FC236}">
-                <a16:creationId xmlns:a16="http://schemas.microsoft.com/office/drawing/2014/main" id="{206905D9-95F3-2E40-BB61-3F5A9FED1F9A}"/>
-              </a:ext>
-            </a:extLst>
-          </p:cNvPr>
-          <p:cNvSpPr txBox="1"/>
-          <p:nvPr/>
-        </p:nvSpPr>
-        <p:spPr>
-          <a:xfrm>
-            <a:off x="3344758" y="1065083"/>
-            <a:ext cx="2743200" cy="115416"/>
-          </a:xfrm>
-          <a:prstGeom prst="rect">
-            <a:avLst/>
-          </a:prstGeom>
-          <a:noFill/>
-        </p:spPr>
-        <p:txBody>
-          <a:bodyPr wrap="square" lIns="0" tIns="0" rIns="0" bIns="0" rtlCol="0" anchor="b" anchorCtr="0">
-            <a:spAutoFit/>
-          </a:bodyPr>
-          <a:lstStyle/>
-          <a:p>
-            <a:pPr algn="r"/>
-            <a:r>
-              <a:rPr lang="en-US" sz="750" i="1" dirty="0">
-                <a:solidFill>
-                  <a:schemeClr val="tx1">
-                    <a:lumMod val="50000"/>
-                    <a:lumOff val="50000"/>
-                  </a:schemeClr>
-                </a:solidFill>
-              </a:rPr>
-              <a:t>02263 - 02268 (02114 - 02119)</a:t>
-            </a:r>
-          </a:p>
-        </p:txBody>
-      </p:sp>
-      <p:sp>
-        <p:nvSpPr>
-          <p:cNvPr id="111" name="TextBox 110">
-            <a:extLst>
-              <a:ext uri="{FF2B5EF4-FFF2-40B4-BE49-F238E27FC236}">
-                <a16:creationId xmlns:a16="http://schemas.microsoft.com/office/drawing/2014/main" id="{A77F1B54-88AB-E942-B747-C8C0B927FDD9}"/>
-              </a:ext>
-            </a:extLst>
-          </p:cNvPr>
-          <p:cNvSpPr txBox="1"/>
-          <p:nvPr/>
-        </p:nvSpPr>
-        <p:spPr>
-          <a:xfrm>
-            <a:off x="3344758" y="1590197"/>
-            <a:ext cx="2743200" cy="115416"/>
-          </a:xfrm>
-          <a:prstGeom prst="rect">
-            <a:avLst/>
-          </a:prstGeom>
-          <a:noFill/>
-        </p:spPr>
-        <p:txBody>
-          <a:bodyPr wrap="square" lIns="0" tIns="0" rIns="0" bIns="0" rtlCol="0" anchor="b" anchorCtr="0">
-            <a:spAutoFit/>
-          </a:bodyPr>
-          <a:lstStyle/>
-          <a:p>
-            <a:pPr algn="r"/>
-            <a:r>
-              <a:rPr lang="en-US" sz="750" i="1" dirty="0">
-                <a:solidFill>
-                  <a:schemeClr val="tx1">
-                    <a:lumMod val="50000"/>
-                    <a:lumOff val="50000"/>
-                  </a:schemeClr>
-                </a:solidFill>
-              </a:rPr>
-              <a:t>03875 - 03868</a:t>
-            </a:r>
-          </a:p>
-        </p:txBody>
-      </p:sp>
-      <p:sp>
-        <p:nvSpPr>
-          <p:cNvPr id="112" name="TextBox 111">
-            <a:extLst>
-              <a:ext uri="{FF2B5EF4-FFF2-40B4-BE49-F238E27FC236}">
-                <a16:creationId xmlns:a16="http://schemas.microsoft.com/office/drawing/2014/main" id="{DA886B4A-DC2D-084A-BCDF-073F72E8CDE8}"/>
-              </a:ext>
-            </a:extLst>
-          </p:cNvPr>
-          <p:cNvSpPr txBox="1"/>
-          <p:nvPr/>
-        </p:nvSpPr>
-        <p:spPr>
-          <a:xfrm>
-            <a:off x="3344758" y="2115312"/>
-            <a:ext cx="2743200" cy="115416"/>
-          </a:xfrm>
-          <a:prstGeom prst="rect">
-            <a:avLst/>
-          </a:prstGeom>
-          <a:noFill/>
-        </p:spPr>
-        <p:txBody>
-          <a:bodyPr wrap="square" lIns="0" tIns="0" rIns="0" bIns="0" rtlCol="0" anchor="b" anchorCtr="0">
-            <a:spAutoFit/>
-          </a:bodyPr>
-          <a:lstStyle/>
-          <a:p>
-            <a:pPr algn="r"/>
-            <a:r>
-              <a:rPr lang="en-US" sz="750" i="1" dirty="0">
-                <a:solidFill>
-                  <a:schemeClr val="tx1">
-                    <a:lumMod val="50000"/>
-                    <a:lumOff val="50000"/>
-                  </a:schemeClr>
-                </a:solidFill>
-              </a:rPr>
-              <a:t>03847 - 03839</a:t>
-            </a:r>
-          </a:p>
-        </p:txBody>
-      </p:sp>
-      <p:sp>
-        <p:nvSpPr>
-          <p:cNvPr id="120" name="TextBox 119">
-            <a:extLst>
-              <a:ext uri="{FF2B5EF4-FFF2-40B4-BE49-F238E27FC236}">
-                <a16:creationId xmlns:a16="http://schemas.microsoft.com/office/drawing/2014/main" id="{A9639408-ACFD-E245-9977-426EBF88F72E}"/>
-              </a:ext>
-            </a:extLst>
-          </p:cNvPr>
-          <p:cNvSpPr txBox="1"/>
-          <p:nvPr/>
-        </p:nvSpPr>
-        <p:spPr>
-          <a:xfrm>
-            <a:off x="3344758" y="2640427"/>
-            <a:ext cx="2743200" cy="115416"/>
-          </a:xfrm>
-          <a:prstGeom prst="rect">
-            <a:avLst/>
-          </a:prstGeom>
-          <a:noFill/>
-        </p:spPr>
-        <p:txBody>
-          <a:bodyPr wrap="square" lIns="0" tIns="0" rIns="0" bIns="0" rtlCol="0" anchor="b" anchorCtr="0">
-            <a:spAutoFit/>
-          </a:bodyPr>
-          <a:lstStyle/>
-          <a:p>
-            <a:pPr algn="r"/>
-            <a:r>
-              <a:rPr lang="en-US" sz="750" i="1" dirty="0">
-                <a:solidFill>
-                  <a:schemeClr val="tx1">
-                    <a:lumMod val="50000"/>
-                    <a:lumOff val="50000"/>
-                  </a:schemeClr>
-                </a:solidFill>
-              </a:rPr>
-              <a:t>00517 - 00511</a:t>
-            </a:r>
-          </a:p>
-        </p:txBody>
-      </p:sp>
-      <p:sp>
-        <p:nvSpPr>
-          <p:cNvPr id="121" name="TextBox 120">
-            <a:extLst>
-              <a:ext uri="{FF2B5EF4-FFF2-40B4-BE49-F238E27FC236}">
-                <a16:creationId xmlns:a16="http://schemas.microsoft.com/office/drawing/2014/main" id="{B44499CF-E05B-B44D-A467-4C6D29CB1A54}"/>
-              </a:ext>
-            </a:extLst>
-          </p:cNvPr>
-          <p:cNvSpPr txBox="1"/>
-          <p:nvPr/>
-        </p:nvSpPr>
-        <p:spPr>
-          <a:xfrm>
-            <a:off x="3344758" y="3165541"/>
-            <a:ext cx="2743200" cy="115416"/>
-          </a:xfrm>
-          <a:prstGeom prst="rect">
-            <a:avLst/>
-          </a:prstGeom>
-          <a:noFill/>
-        </p:spPr>
-        <p:txBody>
-          <a:bodyPr wrap="square" lIns="0" tIns="0" rIns="0" bIns="0" rtlCol="0" anchor="b" anchorCtr="0">
-            <a:spAutoFit/>
-          </a:bodyPr>
-          <a:lstStyle/>
-          <a:p>
-            <a:pPr algn="r"/>
-            <a:r>
-              <a:rPr lang="en-US" sz="750" i="1" dirty="0">
-                <a:solidFill>
-                  <a:schemeClr val="tx1">
-                    <a:lumMod val="50000"/>
-                    <a:lumOff val="50000"/>
-                  </a:schemeClr>
-                </a:solidFill>
-              </a:rPr>
-              <a:t>02195 - 02188</a:t>
-            </a:r>
-          </a:p>
-        </p:txBody>
-      </p:sp>
-      <p:sp>
-        <p:nvSpPr>
-          <p:cNvPr id="122" name="TextBox 121">
-            <a:extLst>
-              <a:ext uri="{FF2B5EF4-FFF2-40B4-BE49-F238E27FC236}">
-                <a16:creationId xmlns:a16="http://schemas.microsoft.com/office/drawing/2014/main" id="{D01BF19C-5512-BE48-92BB-6ECE20D191FB}"/>
-              </a:ext>
-            </a:extLst>
-          </p:cNvPr>
-          <p:cNvSpPr txBox="1"/>
-          <p:nvPr/>
-        </p:nvSpPr>
-        <p:spPr>
-          <a:xfrm>
-            <a:off x="3344758" y="3690655"/>
-            <a:ext cx="2743200" cy="115416"/>
-          </a:xfrm>
-          <a:prstGeom prst="rect">
-            <a:avLst/>
-          </a:prstGeom>
-          <a:noFill/>
-        </p:spPr>
-        <p:txBody>
-          <a:bodyPr wrap="square" lIns="0" tIns="0" rIns="0" bIns="0" rtlCol="0" anchor="b" anchorCtr="0">
-            <a:spAutoFit/>
-          </a:bodyPr>
-          <a:lstStyle/>
-          <a:p>
-            <a:pPr algn="r"/>
-            <a:r>
-              <a:rPr lang="en-US" sz="750" i="1" dirty="0">
-                <a:solidFill>
-                  <a:schemeClr val="tx1">
-                    <a:lumMod val="50000"/>
-                    <a:lumOff val="50000"/>
-                  </a:schemeClr>
-                </a:solidFill>
-              </a:rPr>
-              <a:t>03233 - 03227</a:t>
-            </a:r>
-          </a:p>
-        </p:txBody>
-      </p:sp>
-      <p:sp>
-        <p:nvSpPr>
-          <p:cNvPr id="123" name="TextBox 122">
-            <a:extLst>
-              <a:ext uri="{FF2B5EF4-FFF2-40B4-BE49-F238E27FC236}">
-                <a16:creationId xmlns:a16="http://schemas.microsoft.com/office/drawing/2014/main" id="{BCB9442A-28E5-5F46-BEAF-1FDC961153C3}"/>
-              </a:ext>
-            </a:extLst>
-          </p:cNvPr>
-          <p:cNvSpPr txBox="1"/>
-          <p:nvPr/>
-        </p:nvSpPr>
-        <p:spPr>
-          <a:xfrm>
-            <a:off x="3344758" y="4215771"/>
-            <a:ext cx="2743200" cy="115416"/>
-          </a:xfrm>
-          <a:prstGeom prst="rect">
-            <a:avLst/>
-          </a:prstGeom>
-          <a:noFill/>
-        </p:spPr>
-        <p:txBody>
-          <a:bodyPr wrap="square" lIns="0" tIns="0" rIns="0" bIns="0" rtlCol="0" anchor="b" anchorCtr="0">
-            <a:spAutoFit/>
-          </a:bodyPr>
-          <a:lstStyle/>
-          <a:p>
-            <a:pPr algn="r"/>
-            <a:r>
-              <a:rPr lang="en-US" sz="750" i="1" dirty="0">
-                <a:solidFill>
-                  <a:schemeClr val="tx1">
-                    <a:lumMod val="50000"/>
-                    <a:lumOff val="50000"/>
-                  </a:schemeClr>
-                </a:solidFill>
-              </a:rPr>
-              <a:t>03209 - 03204</a:t>
-            </a:r>
-          </a:p>
-        </p:txBody>
-      </p:sp>
     </p:spTree>
     <p:extLst>
       <p:ext uri="{BB962C8B-B14F-4D97-AF65-F5344CB8AC3E}">

</xml_diff>